<commit_message>
extract T-junction likelihood for region boundary endpoints
</commit_message>
<xml_diff>
--- a/doc/EquationsOfRegionConstraints.pptx
+++ b/doc/EquationsOfRegionConstraints.pptx
@@ -269,7 +269,7 @@
           <a:p>
             <a:fld id="{6AD6EE87-EBD5-4F12-A48A-63ACA297AC8F}" type="datetimeFigureOut">
               <a:rPr lang="en-US" smtClean="0"/>
-              <a:t>6/22/2014</a:t>
+              <a:t>6/24/2014</a:t>
             </a:fld>
             <a:endParaRPr lang="en-US" dirty="0"/>
           </a:p>
@@ -522,7 +522,7 @@
           <a:p>
             <a:fld id="{4CD73815-2707-4475-8F1A-B873CB631BB4}" type="datetimeFigureOut">
               <a:rPr lang="en-US" smtClean="0"/>
-              <a:t>6/22/2014</a:t>
+              <a:t>6/24/2014</a:t>
             </a:fld>
             <a:endParaRPr lang="en-US" dirty="0"/>
           </a:p>
@@ -702,7 +702,7 @@
           <a:p>
             <a:fld id="{2A4AFB99-0EAB-4182-AFF8-E214C82A68F6}" type="datetimeFigureOut">
               <a:rPr lang="en-US" smtClean="0"/>
-              <a:t>6/22/2014</a:t>
+              <a:t>6/24/2014</a:t>
             </a:fld>
             <a:endParaRPr lang="en-US" dirty="0"/>
           </a:p>
@@ -907,7 +907,7 @@
           <a:p>
             <a:fld id="{A5D3794B-289A-4A80-97D7-111025398D45}" type="datetimeFigureOut">
               <a:rPr lang="en-US" smtClean="0"/>
-              <a:t>6/22/2014</a:t>
+              <a:t>6/24/2014</a:t>
             </a:fld>
             <a:endParaRPr lang="en-US" dirty="0"/>
           </a:p>
@@ -1164,7 +1164,7 @@
           <a:p>
             <a:fld id="{5A61015F-7CC6-4D0A-9D87-873EA4C304CC}" type="datetimeFigureOut">
               <a:rPr lang="en-US" smtClean="0"/>
-              <a:t>6/22/2014</a:t>
+              <a:t>6/24/2014</a:t>
             </a:fld>
             <a:endParaRPr lang="en-US" dirty="0"/>
           </a:p>
@@ -1486,7 +1486,7 @@
           <a:p>
             <a:fld id="{93C6A301-0538-44EC-B09D-202E1042A48B}" type="datetimeFigureOut">
               <a:rPr lang="en-US" smtClean="0"/>
-              <a:t>6/22/2014</a:t>
+              <a:t>6/24/2014</a:t>
             </a:fld>
             <a:endParaRPr lang="en-US" dirty="0"/>
           </a:p>
@@ -1884,7 +1884,7 @@
           <a:p>
             <a:fld id="{D789574A-8875-45EF-8EA2-3CAA0F7ABC4C}" type="datetimeFigureOut">
               <a:rPr lang="en-US" smtClean="0"/>
-              <a:t>6/22/2014</a:t>
+              <a:t>6/24/2014</a:t>
             </a:fld>
             <a:endParaRPr lang="en-US" dirty="0"/>
           </a:p>
@@ -2002,7 +2002,7 @@
           <a:p>
             <a:fld id="{67EF4D4C-5367-4C26-9E2B-D8088D7FCA81}" type="datetimeFigureOut">
               <a:rPr lang="en-US" smtClean="0"/>
-              <a:t>6/22/2014</a:t>
+              <a:t>6/24/2014</a:t>
             </a:fld>
             <a:endParaRPr lang="en-US" dirty="0"/>
           </a:p>
@@ -2097,7 +2097,7 @@
           <a:p>
             <a:fld id="{56E91E96-98B0-4413-9547-46F3504108EF}" type="datetimeFigureOut">
               <a:rPr lang="en-US" smtClean="0"/>
-              <a:t>6/22/2014</a:t>
+              <a:t>6/24/2014</a:t>
             </a:fld>
             <a:endParaRPr lang="en-US" dirty="0"/>
           </a:p>
@@ -2387,7 +2387,7 @@
           <a:p>
             <a:fld id="{05C68B11-C5A8-448C-8CE9-B1A273C79CFC}" type="datetimeFigureOut">
               <a:rPr lang="en-US" smtClean="0"/>
-              <a:t>6/22/2014</a:t>
+              <a:t>6/24/2014</a:t>
             </a:fld>
             <a:endParaRPr lang="en-US" dirty="0"/>
           </a:p>
@@ -2667,7 +2667,7 @@
           <a:p>
             <a:fld id="{C7616CA0-919D-4A49-9C8A-62FDFB3A5183}" type="datetimeFigureOut">
               <a:rPr lang="en-US" smtClean="0"/>
-              <a:t>6/22/2014</a:t>
+              <a:t>6/24/2014</a:t>
             </a:fld>
             <a:endParaRPr lang="en-US" dirty="0"/>
           </a:p>
@@ -2918,7 +2918,7 @@
             <a:fld id="{90298CD5-6C1E-4009-B41F-6DF62E31D3BE}" type="datetimeFigureOut">
               <a:rPr lang="en-US" smtClean="0"/>
               <a:pPr/>
-              <a:t>6/22/2014</a:t>
+              <a:t>6/24/2014</a:t>
             </a:fld>
             <a:endParaRPr lang="en-US" dirty="0"/>
           </a:p>
@@ -3444,8 +3444,8 @@
           </a:p>
         </p:txBody>
       </p:sp>
-      <mc:AlternateContent xmlns:mc="http://schemas.openxmlformats.org/markup-compatibility/2006">
-        <mc:Choice xmlns:a14="http://schemas.microsoft.com/office/drawing/2010/main" Requires="a14">
+      <mc:AlternateContent xmlns:mc="http://schemas.openxmlformats.org/markup-compatibility/2006" xmlns:a14="http://schemas.microsoft.com/office/drawing/2010/main">
+        <mc:Choice Requires="a14">
           <p:sp>
             <p:nvSpPr>
               <p:cNvPr id="3" name="内容占位符 2"/>
@@ -3476,11 +3476,7 @@
                 </a:pPr>
                 <a:r>
                   <a:rPr lang="zh-CN" altLang="en-US" dirty="0" smtClean="0"/>
-                  <a:t>因此每个子</a:t>
-                </a:r>
-                <a:r>
-                  <a:rPr lang="zh-CN" altLang="en-US" dirty="0" smtClean="0"/>
-                  <a:t>区域 </a:t>
+                  <a:t>因此每个子区域 </a:t>
                 </a:r>
                 <a14:m>
                   <m:oMath xmlns:m="http://schemas.openxmlformats.org/officeDocument/2006/math">
@@ -3494,11 +3490,7 @@
                 </a14:m>
                 <a:r>
                   <a:rPr lang="zh-CN" altLang="en-US" dirty="0" smtClean="0"/>
-                  <a:t> 可以</a:t>
-                </a:r>
-                <a:r>
-                  <a:rPr lang="zh-CN" altLang="en-US" dirty="0" smtClean="0"/>
-                  <a:t>参数化为含三个自由变量的平面方程系数：</a:t>
+                  <a:t> 可以参数化为含三个自由变量的平面方程系数：</a:t>
                 </a:r>
                 <a14:m>
                   <m:oMath xmlns:m="http://schemas.openxmlformats.org/officeDocument/2006/math">
@@ -3930,11 +3922,7 @@
                 </a14:m>
                 <a:r>
                   <a:rPr lang="zh-CN" altLang="en-US" dirty="0" smtClean="0"/>
-                  <a:t> 平面上</a:t>
-                </a:r>
-                <a:r>
-                  <a:rPr lang="zh-CN" altLang="en-US" dirty="0" smtClean="0"/>
-                  <a:t>深度为</a:t>
+                  <a:t> 平面上深度为</a:t>
                 </a:r>
                 <a:endParaRPr lang="en-US" altLang="zh-CN" dirty="0" smtClean="0"/>
               </a:p>
@@ -4186,7 +4174,7 @@
                       <m:f>
                         <m:fPr>
                           <m:ctrlPr>
-                            <a:rPr lang="en-US" altLang="zh-CN" b="0" i="0" smtClean="0">
+                            <a:rPr lang="en-US" altLang="zh-CN" b="0" i="1" smtClean="0">
                               <a:latin typeface="Cambria Math" panose="02040503050406030204" pitchFamily="18" charset="0"/>
                             </a:rPr>
                           </m:ctrlPr>
@@ -4299,11 +4287,7 @@
                 </a14:m>
                 <a:r>
                   <a:rPr lang="zh-CN" altLang="en-US" dirty="0" smtClean="0"/>
-                  <a:t> 决定（譬如可指定为第一个点的深度）</a:t>
-                </a:r>
-                <a:r>
-                  <a:rPr lang="zh-CN" altLang="en-US" dirty="0" smtClean="0"/>
-                  <a:t>，给定 </a:t>
+                  <a:t> 决定（譬如可指定为第一个点的深度），给定 </a:t>
                 </a:r>
                 <a14:m>
                   <m:oMath xmlns:m="http://schemas.openxmlformats.org/officeDocument/2006/math">
@@ -4694,7 +4678,7 @@
                       <m:d>
                         <m:dPr>
                           <m:ctrlPr>
-                            <a:rPr lang="en-US" altLang="zh-CN" b="0" i="0" smtClean="0">
+                            <a:rPr lang="en-US" altLang="zh-CN" b="0" i="1" smtClean="0">
                               <a:latin typeface="Cambria Math" panose="02040503050406030204" pitchFamily="18" charset="0"/>
                             </a:rPr>
                           </m:ctrlPr>
@@ -4814,7 +4798,7 @@
             </p:txBody>
           </p:sp>
         </mc:Choice>
-        <mc:Fallback>
+        <mc:Fallback xmlns="">
           <p:sp>
             <p:nvSpPr>
               <p:cNvPr id="3" name="内容占位符 2"/>
@@ -5123,8 +5107,8 @@
           </a:p>
         </p:txBody>
       </p:sp>
-      <mc:AlternateContent xmlns:mc="http://schemas.openxmlformats.org/markup-compatibility/2006">
-        <mc:Choice xmlns:a14="http://schemas.microsoft.com/office/drawing/2010/main" Requires="a14">
+      <mc:AlternateContent xmlns:mc="http://schemas.openxmlformats.org/markup-compatibility/2006" xmlns:a14="http://schemas.microsoft.com/office/drawing/2010/main">
+        <mc:Choice Requires="a14">
           <p:sp>
             <p:nvSpPr>
               <p:cNvPr id="3" name="内容占位符 2"/>
@@ -5793,7 +5777,7 @@
             </p:txBody>
           </p:sp>
         </mc:Choice>
-        <mc:Fallback>
+        <mc:Fallback xmlns="">
           <p:sp>
             <p:nvSpPr>
               <p:cNvPr id="3" name="内容占位符 2"/>
@@ -5886,8 +5870,8 @@
           </a:p>
         </p:txBody>
       </p:sp>
-      <mc:AlternateContent xmlns:mc="http://schemas.openxmlformats.org/markup-compatibility/2006">
-        <mc:Choice xmlns:a14="http://schemas.microsoft.com/office/drawing/2010/main" Requires="a14">
+      <mc:AlternateContent xmlns:mc="http://schemas.openxmlformats.org/markup-compatibility/2006" xmlns:a14="http://schemas.microsoft.com/office/drawing/2010/main">
+        <mc:Choice Requires="a14">
           <p:sp>
             <p:nvSpPr>
               <p:cNvPr id="3" name="内容占位符 2"/>
@@ -7156,7 +7140,7 @@
             </p:txBody>
           </p:sp>
         </mc:Choice>
-        <mc:Fallback>
+        <mc:Fallback xmlns="">
           <p:sp>
             <p:nvSpPr>
               <p:cNvPr id="3" name="内容占位符 2"/>
@@ -7249,8 +7233,8 @@
           </a:p>
         </p:txBody>
       </p:sp>
-      <mc:AlternateContent xmlns:mc="http://schemas.openxmlformats.org/markup-compatibility/2006">
-        <mc:Choice xmlns:a14="http://schemas.microsoft.com/office/drawing/2010/main" Requires="a14">
+      <mc:AlternateContent xmlns:mc="http://schemas.openxmlformats.org/markup-compatibility/2006" xmlns:a14="http://schemas.microsoft.com/office/drawing/2010/main">
+        <mc:Choice Requires="a14">
           <p:sp>
             <p:nvSpPr>
               <p:cNvPr id="3" name="内容占位符 2"/>
@@ -8709,7 +8693,7 @@
             </p:txBody>
           </p:sp>
         </mc:Choice>
-        <mc:Fallback>
+        <mc:Fallback xmlns="">
           <p:sp>
             <p:nvSpPr>
               <p:cNvPr id="3" name="内容占位符 2"/>
@@ -8932,115 +8916,128 @@
                           <a:rPr lang="en-US" altLang="zh-CN" b="0" i="1" smtClean="0">
                             <a:latin typeface="Cambria Math" panose="02040503050406030204" pitchFamily="18" charset="0"/>
                           </a:rPr>
-                          <m:t>𝛼</m:t>
+                          <m:t>𝐶</m:t>
                         </m:r>
                       </m:e>
                       <m:sub>
                         <m:r>
-                          <a:rPr lang="en-US" altLang="zh-CN" b="0" i="1" smtClean="0">
-                            <a:latin typeface="Cambria Math" panose="02040503050406030204" pitchFamily="18" charset="0"/>
-                          </a:rPr>
-                          <m:t>1</m:t>
+                          <a:rPr lang="en-US" altLang="zh-CN" i="1">
+                            <a:latin typeface="Cambria Math" panose="02040503050406030204" pitchFamily="18" charset="0"/>
+                          </a:rPr>
+                          <m:t>𝑠𝑡𝑟𝑎𝑖𝑔h𝑡</m:t>
                         </m:r>
                       </m:sub>
                     </m:sSub>
-                    <m:sSub>
-                      <m:sSubPr>
+                    <m:sSup>
+                      <m:sSupPr>
                         <m:ctrlPr>
                           <a:rPr lang="en-US" altLang="zh-CN" b="0" i="1" smtClean="0">
                             <a:latin typeface="Cambria Math" panose="02040503050406030204" pitchFamily="18" charset="0"/>
                           </a:rPr>
                         </m:ctrlPr>
-                      </m:sSubPr>
+                      </m:sSupPr>
                       <m:e>
-                        <m:r>
-                          <a:rPr lang="en-US" altLang="zh-CN" b="0" i="1" smtClean="0">
-                            <a:latin typeface="Cambria Math" panose="02040503050406030204" pitchFamily="18" charset="0"/>
-                          </a:rPr>
-                          <m:t>𝐶</m:t>
-                        </m:r>
+                        <m:d>
+                          <m:dPr>
+                            <m:ctrlPr>
+                              <a:rPr lang="en-US" altLang="zh-CN" b="0" i="1" smtClean="0">
+                                <a:latin typeface="Cambria Math" panose="02040503050406030204" pitchFamily="18" charset="0"/>
+                              </a:rPr>
+                            </m:ctrlPr>
+                          </m:dPr>
+                          <m:e>
+                            <m:sSub>
+                              <m:sSubPr>
+                                <m:ctrlPr>
+                                  <a:rPr lang="en-US" altLang="zh-CN" b="0" i="1" smtClean="0">
+                                    <a:latin typeface="Cambria Math" panose="02040503050406030204" pitchFamily="18" charset="0"/>
+                                  </a:rPr>
+                                </m:ctrlPr>
+                              </m:sSubPr>
+                              <m:e>
+                                <m:r>
+                                  <a:rPr lang="en-US" altLang="zh-CN" b="0" i="1" smtClean="0">
+                                    <a:latin typeface="Cambria Math" panose="02040503050406030204" pitchFamily="18" charset="0"/>
+                                  </a:rPr>
+                                  <m:t>𝑟</m:t>
+                                </m:r>
+                              </m:e>
+                              <m:sub>
+                                <m:r>
+                                  <a:rPr lang="en-US" altLang="zh-CN" b="0" i="1" smtClean="0">
+                                    <a:latin typeface="Cambria Math" panose="02040503050406030204" pitchFamily="18" charset="0"/>
+                                  </a:rPr>
+                                  <m:t>𝑖</m:t>
+                                </m:r>
+                              </m:sub>
+                            </m:sSub>
+                            <m:r>
+                              <a:rPr lang="en-US" altLang="zh-CN" b="0" i="1" smtClean="0">
+                                <a:latin typeface="Cambria Math" panose="02040503050406030204" pitchFamily="18" charset="0"/>
+                              </a:rPr>
+                              <m:t>,</m:t>
+                            </m:r>
+                            <m:sSub>
+                              <m:sSubPr>
+                                <m:ctrlPr>
+                                  <a:rPr lang="en-US" altLang="zh-CN" b="0" i="1" smtClean="0">
+                                    <a:latin typeface="Cambria Math" panose="02040503050406030204" pitchFamily="18" charset="0"/>
+                                  </a:rPr>
+                                </m:ctrlPr>
+                              </m:sSubPr>
+                              <m:e>
+                                <m:r>
+                                  <a:rPr lang="en-US" altLang="zh-CN" b="0" i="1" smtClean="0">
+                                    <a:latin typeface="Cambria Math" panose="02040503050406030204" pitchFamily="18" charset="0"/>
+                                  </a:rPr>
+                                  <m:t>𝑟</m:t>
+                                </m:r>
+                              </m:e>
+                              <m:sub>
+                                <m:r>
+                                  <a:rPr lang="en-US" altLang="zh-CN" b="0" i="1" smtClean="0">
+                                    <a:latin typeface="Cambria Math" panose="02040503050406030204" pitchFamily="18" charset="0"/>
+                                  </a:rPr>
+                                  <m:t>𝑗</m:t>
+                                </m:r>
+                              </m:sub>
+                            </m:sSub>
+                          </m:e>
+                        </m:d>
                       </m:e>
-                      <m:sub>
-                        <m:r>
-                          <a:rPr lang="en-US" altLang="zh-CN" i="1">
-                            <a:latin typeface="Cambria Math" panose="02040503050406030204" pitchFamily="18" charset="0"/>
-                          </a:rPr>
-                          <m:t>𝑠𝑡𝑟𝑎𝑖𝑔h𝑡</m:t>
-                        </m:r>
-                      </m:sub>
-                    </m:sSub>
-                    <m:d>
-                      <m:dPr>
-                        <m:ctrlPr>
-                          <a:rPr lang="en-US" altLang="zh-CN" b="0" i="1" smtClean="0">
-                            <a:latin typeface="Cambria Math" panose="02040503050406030204" pitchFamily="18" charset="0"/>
-                          </a:rPr>
-                        </m:ctrlPr>
-                      </m:dPr>
-                      <m:e>
+                      <m:sup>
                         <m:sSub>
                           <m:sSubPr>
                             <m:ctrlPr>
-                              <a:rPr lang="en-US" altLang="zh-CN" b="0" i="1" smtClean="0">
+                              <a:rPr lang="en-US" altLang="zh-CN" i="1">
                                 <a:latin typeface="Cambria Math" panose="02040503050406030204" pitchFamily="18" charset="0"/>
                               </a:rPr>
                             </m:ctrlPr>
                           </m:sSubPr>
                           <m:e>
                             <m:r>
-                              <a:rPr lang="en-US" altLang="zh-CN" b="0" i="1" smtClean="0">
-                                <a:latin typeface="Cambria Math" panose="02040503050406030204" pitchFamily="18" charset="0"/>
-                              </a:rPr>
-                              <m:t>𝑟</m:t>
+                              <a:rPr lang="en-US" altLang="zh-CN" i="1">
+                                <a:latin typeface="Cambria Math" panose="02040503050406030204" pitchFamily="18" charset="0"/>
+                              </a:rPr>
+                              <m:t>𝛼</m:t>
                             </m:r>
                           </m:e>
                           <m:sub>
                             <m:r>
-                              <a:rPr lang="en-US" altLang="zh-CN" b="0" i="1" smtClean="0">
-                                <a:latin typeface="Cambria Math" panose="02040503050406030204" pitchFamily="18" charset="0"/>
-                              </a:rPr>
-                              <m:t>𝑖</m:t>
+                              <a:rPr lang="en-US" altLang="zh-CN" i="1">
+                                <a:latin typeface="Cambria Math" panose="02040503050406030204" pitchFamily="18" charset="0"/>
+                              </a:rPr>
+                              <m:t>1</m:t>
                             </m:r>
                           </m:sub>
                         </m:sSub>
-                        <m:r>
-                          <a:rPr lang="en-US" altLang="zh-CN" b="0" i="1" smtClean="0">
-                            <a:latin typeface="Cambria Math" panose="02040503050406030204" pitchFamily="18" charset="0"/>
-                          </a:rPr>
-                          <m:t>,</m:t>
-                        </m:r>
-                        <m:sSub>
-                          <m:sSubPr>
-                            <m:ctrlPr>
-                              <a:rPr lang="en-US" altLang="zh-CN" b="0" i="1" smtClean="0">
-                                <a:latin typeface="Cambria Math" panose="02040503050406030204" pitchFamily="18" charset="0"/>
-                              </a:rPr>
-                            </m:ctrlPr>
-                          </m:sSubPr>
-                          <m:e>
-                            <m:r>
-                              <a:rPr lang="en-US" altLang="zh-CN" b="0" i="1" smtClean="0">
-                                <a:latin typeface="Cambria Math" panose="02040503050406030204" pitchFamily="18" charset="0"/>
-                              </a:rPr>
-                              <m:t>𝑟</m:t>
-                            </m:r>
-                          </m:e>
-                          <m:sub>
-                            <m:r>
-                              <a:rPr lang="en-US" altLang="zh-CN" b="0" i="1" smtClean="0">
-                                <a:latin typeface="Cambria Math" panose="02040503050406030204" pitchFamily="18" charset="0"/>
-                              </a:rPr>
-                              <m:t>𝑗</m:t>
-                            </m:r>
-                          </m:sub>
-                        </m:sSub>
-                      </m:e>
-                    </m:d>
+                      </m:sup>
+                    </m:sSup>
                     <m:r>
                       <a:rPr lang="en-US" altLang="zh-CN" b="0" i="1" smtClean="0">
                         <a:latin typeface="Cambria Math" panose="02040503050406030204" pitchFamily="18" charset="0"/>
                       </a:rPr>
-                      <m:t>+</m:t>
+                      <m:t>×</m:t>
                     </m:r>
                     <m:sSub>
                       <m:sSubPr>
@@ -9055,7 +9052,7 @@
                           <a:rPr lang="en-US" altLang="zh-CN" b="0" i="1" smtClean="0">
                             <a:latin typeface="Cambria Math" panose="02040503050406030204" pitchFamily="18" charset="0"/>
                           </a:rPr>
-                          <m:t>𝛼</m:t>
+                          <m:t>𝐶</m:t>
                         </m:r>
                       </m:e>
                       <m:sub>
@@ -9063,102 +9060,115 @@
                           <a:rPr lang="en-US" altLang="zh-CN" b="0" i="1" smtClean="0">
                             <a:latin typeface="Cambria Math" panose="02040503050406030204" pitchFamily="18" charset="0"/>
                           </a:rPr>
-                          <m:t>2</m:t>
+                          <m:t>𝑡𝑗𝑢𝑛𝑐𝑡</m:t>
                         </m:r>
                       </m:sub>
                     </m:sSub>
-                    <m:sSub>
-                      <m:sSubPr>
+                    <m:sSup>
+                      <m:sSupPr>
                         <m:ctrlPr>
                           <a:rPr lang="en-US" altLang="zh-CN" b="0" i="1" smtClean="0">
                             <a:latin typeface="Cambria Math" panose="02040503050406030204" pitchFamily="18" charset="0"/>
                           </a:rPr>
                         </m:ctrlPr>
-                      </m:sSubPr>
+                      </m:sSupPr>
                       <m:e>
-                        <m:r>
-                          <a:rPr lang="en-US" altLang="zh-CN" b="0" i="1" smtClean="0">
-                            <a:latin typeface="Cambria Math" panose="02040503050406030204" pitchFamily="18" charset="0"/>
-                          </a:rPr>
-                          <m:t>𝐶</m:t>
-                        </m:r>
+                        <m:d>
+                          <m:dPr>
+                            <m:ctrlPr>
+                              <a:rPr lang="en-US" altLang="zh-CN" b="0" i="1" smtClean="0">
+                                <a:latin typeface="Cambria Math" panose="02040503050406030204" pitchFamily="18" charset="0"/>
+                              </a:rPr>
+                            </m:ctrlPr>
+                          </m:dPr>
+                          <m:e>
+                            <m:sSub>
+                              <m:sSubPr>
+                                <m:ctrlPr>
+                                  <a:rPr lang="en-US" altLang="zh-CN" b="0" i="1" smtClean="0">
+                                    <a:latin typeface="Cambria Math" panose="02040503050406030204" pitchFamily="18" charset="0"/>
+                                  </a:rPr>
+                                </m:ctrlPr>
+                              </m:sSubPr>
+                              <m:e>
+                                <m:r>
+                                  <a:rPr lang="en-US" altLang="zh-CN" b="0" i="1" smtClean="0">
+                                    <a:latin typeface="Cambria Math" panose="02040503050406030204" pitchFamily="18" charset="0"/>
+                                  </a:rPr>
+                                  <m:t>𝑟</m:t>
+                                </m:r>
+                              </m:e>
+                              <m:sub>
+                                <m:r>
+                                  <a:rPr lang="en-US" altLang="zh-CN" b="0" i="1" smtClean="0">
+                                    <a:latin typeface="Cambria Math" panose="02040503050406030204" pitchFamily="18" charset="0"/>
+                                  </a:rPr>
+                                  <m:t>𝑖</m:t>
+                                </m:r>
+                              </m:sub>
+                            </m:sSub>
+                            <m:r>
+                              <a:rPr lang="en-US" altLang="zh-CN" b="0" i="1" smtClean="0">
+                                <a:latin typeface="Cambria Math" panose="02040503050406030204" pitchFamily="18" charset="0"/>
+                              </a:rPr>
+                              <m:t>,</m:t>
+                            </m:r>
+                            <m:sSub>
+                              <m:sSubPr>
+                                <m:ctrlPr>
+                                  <a:rPr lang="en-US" altLang="zh-CN" b="0" i="1" smtClean="0">
+                                    <a:latin typeface="Cambria Math" panose="02040503050406030204" pitchFamily="18" charset="0"/>
+                                  </a:rPr>
+                                </m:ctrlPr>
+                              </m:sSubPr>
+                              <m:e>
+                                <m:r>
+                                  <a:rPr lang="en-US" altLang="zh-CN" b="0" i="1" smtClean="0">
+                                    <a:latin typeface="Cambria Math" panose="02040503050406030204" pitchFamily="18" charset="0"/>
+                                  </a:rPr>
+                                  <m:t>𝑟</m:t>
+                                </m:r>
+                              </m:e>
+                              <m:sub>
+                                <m:r>
+                                  <a:rPr lang="en-US" altLang="zh-CN" b="0" i="1" smtClean="0">
+                                    <a:latin typeface="Cambria Math" panose="02040503050406030204" pitchFamily="18" charset="0"/>
+                                  </a:rPr>
+                                  <m:t>𝑗</m:t>
+                                </m:r>
+                              </m:sub>
+                            </m:sSub>
+                          </m:e>
+                        </m:d>
                       </m:e>
-                      <m:sub>
-                        <m:r>
-                          <a:rPr lang="en-US" altLang="zh-CN" b="0" i="1" smtClean="0">
-                            <a:latin typeface="Cambria Math" panose="02040503050406030204" pitchFamily="18" charset="0"/>
-                          </a:rPr>
-                          <m:t>𝑡𝑗𝑢𝑛𝑐𝑡</m:t>
-                        </m:r>
-                      </m:sub>
-                    </m:sSub>
-                    <m:d>
-                      <m:dPr>
-                        <m:ctrlPr>
-                          <a:rPr lang="en-US" altLang="zh-CN" b="0" i="1" smtClean="0">
-                            <a:latin typeface="Cambria Math" panose="02040503050406030204" pitchFamily="18" charset="0"/>
-                          </a:rPr>
-                        </m:ctrlPr>
-                      </m:dPr>
-                      <m:e>
+                      <m:sup>
                         <m:sSub>
                           <m:sSubPr>
                             <m:ctrlPr>
-                              <a:rPr lang="en-US" altLang="zh-CN" b="0" i="1" smtClean="0">
+                              <a:rPr lang="en-US" altLang="zh-CN" i="1">
                                 <a:latin typeface="Cambria Math" panose="02040503050406030204" pitchFamily="18" charset="0"/>
                               </a:rPr>
                             </m:ctrlPr>
                           </m:sSubPr>
                           <m:e>
                             <m:r>
-                              <a:rPr lang="en-US" altLang="zh-CN" b="0" i="1" smtClean="0">
-                                <a:latin typeface="Cambria Math" panose="02040503050406030204" pitchFamily="18" charset="0"/>
-                              </a:rPr>
-                              <m:t>𝑟</m:t>
+                              <a:rPr lang="en-US" altLang="zh-CN" i="1">
+                                <a:latin typeface="Cambria Math" panose="02040503050406030204" pitchFamily="18" charset="0"/>
+                              </a:rPr>
+                              <m:t>𝛼</m:t>
                             </m:r>
                           </m:e>
                           <m:sub>
                             <m:r>
-                              <a:rPr lang="en-US" altLang="zh-CN" b="0" i="1" smtClean="0">
-                                <a:latin typeface="Cambria Math" panose="02040503050406030204" pitchFamily="18" charset="0"/>
-                              </a:rPr>
-                              <m:t>𝑖</m:t>
+                              <a:rPr lang="en-US" altLang="zh-CN" i="1">
+                                <a:latin typeface="Cambria Math" panose="02040503050406030204" pitchFamily="18" charset="0"/>
+                              </a:rPr>
+                              <m:t>2</m:t>
                             </m:r>
                           </m:sub>
                         </m:sSub>
-                        <m:r>
-                          <a:rPr lang="en-US" altLang="zh-CN" b="0" i="1" smtClean="0">
-                            <a:latin typeface="Cambria Math" panose="02040503050406030204" pitchFamily="18" charset="0"/>
-                          </a:rPr>
-                          <m:t>,</m:t>
-                        </m:r>
-                        <m:sSub>
-                          <m:sSubPr>
-                            <m:ctrlPr>
-                              <a:rPr lang="en-US" altLang="zh-CN" b="0" i="1" smtClean="0">
-                                <a:latin typeface="Cambria Math" panose="02040503050406030204" pitchFamily="18" charset="0"/>
-                              </a:rPr>
-                            </m:ctrlPr>
-                          </m:sSubPr>
-                          <m:e>
-                            <m:r>
-                              <a:rPr lang="en-US" altLang="zh-CN" b="0" i="1" smtClean="0">
-                                <a:latin typeface="Cambria Math" panose="02040503050406030204" pitchFamily="18" charset="0"/>
-                              </a:rPr>
-                              <m:t>𝑟</m:t>
-                            </m:r>
-                          </m:e>
-                          <m:sub>
-                            <m:r>
-                              <a:rPr lang="en-US" altLang="zh-CN" b="0" i="1" smtClean="0">
-                                <a:latin typeface="Cambria Math" panose="02040503050406030204" pitchFamily="18" charset="0"/>
-                              </a:rPr>
-                              <m:t>𝑗</m:t>
-                            </m:r>
-                          </m:sub>
-                        </m:sSub>
-                      </m:e>
-                    </m:d>
+                      </m:sup>
+                    </m:sSup>
                     <m:r>
                       <a:rPr lang="en-US" altLang="zh-CN" b="0" i="1" smtClean="0">
                         <a:latin typeface="Cambria Math" panose="02040503050406030204" pitchFamily="18" charset="0"/>

</xml_diff>

<commit_message>
build E_overlap, E_manh, E_orientcons, E_connect, E_disconnect
</commit_message>
<xml_diff>
--- a/doc/EquationsOfRegionConstraints.pptx
+++ b/doc/EquationsOfRegionConstraints.pptx
@@ -11,6 +11,7 @@
     <p:sldId id="270" r:id="rId5"/>
     <p:sldId id="272" r:id="rId6"/>
     <p:sldId id="271" r:id="rId7"/>
+    <p:sldId id="273" r:id="rId8"/>
   </p:sldIdLst>
   <p:sldSz cx="12192000" cy="6858000"/>
   <p:notesSz cx="6858000" cy="9144000"/>
@@ -3444,8 +3445,8 @@
           </a:p>
         </p:txBody>
       </p:sp>
-      <mc:AlternateContent xmlns:mc="http://schemas.openxmlformats.org/markup-compatibility/2006" xmlns:a14="http://schemas.microsoft.com/office/drawing/2010/main">
-        <mc:Choice Requires="a14">
+      <mc:AlternateContent xmlns:mc="http://schemas.openxmlformats.org/markup-compatibility/2006">
+        <mc:Choice xmlns:a14="http://schemas.microsoft.com/office/drawing/2010/main" Requires="a14">
           <p:sp>
             <p:nvSpPr>
               <p:cNvPr id="3" name="内容占位符 2"/>
@@ -3759,8 +3760,119 @@
                       <a:rPr lang="en-US" altLang="zh-CN" b="0" i="1" smtClean="0">
                         <a:latin typeface="Cambria Math" panose="02040503050406030204" pitchFamily="18" charset="0"/>
                       </a:rPr>
-                      <m:t>=1</m:t>
+                      <m:t>=</m:t>
                     </m:r>
+                    <m:sSubSup>
+                      <m:sSubSupPr>
+                        <m:ctrlPr>
+                          <a:rPr lang="en-US" altLang="zh-CN" b="0" i="1" smtClean="0">
+                            <a:latin typeface="Cambria Math" panose="02040503050406030204" pitchFamily="18" charset="0"/>
+                          </a:rPr>
+                        </m:ctrlPr>
+                      </m:sSubSupPr>
+                      <m:e>
+                        <m:r>
+                          <a:rPr lang="en-US" altLang="zh-CN" b="0" i="1" smtClean="0">
+                            <a:latin typeface="Cambria Math" panose="02040503050406030204" pitchFamily="18" charset="0"/>
+                          </a:rPr>
+                          <m:t>𝑎</m:t>
+                        </m:r>
+                      </m:e>
+                      <m:sub>
+                        <m:r>
+                          <a:rPr lang="en-US" altLang="zh-CN" b="0" i="1" smtClean="0">
+                            <a:latin typeface="Cambria Math" panose="02040503050406030204" pitchFamily="18" charset="0"/>
+                          </a:rPr>
+                          <m:t>𝑟</m:t>
+                        </m:r>
+                      </m:sub>
+                      <m:sup>
+                        <m:r>
+                          <a:rPr lang="en-US" altLang="zh-CN" b="0" i="1" smtClean="0">
+                            <a:latin typeface="Cambria Math" panose="02040503050406030204" pitchFamily="18" charset="0"/>
+                          </a:rPr>
+                          <m:t>2</m:t>
+                        </m:r>
+                      </m:sup>
+                    </m:sSubSup>
+                    <m:r>
+                      <a:rPr lang="en-US" altLang="zh-CN" b="0" i="1" smtClean="0">
+                        <a:latin typeface="Cambria Math" panose="02040503050406030204" pitchFamily="18" charset="0"/>
+                      </a:rPr>
+                      <m:t>+</m:t>
+                    </m:r>
+                    <m:sSubSup>
+                      <m:sSubSupPr>
+                        <m:ctrlPr>
+                          <a:rPr lang="en-US" altLang="zh-CN" b="0" i="1" smtClean="0">
+                            <a:latin typeface="Cambria Math" panose="02040503050406030204" pitchFamily="18" charset="0"/>
+                          </a:rPr>
+                        </m:ctrlPr>
+                      </m:sSubSupPr>
+                      <m:e>
+                        <m:r>
+                          <a:rPr lang="en-US" altLang="zh-CN" b="0" i="1" smtClean="0">
+                            <a:latin typeface="Cambria Math" panose="02040503050406030204" pitchFamily="18" charset="0"/>
+                          </a:rPr>
+                          <m:t>𝑏</m:t>
+                        </m:r>
+                      </m:e>
+                      <m:sub>
+                        <m:r>
+                          <a:rPr lang="en-US" altLang="zh-CN" b="0" i="1" smtClean="0">
+                            <a:latin typeface="Cambria Math" panose="02040503050406030204" pitchFamily="18" charset="0"/>
+                          </a:rPr>
+                          <m:t>𝑟</m:t>
+                        </m:r>
+                      </m:sub>
+                      <m:sup>
+                        <m:r>
+                          <a:rPr lang="en-US" altLang="zh-CN" b="0" i="1" smtClean="0">
+                            <a:latin typeface="Cambria Math" panose="02040503050406030204" pitchFamily="18" charset="0"/>
+                          </a:rPr>
+                          <m:t>2</m:t>
+                        </m:r>
+                      </m:sup>
+                    </m:sSubSup>
+                    <m:r>
+                      <a:rPr lang="en-US" altLang="zh-CN" b="0" i="1" smtClean="0">
+                        <a:latin typeface="Cambria Math" panose="02040503050406030204" pitchFamily="18" charset="0"/>
+                      </a:rPr>
+                      <m:t>+</m:t>
+                    </m:r>
+                    <m:sSubSup>
+                      <m:sSubSupPr>
+                        <m:ctrlPr>
+                          <a:rPr lang="en-US" altLang="zh-CN" b="0" i="1" smtClean="0">
+                            <a:latin typeface="Cambria Math" panose="02040503050406030204" pitchFamily="18" charset="0"/>
+                          </a:rPr>
+                        </m:ctrlPr>
+                      </m:sSubSupPr>
+                      <m:e>
+                        <m:r>
+                          <a:rPr lang="en-US" altLang="zh-CN" b="0" i="1" smtClean="0">
+                            <a:latin typeface="Cambria Math" panose="02040503050406030204" pitchFamily="18" charset="0"/>
+                          </a:rPr>
+                          <m:t>𝑐</m:t>
+                        </m:r>
+                      </m:e>
+                      <m:sub>
+                        <m:r>
+                          <a:rPr lang="en-US" altLang="zh-CN" b="0" i="1" smtClean="0">
+                            <a:latin typeface="Cambria Math" panose="02040503050406030204" pitchFamily="18" charset="0"/>
+                          </a:rPr>
+                          <m:t>𝑟</m:t>
+                        </m:r>
+                      </m:sub>
+                      <m:sup>
+                        <m:r>
+                          <a:rPr lang="en-US" altLang="zh-CN" b="0" i="1" smtClean="0">
+                            <a:latin typeface="Cambria Math" panose="02040503050406030204" pitchFamily="18" charset="0"/>
+                          </a:rPr>
+                          <m:t>2</m:t>
+                        </m:r>
+                      </m:sup>
+                    </m:sSubSup>
                   </m:oMath>
                 </a14:m>
                 <a:endParaRPr lang="en-US" altLang="zh-CN" dirty="0" smtClean="0"/>
@@ -3993,12 +4105,117 @@
                           </m:ctrlPr>
                         </m:fPr>
                         <m:num>
+                          <m:sSubSup>
+                            <m:sSubSupPr>
+                              <m:ctrlPr>
+                                <a:rPr lang="en-US" altLang="zh-CN" i="1">
+                                  <a:latin typeface="Cambria Math" panose="02040503050406030204" pitchFamily="18" charset="0"/>
+                                </a:rPr>
+                              </m:ctrlPr>
+                            </m:sSubSupPr>
+                            <m:e>
+                              <m:r>
+                                <a:rPr lang="en-US" altLang="zh-CN" i="1">
+                                  <a:latin typeface="Cambria Math" panose="02040503050406030204" pitchFamily="18" charset="0"/>
+                                </a:rPr>
+                                <m:t>𝑎</m:t>
+                              </m:r>
+                            </m:e>
+                            <m:sub>
+                              <m:r>
+                                <a:rPr lang="en-US" altLang="zh-CN" i="1">
+                                  <a:latin typeface="Cambria Math" panose="02040503050406030204" pitchFamily="18" charset="0"/>
+                                </a:rPr>
+                                <m:t>𝑟</m:t>
+                              </m:r>
+                            </m:sub>
+                            <m:sup>
+                              <m:r>
+                                <a:rPr lang="en-US" altLang="zh-CN" i="1">
+                                  <a:latin typeface="Cambria Math" panose="02040503050406030204" pitchFamily="18" charset="0"/>
+                                </a:rPr>
+                                <m:t>2</m:t>
+                              </m:r>
+                            </m:sup>
+                          </m:sSubSup>
                           <m:r>
-                            <a:rPr lang="en-US" altLang="zh-CN" b="0" i="1" smtClean="0">
+                            <a:rPr lang="en-US" altLang="zh-CN" i="1">
                               <a:latin typeface="Cambria Math" panose="02040503050406030204" pitchFamily="18" charset="0"/>
                             </a:rPr>
-                            <m:t>1</m:t>
+                            <m:t>+</m:t>
                           </m:r>
+                          <m:sSubSup>
+                            <m:sSubSupPr>
+                              <m:ctrlPr>
+                                <a:rPr lang="en-US" altLang="zh-CN" i="1">
+                                  <a:latin typeface="Cambria Math" panose="02040503050406030204" pitchFamily="18" charset="0"/>
+                                </a:rPr>
+                              </m:ctrlPr>
+                            </m:sSubSupPr>
+                            <m:e>
+                              <m:r>
+                                <a:rPr lang="en-US" altLang="zh-CN" i="1">
+                                  <a:latin typeface="Cambria Math" panose="02040503050406030204" pitchFamily="18" charset="0"/>
+                                </a:rPr>
+                                <m:t>𝑏</m:t>
+                              </m:r>
+                            </m:e>
+                            <m:sub>
+                              <m:r>
+                                <a:rPr lang="en-US" altLang="zh-CN" i="1">
+                                  <a:latin typeface="Cambria Math" panose="02040503050406030204" pitchFamily="18" charset="0"/>
+                                </a:rPr>
+                                <m:t>𝑟</m:t>
+                              </m:r>
+                            </m:sub>
+                            <m:sup>
+                              <m:r>
+                                <a:rPr lang="en-US" altLang="zh-CN" i="1">
+                                  <a:latin typeface="Cambria Math" panose="02040503050406030204" pitchFamily="18" charset="0"/>
+                                </a:rPr>
+                                <m:t>2</m:t>
+                              </m:r>
+                            </m:sup>
+                          </m:sSubSup>
+                          <m:r>
+                            <a:rPr lang="en-US" altLang="zh-CN" i="1">
+                              <a:latin typeface="Cambria Math" panose="02040503050406030204" pitchFamily="18" charset="0"/>
+                            </a:rPr>
+                            <m:t>+</m:t>
+                          </m:r>
+                          <m:sSubSup>
+                            <m:sSubSupPr>
+                              <m:ctrlPr>
+                                <a:rPr lang="en-US" altLang="zh-CN" i="1">
+                                  <a:latin typeface="Cambria Math" panose="02040503050406030204" pitchFamily="18" charset="0"/>
+                                </a:rPr>
+                              </m:ctrlPr>
+                            </m:sSubSupPr>
+                            <m:e>
+                              <m:r>
+                                <a:rPr lang="en-US" altLang="zh-CN" i="1">
+                                  <a:latin typeface="Cambria Math" panose="02040503050406030204" pitchFamily="18" charset="0"/>
+                                </a:rPr>
+                                <m:t>𝑐</m:t>
+                              </m:r>
+                            </m:e>
+                            <m:sub>
+                              <m:r>
+                                <a:rPr lang="en-US" altLang="zh-CN" i="1">
+                                  <a:latin typeface="Cambria Math" panose="02040503050406030204" pitchFamily="18" charset="0"/>
+                                </a:rPr>
+                                <m:t>𝑟</m:t>
+                              </m:r>
+                            </m:sub>
+                            <m:sup>
+                              <m:r>
+                                <a:rPr lang="en-US" altLang="zh-CN" i="1">
+                                  <a:latin typeface="Cambria Math" panose="02040503050406030204" pitchFamily="18" charset="0"/>
+                                </a:rPr>
+                                <m:t>2</m:t>
+                              </m:r>
+                            </m:sup>
+                          </m:sSubSup>
                         </m:num>
                         <m:den>
                           <m:sSub>
@@ -4180,12 +4397,44 @@
                           </m:ctrlPr>
                         </m:fPr>
                         <m:num>
-                          <m:r>
-                            <a:rPr lang="en-US" altLang="zh-CN" b="0" i="0" smtClean="0">
-                              <a:latin typeface="Cambria Math" panose="02040503050406030204" pitchFamily="18" charset="0"/>
-                            </a:rPr>
-                            <m:t>1</m:t>
-                          </m:r>
+                          <m:sSup>
+                            <m:sSupPr>
+                              <m:ctrlPr>
+                                <a:rPr lang="en-US" altLang="zh-CN" b="0" i="1" smtClean="0">
+                                  <a:latin typeface="Cambria Math" panose="02040503050406030204" pitchFamily="18" charset="0"/>
+                                </a:rPr>
+                              </m:ctrlPr>
+                            </m:sSupPr>
+                            <m:e>
+                              <m:d>
+                                <m:dPr>
+                                  <m:begChr m:val="‖"/>
+                                  <m:endChr m:val="‖"/>
+                                  <m:ctrlPr>
+                                    <a:rPr lang="en-US" altLang="zh-CN" b="0" i="1" smtClean="0">
+                                      <a:latin typeface="Cambria Math" panose="02040503050406030204" pitchFamily="18" charset="0"/>
+                                    </a:rPr>
+                                  </m:ctrlPr>
+                                </m:dPr>
+                                <m:e>
+                                  <m:r>
+                                    <a:rPr lang="en-US" altLang="zh-CN" b="0" i="1" smtClean="0">
+                                      <a:latin typeface="Cambria Math" panose="02040503050406030204" pitchFamily="18" charset="0"/>
+                                    </a:rPr>
+                                    <m:t>𝜃</m:t>
+                                  </m:r>
+                                </m:e>
+                              </m:d>
+                            </m:e>
+                            <m:sup>
+                              <m:r>
+                                <a:rPr lang="en-US" altLang="zh-CN" b="0" i="1" smtClean="0">
+                                  <a:latin typeface="Cambria Math" panose="02040503050406030204" pitchFamily="18" charset="0"/>
+                                </a:rPr>
+                                <m:t>2</m:t>
+                              </m:r>
+                            </m:sup>
+                          </m:sSup>
                         </m:num>
                         <m:den>
                           <m:sSubSup>
@@ -4287,7 +4536,15 @@
                 </a14:m>
                 <a:r>
                   <a:rPr lang="zh-CN" altLang="en-US" dirty="0" smtClean="0"/>
-                  <a:t> 决定（譬如可指定为第一个点的深度），给定 </a:t>
+                  <a:t> 决定</a:t>
+                </a:r>
+                <a:r>
+                  <a:rPr lang="zh-CN" altLang="en-US" dirty="0" smtClean="0"/>
+                  <a:t>（指定</a:t>
+                </a:r>
+                <a:r>
+                  <a:rPr lang="zh-CN" altLang="en-US" dirty="0" smtClean="0"/>
+                  <a:t>为第一个点的深度），给定 </a:t>
                 </a:r>
                 <a14:m>
                   <m:oMath xmlns:m="http://schemas.openxmlformats.org/officeDocument/2006/math">
@@ -4798,7 +5055,7 @@
             </p:txBody>
           </p:sp>
         </mc:Choice>
-        <mc:Fallback xmlns="">
+        <mc:Fallback>
           <p:sp>
             <p:nvSpPr>
               <p:cNvPr id="3" name="内容占位符 2"/>
@@ -4813,7 +5070,7 @@
               <a:blipFill rotWithShape="0">
                 <a:blip r:embed="rId2"/>
                 <a:stretch>
-                  <a:fillRect t="-1515" r="-690"/>
+                  <a:fillRect t="-1515" r="-752"/>
                 </a:stretch>
               </a:blipFill>
             </p:spPr>
@@ -5107,8 +5364,8 @@
           </a:p>
         </p:txBody>
       </p:sp>
-      <mc:AlternateContent xmlns:mc="http://schemas.openxmlformats.org/markup-compatibility/2006" xmlns:a14="http://schemas.microsoft.com/office/drawing/2010/main">
-        <mc:Choice Requires="a14">
+      <mc:AlternateContent xmlns:mc="http://schemas.openxmlformats.org/markup-compatibility/2006">
+        <mc:Choice xmlns:a14="http://schemas.microsoft.com/office/drawing/2010/main" Requires="a14">
           <p:sp>
             <p:nvSpPr>
               <p:cNvPr id="3" name="内容占位符 2"/>
@@ -5303,8 +5560,95 @@
                       <a:rPr lang="en-US" altLang="zh-CN" b="0" i="1" smtClean="0">
                         <a:latin typeface="Cambria Math" panose="02040503050406030204" pitchFamily="18" charset="0"/>
                       </a:rPr>
-                      <m:t>=1</m:t>
+                      <m:t>=</m:t>
                     </m:r>
+                    <m:sSup>
+                      <m:sSupPr>
+                        <m:ctrlPr>
+                          <a:rPr lang="en-US" altLang="zh-CN" b="0" i="1" smtClean="0">
+                            <a:latin typeface="Cambria Math" panose="02040503050406030204" pitchFamily="18" charset="0"/>
+                          </a:rPr>
+                        </m:ctrlPr>
+                      </m:sSupPr>
+                      <m:e>
+                        <m:r>
+                          <a:rPr lang="en-US" altLang="zh-CN" b="0" i="1" smtClean="0">
+                            <a:latin typeface="Cambria Math" panose="02040503050406030204" pitchFamily="18" charset="0"/>
+                          </a:rPr>
+                          <m:t>𝑎</m:t>
+                        </m:r>
+                      </m:e>
+                      <m:sup>
+                        <m:r>
+                          <a:rPr lang="en-US" altLang="zh-CN" b="0" i="1" smtClean="0">
+                            <a:latin typeface="Cambria Math" panose="02040503050406030204" pitchFamily="18" charset="0"/>
+                          </a:rPr>
+                          <m:t>2</m:t>
+                        </m:r>
+                      </m:sup>
+                    </m:sSup>
+                    <m:r>
+                      <a:rPr lang="en-US" altLang="zh-CN" b="0" i="1" smtClean="0">
+                        <a:latin typeface="Cambria Math" panose="02040503050406030204" pitchFamily="18" charset="0"/>
+                      </a:rPr>
+                      <m:t>+</m:t>
+                    </m:r>
+                    <m:sSup>
+                      <m:sSupPr>
+                        <m:ctrlPr>
+                          <a:rPr lang="en-US" altLang="zh-CN" b="0" i="1" smtClean="0">
+                            <a:latin typeface="Cambria Math" panose="02040503050406030204" pitchFamily="18" charset="0"/>
+                          </a:rPr>
+                        </m:ctrlPr>
+                      </m:sSupPr>
+                      <m:e>
+                        <m:r>
+                          <a:rPr lang="en-US" altLang="zh-CN" b="0" i="1" smtClean="0">
+                            <a:latin typeface="Cambria Math" panose="02040503050406030204" pitchFamily="18" charset="0"/>
+                          </a:rPr>
+                          <m:t>𝑏</m:t>
+                        </m:r>
+                      </m:e>
+                      <m:sup>
+                        <m:r>
+                          <a:rPr lang="en-US" altLang="zh-CN" b="0" i="1" smtClean="0">
+                            <a:latin typeface="Cambria Math" panose="02040503050406030204" pitchFamily="18" charset="0"/>
+                          </a:rPr>
+                          <m:t>2</m:t>
+                        </m:r>
+                      </m:sup>
+                    </m:sSup>
+                    <m:r>
+                      <a:rPr lang="en-US" altLang="zh-CN" b="0" i="1" smtClean="0">
+                        <a:latin typeface="Cambria Math" panose="02040503050406030204" pitchFamily="18" charset="0"/>
+                      </a:rPr>
+                      <m:t>+</m:t>
+                    </m:r>
+                    <m:sSup>
+                      <m:sSupPr>
+                        <m:ctrlPr>
+                          <a:rPr lang="en-US" altLang="zh-CN" b="0" i="1" smtClean="0">
+                            <a:latin typeface="Cambria Math" panose="02040503050406030204" pitchFamily="18" charset="0"/>
+                          </a:rPr>
+                        </m:ctrlPr>
+                      </m:sSupPr>
+                      <m:e>
+                        <m:r>
+                          <a:rPr lang="en-US" altLang="zh-CN" b="0" i="1" smtClean="0">
+                            <a:latin typeface="Cambria Math" panose="02040503050406030204" pitchFamily="18" charset="0"/>
+                          </a:rPr>
+                          <m:t>𝑐</m:t>
+                        </m:r>
+                      </m:e>
+                      <m:sup>
+                        <m:r>
+                          <a:rPr lang="en-US" altLang="zh-CN" b="0" i="1" smtClean="0">
+                            <a:latin typeface="Cambria Math" panose="02040503050406030204" pitchFamily="18" charset="0"/>
+                          </a:rPr>
+                          <m:t>2</m:t>
+                        </m:r>
+                      </m:sup>
+                    </m:sSup>
                   </m:oMath>
                 </a14:m>
                 <a:r>
@@ -5777,7 +6121,7 @@
             </p:txBody>
           </p:sp>
         </mc:Choice>
-        <mc:Fallback xmlns="">
+        <mc:Fallback>
           <p:sp>
             <p:nvSpPr>
               <p:cNvPr id="3" name="内容占位符 2"/>
@@ -7233,8 +7577,8 @@
           </a:p>
         </p:txBody>
       </p:sp>
-      <mc:AlternateContent xmlns:mc="http://schemas.openxmlformats.org/markup-compatibility/2006" xmlns:a14="http://schemas.microsoft.com/office/drawing/2010/main">
-        <mc:Choice Requires="a14">
+      <mc:AlternateContent xmlns:mc="http://schemas.openxmlformats.org/markup-compatibility/2006">
+        <mc:Choice xmlns:a14="http://schemas.microsoft.com/office/drawing/2010/main" Requires="a14">
           <p:sp>
             <p:nvSpPr>
               <p:cNvPr id="3" name="内容占位符 2"/>
@@ -7567,7 +7911,7 @@
                           <a:rPr lang="en-US" altLang="zh-CN" b="0" i="1" smtClean="0">
                             <a:latin typeface="Cambria Math" panose="02040503050406030204" pitchFamily="18" charset="0"/>
                           </a:rPr>
-                          <m:t>𝑠𝑚𝑜𝑜𝑡h</m:t>
+                          <m:t>𝑜𝑟𝑖𝑒𝑛𝑡𝑐𝑜𝑛𝑠</m:t>
                         </m:r>
                       </m:sub>
                     </m:sSub>
@@ -7662,10 +8006,10 @@
                       </m:e>
                       <m:sub>
                         <m:r>
-                          <a:rPr lang="en-US" altLang="zh-CN" b="0" i="1" smtClean="0">
-                            <a:latin typeface="Cambria Math" panose="02040503050406030204" pitchFamily="18" charset="0"/>
-                          </a:rPr>
-                          <m:t>𝑠𝑚𝑜𝑜𝑡h</m:t>
+                          <a:rPr lang="en-US" altLang="zh-CN" i="1">
+                            <a:latin typeface="Cambria Math" panose="02040503050406030204" pitchFamily="18" charset="0"/>
+                          </a:rPr>
+                          <m:t>𝑜𝑟𝑖𝑒𝑛𝑡𝑐𝑜𝑛𝑠</m:t>
                         </m:r>
                       </m:sub>
                     </m:sSub>
@@ -7834,10 +8178,10 @@
                               </m:e>
                               <m:sub>
                                 <m:r>
-                                  <a:rPr lang="en-US" altLang="zh-CN" b="0" i="1" smtClean="0">
+                                  <a:rPr lang="en-US" altLang="zh-CN" i="1">
                                     <a:latin typeface="Cambria Math" panose="02040503050406030204" pitchFamily="18" charset="0"/>
                                   </a:rPr>
-                                  <m:t>𝑠𝑚𝑜𝑜𝑡h</m:t>
+                                  <m:t>𝑜𝑟𝑖𝑒𝑛𝑡𝑐𝑜𝑛𝑠</m:t>
                                 </m:r>
                               </m:sub>
                             </m:sSub>
@@ -7927,10 +8271,10 @@
                           </m:e>
                           <m:sub>
                             <m:r>
-                              <a:rPr lang="en-US" altLang="zh-CN" b="0" i="1" smtClean="0">
-                                <a:latin typeface="Cambria Math" panose="02040503050406030204" pitchFamily="18" charset="0"/>
-                              </a:rPr>
-                              <m:t>𝑠𝑚𝑜𝑜𝑡h</m:t>
+                              <a:rPr lang="en-US" altLang="zh-CN" i="1">
+                                <a:latin typeface="Cambria Math" panose="02040503050406030204" pitchFamily="18" charset="0"/>
+                              </a:rPr>
+                              <m:t>𝑜𝑟𝑖𝑒𝑛𝑡𝑐𝑜𝑛𝑠</m:t>
                             </m:r>
                           </m:sub>
                         </m:sSub>
@@ -8289,63 +8633,215 @@
                         </m:r>
                       </m:sub>
                     </m:sSub>
-                    <m:func>
-                      <m:funcPr>
+                    <m:d>
+                      <m:dPr>
                         <m:ctrlPr>
                           <a:rPr lang="en-US" altLang="zh-CN" b="0" i="1" smtClean="0">
                             <a:latin typeface="Cambria Math" panose="02040503050406030204" pitchFamily="18" charset="0"/>
                           </a:rPr>
                         </m:ctrlPr>
-                      </m:funcPr>
-                      <m:fName>
-                        <m:r>
-                          <m:rPr>
-                            <m:sty m:val="p"/>
-                          </m:rPr>
-                          <a:rPr lang="en-US" altLang="zh-CN" b="0" i="0" smtClean="0">
-                            <a:latin typeface="Cambria Math" panose="02040503050406030204" pitchFamily="18" charset="0"/>
-                          </a:rPr>
-                          <m:t>max</m:t>
-                        </m:r>
-                      </m:fName>
+                      </m:dPr>
                       <m:e>
+                        <m:r>
+                          <a:rPr lang="en-US" altLang="zh-CN" i="1">
+                            <a:latin typeface="Cambria Math" panose="02040503050406030204" pitchFamily="18" charset="0"/>
+                          </a:rPr>
+                          <m:t>𝑂𝑣𝑒𝑟𝑙𝑎𝑝</m:t>
+                        </m:r>
                         <m:d>
                           <m:dPr>
-                            <m:begChr m:val="{"/>
-                            <m:endChr m:val="}"/>
                             <m:ctrlPr>
-                              <a:rPr lang="en-US" altLang="zh-CN" b="0" i="1" smtClean="0">
+                              <a:rPr lang="en-US" altLang="zh-CN" i="1">
                                 <a:latin typeface="Cambria Math" panose="02040503050406030204" pitchFamily="18" charset="0"/>
                               </a:rPr>
                             </m:ctrlPr>
                           </m:dPr>
                           <m:e>
-                            <m:r>
-                              <a:rPr lang="en-US" altLang="zh-CN" i="1">
-                                <a:latin typeface="Cambria Math" panose="02040503050406030204" pitchFamily="18" charset="0"/>
-                              </a:rPr>
-                              <m:t>𝑂𝑣𝑒𝑟𝑙𝑎𝑝</m:t>
-                            </m:r>
-                            <m:d>
-                              <m:dPr>
+                            <m:sSub>
+                              <m:sSubPr>
                                 <m:ctrlPr>
                                   <a:rPr lang="en-US" altLang="zh-CN" i="1">
                                     <a:latin typeface="Cambria Math" panose="02040503050406030204" pitchFamily="18" charset="0"/>
                                   </a:rPr>
                                 </m:ctrlPr>
-                              </m:dPr>
+                              </m:sSubPr>
                               <m:e>
+                                <m:r>
+                                  <a:rPr lang="en-US" altLang="zh-CN" i="1">
+                                    <a:latin typeface="Cambria Math" panose="02040503050406030204" pitchFamily="18" charset="0"/>
+                                  </a:rPr>
+                                  <m:t>𝑟</m:t>
+                                </m:r>
+                              </m:e>
+                              <m:sub>
+                                <m:r>
+                                  <a:rPr lang="en-US" altLang="zh-CN" i="1">
+                                    <a:latin typeface="Cambria Math" panose="02040503050406030204" pitchFamily="18" charset="0"/>
+                                  </a:rPr>
+                                  <m:t>𝑖</m:t>
+                                </m:r>
+                              </m:sub>
+                            </m:sSub>
+                            <m:r>
+                              <a:rPr lang="en-US" altLang="zh-CN" i="1">
+                                <a:latin typeface="Cambria Math" panose="02040503050406030204" pitchFamily="18" charset="0"/>
+                              </a:rPr>
+                              <m:t>,</m:t>
+                            </m:r>
+                            <m:sSub>
+                              <m:sSubPr>
+                                <m:ctrlPr>
+                                  <a:rPr lang="en-US" altLang="zh-CN" i="1">
+                                    <a:latin typeface="Cambria Math" panose="02040503050406030204" pitchFamily="18" charset="0"/>
+                                  </a:rPr>
+                                </m:ctrlPr>
+                              </m:sSubPr>
+                              <m:e>
+                                <m:r>
+                                  <a:rPr lang="en-US" altLang="zh-CN" i="1">
+                                    <a:latin typeface="Cambria Math" panose="02040503050406030204" pitchFamily="18" charset="0"/>
+                                  </a:rPr>
+                                  <m:t>𝑟</m:t>
+                                </m:r>
+                              </m:e>
+                              <m:sub>
+                                <m:r>
+                                  <a:rPr lang="en-US" altLang="zh-CN" i="1">
+                                    <a:latin typeface="Cambria Math" panose="02040503050406030204" pitchFamily="18" charset="0"/>
+                                  </a:rPr>
+                                  <m:t>𝑗</m:t>
+                                </m:r>
+                              </m:sub>
+                            </m:sSub>
+                          </m:e>
+                        </m:d>
+                        <m:r>
+                          <a:rPr lang="en-US" altLang="zh-CN" b="0" i="1" smtClean="0">
+                            <a:latin typeface="Cambria Math" panose="02040503050406030204" pitchFamily="18" charset="0"/>
+                          </a:rPr>
+                          <m:t>+</m:t>
+                        </m:r>
+                        <m:r>
+                          <a:rPr lang="en-US" altLang="zh-CN" i="1">
+                            <a:latin typeface="Cambria Math" panose="02040503050406030204" pitchFamily="18" charset="0"/>
+                          </a:rPr>
+                          <m:t>𝑂𝑣𝑒𝑟𝑙𝑎𝑝</m:t>
+                        </m:r>
+                        <m:d>
+                          <m:dPr>
+                            <m:ctrlPr>
+                              <a:rPr lang="en-US" altLang="zh-CN" i="1">
+                                <a:latin typeface="Cambria Math" panose="02040503050406030204" pitchFamily="18" charset="0"/>
+                              </a:rPr>
+                            </m:ctrlPr>
+                          </m:dPr>
+                          <m:e>
+                            <m:sSub>
+                              <m:sSubPr>
+                                <m:ctrlPr>
+                                  <a:rPr lang="en-US" altLang="zh-CN" i="1">
+                                    <a:latin typeface="Cambria Math" panose="02040503050406030204" pitchFamily="18" charset="0"/>
+                                  </a:rPr>
+                                </m:ctrlPr>
+                              </m:sSubPr>
+                              <m:e>
+                                <m:r>
+                                  <a:rPr lang="en-US" altLang="zh-CN" i="1">
+                                    <a:latin typeface="Cambria Math" panose="02040503050406030204" pitchFamily="18" charset="0"/>
+                                  </a:rPr>
+                                  <m:t>𝑟</m:t>
+                                </m:r>
+                              </m:e>
+                              <m:sub>
+                                <m:r>
+                                  <a:rPr lang="en-US" altLang="zh-CN" i="1">
+                                    <a:latin typeface="Cambria Math" panose="02040503050406030204" pitchFamily="18" charset="0"/>
+                                  </a:rPr>
+                                  <m:t>𝑗</m:t>
+                                </m:r>
+                              </m:sub>
+                            </m:sSub>
+                            <m:r>
+                              <a:rPr lang="en-US" altLang="zh-CN" i="1">
+                                <a:latin typeface="Cambria Math" panose="02040503050406030204" pitchFamily="18" charset="0"/>
+                              </a:rPr>
+                              <m:t>,</m:t>
+                            </m:r>
+                            <m:sSub>
+                              <m:sSubPr>
+                                <m:ctrlPr>
+                                  <a:rPr lang="en-US" altLang="zh-CN" i="1">
+                                    <a:latin typeface="Cambria Math" panose="02040503050406030204" pitchFamily="18" charset="0"/>
+                                  </a:rPr>
+                                </m:ctrlPr>
+                              </m:sSubPr>
+                              <m:e>
+                                <m:r>
+                                  <a:rPr lang="en-US" altLang="zh-CN" i="1">
+                                    <a:latin typeface="Cambria Math" panose="02040503050406030204" pitchFamily="18" charset="0"/>
+                                  </a:rPr>
+                                  <m:t>𝑟</m:t>
+                                </m:r>
+                              </m:e>
+                              <m:sub>
+                                <m:r>
+                                  <a:rPr lang="en-US" altLang="zh-CN" i="1">
+                                    <a:latin typeface="Cambria Math" panose="02040503050406030204" pitchFamily="18" charset="0"/>
+                                  </a:rPr>
+                                  <m:t>𝑖</m:t>
+                                </m:r>
+                              </m:sub>
+                            </m:sSub>
+                          </m:e>
+                        </m:d>
+                      </m:e>
+                    </m:d>
+                    <m:sSup>
+                      <m:sSupPr>
+                        <m:ctrlPr>
+                          <a:rPr lang="en-US" altLang="zh-CN" b="0" i="1" smtClean="0">
+                            <a:latin typeface="Cambria Math" panose="02040503050406030204" pitchFamily="18" charset="0"/>
+                          </a:rPr>
+                        </m:ctrlPr>
+                      </m:sSupPr>
+                      <m:e>
+                        <m:d>
+                          <m:dPr>
+                            <m:ctrlPr>
+                              <a:rPr lang="en-US" altLang="zh-CN" b="0" i="1" smtClean="0">
+                                <a:latin typeface="Cambria Math" panose="02040503050406030204" pitchFamily="18" charset="0"/>
+                              </a:rPr>
+                            </m:ctrlPr>
+                          </m:dPr>
+                          <m:e>
+                            <m:sSub>
+                              <m:sSubPr>
+                                <m:ctrlPr>
+                                  <a:rPr lang="en-US" altLang="zh-CN" b="0" i="1" smtClean="0">
+                                    <a:latin typeface="Cambria Math" panose="02040503050406030204" pitchFamily="18" charset="0"/>
+                                  </a:rPr>
+                                </m:ctrlPr>
+                              </m:sSubPr>
+                              <m:e>
+                                <m:r>
+                                  <a:rPr lang="en-US" altLang="zh-CN" b="0" i="1" smtClean="0">
+                                    <a:latin typeface="Cambria Math" panose="02040503050406030204" pitchFamily="18" charset="0"/>
+                                  </a:rPr>
+                                  <m:t>𝜃</m:t>
+                                </m:r>
+                              </m:e>
+                              <m:sub>
                                 <m:sSub>
                                   <m:sSubPr>
                                     <m:ctrlPr>
-                                      <a:rPr lang="en-US" altLang="zh-CN" i="1">
+                                      <a:rPr lang="en-US" altLang="zh-CN" b="0" i="1" smtClean="0">
                                         <a:latin typeface="Cambria Math" panose="02040503050406030204" pitchFamily="18" charset="0"/>
                                       </a:rPr>
                                     </m:ctrlPr>
                                   </m:sSubPr>
                                   <m:e>
                                     <m:r>
-                                      <a:rPr lang="en-US" altLang="zh-CN" i="1">
+                                      <a:rPr lang="en-US" altLang="zh-CN" b="0" i="1" smtClean="0">
                                         <a:latin typeface="Cambria Math" panose="02040503050406030204" pitchFamily="18" charset="0"/>
                                       </a:rPr>
                                       <m:t>𝑟</m:t>
@@ -8353,30 +8849,49 @@
                                   </m:e>
                                   <m:sub>
                                     <m:r>
-                                      <a:rPr lang="en-US" altLang="zh-CN" i="1">
+                                      <a:rPr lang="en-US" altLang="zh-CN" b="0" i="1" smtClean="0">
                                         <a:latin typeface="Cambria Math" panose="02040503050406030204" pitchFamily="18" charset="0"/>
                                       </a:rPr>
                                       <m:t>𝑖</m:t>
                                     </m:r>
                                   </m:sub>
                                 </m:sSub>
-                                <m:r>
-                                  <a:rPr lang="en-US" altLang="zh-CN" i="1">
+                              </m:sub>
+                            </m:sSub>
+                            <m:r>
+                              <a:rPr lang="en-US" altLang="zh-CN" b="0" i="1" smtClean="0">
+                                <a:latin typeface="Cambria Math" panose="02040503050406030204" pitchFamily="18" charset="0"/>
+                              </a:rPr>
+                              <m:t>−</m:t>
+                            </m:r>
+                            <m:sSub>
+                              <m:sSubPr>
+                                <m:ctrlPr>
+                                  <a:rPr lang="en-US" altLang="zh-CN" b="0" i="1" smtClean="0">
                                     <a:latin typeface="Cambria Math" panose="02040503050406030204" pitchFamily="18" charset="0"/>
                                   </a:rPr>
-                                  <m:t>,</m:t>
+                                </m:ctrlPr>
+                              </m:sSubPr>
+                              <m:e>
+                                <m:r>
+                                  <a:rPr lang="en-US" altLang="zh-CN" b="0" i="1" smtClean="0">
+                                    <a:latin typeface="Cambria Math" panose="02040503050406030204" pitchFamily="18" charset="0"/>
+                                  </a:rPr>
+                                  <m:t>𝜃</m:t>
                                 </m:r>
+                              </m:e>
+                              <m:sub>
                                 <m:sSub>
                                   <m:sSubPr>
                                     <m:ctrlPr>
-                                      <a:rPr lang="en-US" altLang="zh-CN" i="1">
+                                      <a:rPr lang="en-US" altLang="zh-CN" b="0" i="1" smtClean="0">
                                         <a:latin typeface="Cambria Math" panose="02040503050406030204" pitchFamily="18" charset="0"/>
                                       </a:rPr>
                                     </m:ctrlPr>
                                   </m:sSubPr>
                                   <m:e>
                                     <m:r>
-                                      <a:rPr lang="en-US" altLang="zh-CN" i="1">
+                                      <a:rPr lang="en-US" altLang="zh-CN" b="0" i="1" smtClean="0">
                                         <a:latin typeface="Cambria Math" panose="02040503050406030204" pitchFamily="18" charset="0"/>
                                       </a:rPr>
                                       <m:t>𝑟</m:t>
@@ -8384,285 +8899,27 @@
                                   </m:e>
                                   <m:sub>
                                     <m:r>
-                                      <a:rPr lang="en-US" altLang="zh-CN" i="1">
+                                      <a:rPr lang="en-US" altLang="zh-CN" b="0" i="1" smtClean="0">
                                         <a:latin typeface="Cambria Math" panose="02040503050406030204" pitchFamily="18" charset="0"/>
                                       </a:rPr>
                                       <m:t>𝑗</m:t>
                                     </m:r>
                                   </m:sub>
                                 </m:sSub>
-                              </m:e>
-                            </m:d>
-                            <m:r>
-                              <a:rPr lang="en-US" altLang="zh-CN" b="0" i="1" smtClean="0">
-                                <a:latin typeface="Cambria Math" panose="02040503050406030204" pitchFamily="18" charset="0"/>
-                              </a:rPr>
-                              <m:t>,</m:t>
-                            </m:r>
-                            <m:r>
-                              <a:rPr lang="en-US" altLang="zh-CN" i="1">
-                                <a:latin typeface="Cambria Math" panose="02040503050406030204" pitchFamily="18" charset="0"/>
-                              </a:rPr>
-                              <m:t>𝑂𝑣𝑒𝑟𝑙𝑎𝑝</m:t>
-                            </m:r>
-                            <m:d>
-                              <m:dPr>
-                                <m:ctrlPr>
-                                  <a:rPr lang="en-US" altLang="zh-CN" i="1">
-                                    <a:latin typeface="Cambria Math" panose="02040503050406030204" pitchFamily="18" charset="0"/>
-                                  </a:rPr>
-                                </m:ctrlPr>
-                              </m:dPr>
-                              <m:e>
-                                <m:sSub>
-                                  <m:sSubPr>
-                                    <m:ctrlPr>
-                                      <a:rPr lang="en-US" altLang="zh-CN" i="1">
-                                        <a:latin typeface="Cambria Math" panose="02040503050406030204" pitchFamily="18" charset="0"/>
-                                      </a:rPr>
-                                    </m:ctrlPr>
-                                  </m:sSubPr>
-                                  <m:e>
-                                    <m:r>
-                                      <a:rPr lang="en-US" altLang="zh-CN" i="1">
-                                        <a:latin typeface="Cambria Math" panose="02040503050406030204" pitchFamily="18" charset="0"/>
-                                      </a:rPr>
-                                      <m:t>𝑟</m:t>
-                                    </m:r>
-                                  </m:e>
-                                  <m:sub>
-                                    <m:r>
-                                      <a:rPr lang="en-US" altLang="zh-CN" i="1">
-                                        <a:latin typeface="Cambria Math" panose="02040503050406030204" pitchFamily="18" charset="0"/>
-                                      </a:rPr>
-                                      <m:t>𝑗</m:t>
-                                    </m:r>
-                                  </m:sub>
-                                </m:sSub>
-                                <m:r>
-                                  <a:rPr lang="en-US" altLang="zh-CN" i="1">
-                                    <a:latin typeface="Cambria Math" panose="02040503050406030204" pitchFamily="18" charset="0"/>
-                                  </a:rPr>
-                                  <m:t>,</m:t>
-                                </m:r>
-                                <m:sSub>
-                                  <m:sSubPr>
-                                    <m:ctrlPr>
-                                      <a:rPr lang="en-US" altLang="zh-CN" i="1">
-                                        <a:latin typeface="Cambria Math" panose="02040503050406030204" pitchFamily="18" charset="0"/>
-                                      </a:rPr>
-                                    </m:ctrlPr>
-                                  </m:sSubPr>
-                                  <m:e>
-                                    <m:r>
-                                      <a:rPr lang="en-US" altLang="zh-CN" i="1">
-                                        <a:latin typeface="Cambria Math" panose="02040503050406030204" pitchFamily="18" charset="0"/>
-                                      </a:rPr>
-                                      <m:t>𝑟</m:t>
-                                    </m:r>
-                                  </m:e>
-                                  <m:sub>
-                                    <m:r>
-                                      <a:rPr lang="en-US" altLang="zh-CN" i="1">
-                                        <a:latin typeface="Cambria Math" panose="02040503050406030204" pitchFamily="18" charset="0"/>
-                                      </a:rPr>
-                                      <m:t>𝑖</m:t>
-                                    </m:r>
-                                  </m:sub>
-                                </m:sSub>
-                              </m:e>
-                            </m:d>
+                              </m:sub>
+                            </m:sSub>
                           </m:e>
                         </m:d>
                       </m:e>
-                    </m:func>
-                    <m:d>
-                      <m:dPr>
-                        <m:ctrlPr>
-                          <a:rPr lang="en-US" altLang="zh-CN" b="0" i="1" smtClean="0">
-                            <a:latin typeface="Cambria Math" panose="02040503050406030204" pitchFamily="18" charset="0"/>
-                          </a:rPr>
-                        </m:ctrlPr>
-                      </m:dPr>
-                      <m:e>
-                        <m:f>
-                          <m:fPr>
-                            <m:ctrlPr>
-                              <a:rPr lang="en-US" altLang="zh-CN" b="0" i="1" smtClean="0">
-                                <a:latin typeface="Cambria Math" panose="02040503050406030204" pitchFamily="18" charset="0"/>
-                              </a:rPr>
-                            </m:ctrlPr>
-                          </m:fPr>
-                          <m:num>
-                            <m:r>
-                              <a:rPr lang="en-US" altLang="zh-CN" i="1">
-                                <a:latin typeface="Cambria Math" panose="02040503050406030204" pitchFamily="18" charset="0"/>
-                              </a:rPr>
-                              <m:t>∠</m:t>
-                            </m:r>
-                            <m:sSup>
-                              <m:sSupPr>
-                                <m:ctrlPr>
-                                  <a:rPr lang="en-US" altLang="zh-CN" b="0" i="1" smtClean="0">
-                                    <a:latin typeface="Cambria Math" panose="02040503050406030204" pitchFamily="18" charset="0"/>
-                                  </a:rPr>
-                                </m:ctrlPr>
-                              </m:sSupPr>
-                              <m:e>
-                                <m:d>
-                                  <m:dPr>
-                                    <m:ctrlPr>
-                                      <a:rPr lang="en-US" altLang="zh-CN" b="0" i="1" smtClean="0">
-                                        <a:latin typeface="Cambria Math" panose="02040503050406030204" pitchFamily="18" charset="0"/>
-                                      </a:rPr>
-                                    </m:ctrlPr>
-                                  </m:dPr>
-                                  <m:e>
-                                    <m:sSub>
-                                      <m:sSubPr>
-                                        <m:ctrlPr>
-                                          <a:rPr lang="en-US" altLang="zh-CN" b="0" i="1" smtClean="0">
-                                            <a:latin typeface="Cambria Math" panose="02040503050406030204" pitchFamily="18" charset="0"/>
-                                          </a:rPr>
-                                        </m:ctrlPr>
-                                      </m:sSubPr>
-                                      <m:e>
-                                        <m:r>
-                                          <a:rPr lang="en-US" altLang="zh-CN" b="0" i="1" smtClean="0">
-                                            <a:latin typeface="Cambria Math" panose="02040503050406030204" pitchFamily="18" charset="0"/>
-                                          </a:rPr>
-                                          <m:t>𝑛</m:t>
-                                        </m:r>
-                                      </m:e>
-                                      <m:sub>
-                                        <m:sSub>
-                                          <m:sSubPr>
-                                            <m:ctrlPr>
-                                              <a:rPr lang="en-US" altLang="zh-CN" b="0" i="1" smtClean="0">
-                                                <a:latin typeface="Cambria Math" panose="02040503050406030204" pitchFamily="18" charset="0"/>
-                                              </a:rPr>
-                                            </m:ctrlPr>
-                                          </m:sSubPr>
-                                          <m:e>
-                                            <m:r>
-                                              <a:rPr lang="en-US" altLang="zh-CN" b="0" i="1" smtClean="0">
-                                                <a:latin typeface="Cambria Math" panose="02040503050406030204" pitchFamily="18" charset="0"/>
-                                              </a:rPr>
-                                              <m:t>𝑟</m:t>
-                                            </m:r>
-                                          </m:e>
-                                          <m:sub>
-                                            <m:r>
-                                              <a:rPr lang="en-US" altLang="zh-CN" b="0" i="1" smtClean="0">
-                                                <a:latin typeface="Cambria Math" panose="02040503050406030204" pitchFamily="18" charset="0"/>
-                                              </a:rPr>
-                                              <m:t>𝑖</m:t>
-                                            </m:r>
-                                          </m:sub>
-                                        </m:sSub>
-                                      </m:sub>
-                                    </m:sSub>
-                                    <m:r>
-                                      <a:rPr lang="en-US" altLang="zh-CN" b="0" i="1" smtClean="0">
-                                        <a:latin typeface="Cambria Math" panose="02040503050406030204" pitchFamily="18" charset="0"/>
-                                      </a:rPr>
-                                      <m:t>,</m:t>
-                                    </m:r>
-                                    <m:sSub>
-                                      <m:sSubPr>
-                                        <m:ctrlPr>
-                                          <a:rPr lang="en-US" altLang="zh-CN" b="0" i="1" smtClean="0">
-                                            <a:latin typeface="Cambria Math" panose="02040503050406030204" pitchFamily="18" charset="0"/>
-                                          </a:rPr>
-                                        </m:ctrlPr>
-                                      </m:sSubPr>
-                                      <m:e>
-                                        <m:r>
-                                          <a:rPr lang="en-US" altLang="zh-CN" b="0" i="1" smtClean="0">
-                                            <a:latin typeface="Cambria Math" panose="02040503050406030204" pitchFamily="18" charset="0"/>
-                                          </a:rPr>
-                                          <m:t>𝑛</m:t>
-                                        </m:r>
-                                      </m:e>
-                                      <m:sub>
-                                        <m:sSub>
-                                          <m:sSubPr>
-                                            <m:ctrlPr>
-                                              <a:rPr lang="en-US" altLang="zh-CN" b="0" i="1" smtClean="0">
-                                                <a:latin typeface="Cambria Math" panose="02040503050406030204" pitchFamily="18" charset="0"/>
-                                              </a:rPr>
-                                            </m:ctrlPr>
-                                          </m:sSubPr>
-                                          <m:e>
-                                            <m:r>
-                                              <a:rPr lang="en-US" altLang="zh-CN" b="0" i="1" smtClean="0">
-                                                <a:latin typeface="Cambria Math" panose="02040503050406030204" pitchFamily="18" charset="0"/>
-                                              </a:rPr>
-                                              <m:t>𝑟</m:t>
-                                            </m:r>
-                                          </m:e>
-                                          <m:sub>
-                                            <m:r>
-                                              <a:rPr lang="en-US" altLang="zh-CN" b="0" i="1" smtClean="0">
-                                                <a:latin typeface="Cambria Math" panose="02040503050406030204" pitchFamily="18" charset="0"/>
-                                              </a:rPr>
-                                              <m:t>𝑗</m:t>
-                                            </m:r>
-                                          </m:sub>
-                                        </m:sSub>
-                                      </m:sub>
-                                    </m:sSub>
-                                  </m:e>
-                                </m:d>
-                              </m:e>
-                              <m:sup>
-                                <m:r>
-                                  <a:rPr lang="en-US" altLang="zh-CN" b="0" i="1" smtClean="0">
-                                    <a:latin typeface="Cambria Math" panose="02040503050406030204" pitchFamily="18" charset="0"/>
-                                  </a:rPr>
-                                  <m:t>2</m:t>
-                                </m:r>
-                              </m:sup>
-                            </m:sSup>
-                          </m:num>
-                          <m:den>
-                            <m:sSubSup>
-                              <m:sSubSupPr>
-                                <m:ctrlPr>
-                                  <a:rPr lang="en-US" altLang="zh-CN" b="0" i="1" smtClean="0">
-                                    <a:latin typeface="Cambria Math" panose="02040503050406030204" pitchFamily="18" charset="0"/>
-                                  </a:rPr>
-                                </m:ctrlPr>
-                              </m:sSubSupPr>
-                              <m:e>
-                                <m:r>
-                                  <a:rPr lang="en-US" altLang="zh-CN" b="0" i="1" smtClean="0">
-                                    <a:latin typeface="Cambria Math" panose="02040503050406030204" pitchFamily="18" charset="0"/>
-                                  </a:rPr>
-                                  <m:t>𝜎</m:t>
-                                </m:r>
-                              </m:e>
-                              <m:sub>
-                                <m:r>
-                                  <a:rPr lang="en-US" altLang="zh-CN" b="0" i="1" smtClean="0">
-                                    <a:latin typeface="Cambria Math" panose="02040503050406030204" pitchFamily="18" charset="0"/>
-                                  </a:rPr>
-                                  <m:t>𝑜𝑣𝑒𝑟𝑙𝑎𝑝</m:t>
-                                </m:r>
-                              </m:sub>
-                              <m:sup>
-                                <m:r>
-                                  <a:rPr lang="en-US" altLang="zh-CN" b="0" i="1" smtClean="0">
-                                    <a:latin typeface="Cambria Math" panose="02040503050406030204" pitchFamily="18" charset="0"/>
-                                  </a:rPr>
-                                  <m:t>2</m:t>
-                                </m:r>
-                              </m:sup>
-                            </m:sSubSup>
-                          </m:den>
-                        </m:f>
-                      </m:e>
-                    </m:d>
+                      <m:sup>
+                        <m:r>
+                          <a:rPr lang="en-US" altLang="zh-CN" b="0" i="1" smtClean="0">
+                            <a:latin typeface="Cambria Math" panose="02040503050406030204" pitchFamily="18" charset="0"/>
+                          </a:rPr>
+                          <m:t>2</m:t>
+                        </m:r>
+                      </m:sup>
+                    </m:sSup>
                   </m:oMath>
                 </a14:m>
                 <a:endParaRPr lang="en-US" altLang="zh-CN" dirty="0" smtClean="0"/>
@@ -8679,9 +8936,9 @@
                 <a:endParaRPr lang="en-US" altLang="zh-CN" dirty="0" smtClean="0"/>
               </a:p>
               <a:p>
-                <a:endParaRPr lang="en-US" altLang="zh-CN" dirty="0" smtClean="0"/>
-              </a:p>
-              <a:p>
+                <a:pPr marL="0" indent="0">
+                  <a:buNone/>
+                </a:pPr>
                 <a:endParaRPr lang="en-US" altLang="zh-CN" dirty="0" smtClean="0"/>
               </a:p>
               <a:p>
@@ -8693,7 +8950,7 @@
             </p:txBody>
           </p:sp>
         </mc:Choice>
-        <mc:Fallback xmlns="">
+        <mc:Fallback>
           <p:sp>
             <p:nvSpPr>
               <p:cNvPr id="3" name="内容占位符 2"/>
@@ -9527,6 +9784,7 @@
                       <m:sSubPr>
                         <m:ctrlPr>
                           <a:rPr lang="en-US" altLang="zh-CN" b="0" i="1" smtClean="0">
+                            <a:effectLst/>
                             <a:latin typeface="Cambria Math" panose="02040503050406030204" pitchFamily="18" charset="0"/>
                           </a:rPr>
                         </m:ctrlPr>
@@ -9534,6 +9792,7 @@
                       <m:e>
                         <m:r>
                           <a:rPr lang="en-US" altLang="zh-CN" b="0" i="1" smtClean="0">
+                            <a:effectLst/>
                             <a:latin typeface="Cambria Math" panose="02040503050406030204" pitchFamily="18" charset="0"/>
                           </a:rPr>
                           <m:t>𝐸</m:t>
@@ -9542,6 +9801,7 @@
                       <m:sub>
                         <m:r>
                           <a:rPr lang="en-US" altLang="zh-CN" b="0" i="1" smtClean="0">
+                            <a:effectLst/>
                             <a:latin typeface="Cambria Math" panose="02040503050406030204" pitchFamily="18" charset="0"/>
                           </a:rPr>
                           <m:t>𝑐𝑜𝑛𝑛𝑒𝑐𝑡</m:t>
@@ -9552,6 +9812,7 @@
                       <m:dPr>
                         <m:ctrlPr>
                           <a:rPr lang="en-US" altLang="zh-CN" b="0" i="1" smtClean="0">
+                            <a:effectLst/>
                             <a:latin typeface="Cambria Math" panose="02040503050406030204" pitchFamily="18" charset="0"/>
                           </a:rPr>
                         </m:ctrlPr>
@@ -9561,6 +9822,7 @@
                           <m:sSubPr>
                             <m:ctrlPr>
                               <a:rPr lang="en-US" altLang="zh-CN" b="0" i="1" smtClean="0">
+                                <a:effectLst/>
                                 <a:latin typeface="Cambria Math" panose="02040503050406030204" pitchFamily="18" charset="0"/>
                               </a:rPr>
                             </m:ctrlPr>
@@ -9568,6 +9830,7 @@
                           <m:e>
                             <m:r>
                               <a:rPr lang="en-US" altLang="zh-CN" b="0" i="1" smtClean="0">
+                                <a:effectLst/>
                                 <a:latin typeface="Cambria Math" panose="02040503050406030204" pitchFamily="18" charset="0"/>
                               </a:rPr>
                               <m:t>𝑟</m:t>
@@ -9576,6 +9839,7 @@
                           <m:sub>
                             <m:r>
                               <a:rPr lang="en-US" altLang="zh-CN" b="0" i="1" smtClean="0">
+                                <a:effectLst/>
                                 <a:latin typeface="Cambria Math" panose="02040503050406030204" pitchFamily="18" charset="0"/>
                               </a:rPr>
                               <m:t>𝑖</m:t>
@@ -9584,6 +9848,7 @@
                         </m:sSub>
                         <m:r>
                           <a:rPr lang="en-US" altLang="zh-CN" b="0" i="1" smtClean="0">
+                            <a:effectLst/>
                             <a:latin typeface="Cambria Math" panose="02040503050406030204" pitchFamily="18" charset="0"/>
                           </a:rPr>
                           <m:t>,</m:t>
@@ -9592,6 +9857,7 @@
                           <m:sSubPr>
                             <m:ctrlPr>
                               <a:rPr lang="en-US" altLang="zh-CN" b="0" i="1" smtClean="0">
+                                <a:effectLst/>
                                 <a:latin typeface="Cambria Math" panose="02040503050406030204" pitchFamily="18" charset="0"/>
                               </a:rPr>
                             </m:ctrlPr>
@@ -9599,6 +9865,7 @@
                           <m:e>
                             <m:r>
                               <a:rPr lang="en-US" altLang="zh-CN" b="0" i="1" smtClean="0">
+                                <a:effectLst/>
                                 <a:latin typeface="Cambria Math" panose="02040503050406030204" pitchFamily="18" charset="0"/>
                               </a:rPr>
                               <m:t>𝑟</m:t>
@@ -9607,6 +9874,7 @@
                           <m:sub>
                             <m:r>
                               <a:rPr lang="en-US" altLang="zh-CN" b="0" i="1" smtClean="0">
+                                <a:effectLst/>
                                 <a:latin typeface="Cambria Math" panose="02040503050406030204" pitchFamily="18" charset="0"/>
                               </a:rPr>
                               <m:t>𝑗</m:t>
@@ -9617,6 +9885,7 @@
                     </m:d>
                     <m:r>
                       <a:rPr lang="en-US" altLang="zh-CN" b="0" i="1" smtClean="0">
+                        <a:effectLst/>
                         <a:latin typeface="Cambria Math" panose="02040503050406030204" pitchFamily="18" charset="0"/>
                       </a:rPr>
                       <m:t>=</m:t>
@@ -9625,6 +9894,7 @@
                       <m:sSubPr>
                         <m:ctrlPr>
                           <a:rPr lang="en-US" altLang="zh-CN" b="0" i="1" smtClean="0">
+                            <a:effectLst/>
                             <a:latin typeface="Cambria Math" panose="02040503050406030204" pitchFamily="18" charset="0"/>
                           </a:rPr>
                         </m:ctrlPr>
@@ -9632,6 +9902,7 @@
                       <m:e>
                         <m:r>
                           <a:rPr lang="en-US" altLang="zh-CN" b="0" i="1" smtClean="0">
+                            <a:effectLst/>
                             <a:latin typeface="Cambria Math" panose="02040503050406030204" pitchFamily="18" charset="0"/>
                           </a:rPr>
                           <m:t>𝑤</m:t>
@@ -9640,6 +9911,7 @@
                       <m:sub>
                         <m:r>
                           <a:rPr lang="en-US" altLang="zh-CN" b="0" i="1" smtClean="0">
+                            <a:effectLst/>
                             <a:latin typeface="Cambria Math" panose="02040503050406030204" pitchFamily="18" charset="0"/>
                           </a:rPr>
                           <m:t>𝑐𝑜𝑛𝑛𝑒𝑐𝑡</m:t>
@@ -9652,6 +9924,7 @@
                         <m:supHide m:val="on"/>
                         <m:ctrlPr>
                           <a:rPr lang="en-US" altLang="zh-CN" b="0" i="1" smtClean="0">
+                            <a:effectLst/>
                             <a:latin typeface="Cambria Math" panose="02040503050406030204" pitchFamily="18" charset="0"/>
                           </a:rPr>
                         </m:ctrlPr>
@@ -9662,18 +9935,21 @@
                             <m:brk m:alnAt="7"/>
                           </m:rPr>
                           <a:rPr lang="en-US" altLang="zh-CN" b="0" i="1" smtClean="0">
+                            <a:effectLst/>
                             <a:latin typeface="Cambria Math" panose="02040503050406030204" pitchFamily="18" charset="0"/>
                           </a:rPr>
                           <m:t>𝑝</m:t>
                         </m:r>
                         <m:r>
                           <a:rPr lang="en-US" altLang="zh-CN" b="0" i="1" smtClean="0">
+                            <a:effectLst/>
                             <a:latin typeface="Cambria Math" panose="02040503050406030204" pitchFamily="18" charset="0"/>
                           </a:rPr>
                           <m:t>∈</m:t>
                         </m:r>
                         <m:r>
                           <a:rPr lang="en-US" altLang="zh-CN" b="0" i="1" smtClean="0">
+                            <a:effectLst/>
                             <a:latin typeface="Cambria Math" panose="02040503050406030204" pitchFamily="18" charset="0"/>
                           </a:rPr>
                           <m:t>𝐵</m:t>
@@ -9682,6 +9958,7 @@
                           <m:dPr>
                             <m:ctrlPr>
                               <a:rPr lang="en-US" altLang="zh-CN" b="0" i="1" smtClean="0">
+                                <a:effectLst/>
                                 <a:latin typeface="Cambria Math" panose="02040503050406030204" pitchFamily="18" charset="0"/>
                               </a:rPr>
                             </m:ctrlPr>
@@ -9691,6 +9968,7 @@
                               <m:sSubPr>
                                 <m:ctrlPr>
                                   <a:rPr lang="en-US" altLang="zh-CN" b="0" i="1" smtClean="0">
+                                    <a:effectLst/>
                                     <a:latin typeface="Cambria Math" panose="02040503050406030204" pitchFamily="18" charset="0"/>
                                   </a:rPr>
                                 </m:ctrlPr>
@@ -9698,6 +9976,7 @@
                               <m:e>
                                 <m:r>
                                   <a:rPr lang="en-US" altLang="zh-CN" b="0" i="1" smtClean="0">
+                                    <a:effectLst/>
                                     <a:latin typeface="Cambria Math" panose="02040503050406030204" pitchFamily="18" charset="0"/>
                                   </a:rPr>
                                   <m:t>𝑟</m:t>
@@ -9706,6 +9985,7 @@
                               <m:sub>
                                 <m:r>
                                   <a:rPr lang="en-US" altLang="zh-CN" b="0" i="1" smtClean="0">
+                                    <a:effectLst/>
                                     <a:latin typeface="Cambria Math" panose="02040503050406030204" pitchFamily="18" charset="0"/>
                                   </a:rPr>
                                   <m:t>𝑖</m:t>
@@ -9714,6 +9994,7 @@
                             </m:sSub>
                             <m:r>
                               <a:rPr lang="en-US" altLang="zh-CN" b="0" i="1" smtClean="0">
+                                <a:effectLst/>
                                 <a:latin typeface="Cambria Math" panose="02040503050406030204" pitchFamily="18" charset="0"/>
                               </a:rPr>
                               <m:t>,</m:t>
@@ -9722,6 +10003,7 @@
                               <m:sSubPr>
                                 <m:ctrlPr>
                                   <a:rPr lang="en-US" altLang="zh-CN" b="0" i="1" smtClean="0">
+                                    <a:effectLst/>
                                     <a:latin typeface="Cambria Math" panose="02040503050406030204" pitchFamily="18" charset="0"/>
                                   </a:rPr>
                                 </m:ctrlPr>
@@ -9729,6 +10011,7 @@
                               <m:e>
                                 <m:r>
                                   <a:rPr lang="en-US" altLang="zh-CN" b="0" i="1" smtClean="0">
+                                    <a:effectLst/>
                                     <a:latin typeface="Cambria Math" panose="02040503050406030204" pitchFamily="18" charset="0"/>
                                   </a:rPr>
                                   <m:t>𝑟</m:t>
@@ -9737,6 +10020,7 @@
                               <m:sub>
                                 <m:r>
                                   <a:rPr lang="en-US" altLang="zh-CN" b="0" i="1" smtClean="0">
+                                    <a:effectLst/>
                                     <a:latin typeface="Cambria Math" panose="02040503050406030204" pitchFamily="18" charset="0"/>
                                   </a:rPr>
                                   <m:t>𝑗</m:t>
@@ -9745,12 +10029,14 @@
                             </m:sSub>
                             <m:r>
                               <a:rPr lang="en-US" altLang="zh-CN" b="0" i="1" smtClean="0">
+                                <a:effectLst/>
                                 <a:latin typeface="Cambria Math" panose="02040503050406030204" pitchFamily="18" charset="0"/>
                               </a:rPr>
                               <m:t>,</m:t>
                             </m:r>
                             <m:r>
                               <a:rPr lang="en-US" altLang="zh-CN" b="0" i="1" smtClean="0">
+                                <a:effectLst/>
                                 <a:latin typeface="Cambria Math" panose="02040503050406030204" pitchFamily="18" charset="0"/>
                               </a:rPr>
                               <m:t>𝑎</m:t>
@@ -9764,6 +10050,7 @@
                           <m:sSupPr>
                             <m:ctrlPr>
                               <a:rPr lang="en-US" altLang="zh-CN" b="0" i="1" smtClean="0">
+                                <a:effectLst/>
                                 <a:latin typeface="Cambria Math" panose="02040503050406030204" pitchFamily="18" charset="0"/>
                               </a:rPr>
                             </m:ctrlPr>
@@ -9773,6 +10060,7 @@
                               <m:dPr>
                                 <m:ctrlPr>
                                   <a:rPr lang="en-US" altLang="zh-CN" b="0" i="1" smtClean="0">
+                                    <a:effectLst/>
                                     <a:latin typeface="Cambria Math" panose="02040503050406030204" pitchFamily="18" charset="0"/>
                                   </a:rPr>
                                 </m:ctrlPr>
@@ -9782,6 +10070,7 @@
                                   <m:sSubPr>
                                     <m:ctrlPr>
                                       <a:rPr lang="en-US" altLang="zh-CN" b="0" i="1" smtClean="0">
+                                        <a:effectLst/>
                                         <a:latin typeface="Cambria Math" panose="02040503050406030204" pitchFamily="18" charset="0"/>
                                       </a:rPr>
                                     </m:ctrlPr>
@@ -9789,6 +10078,7 @@
                                   <m:e>
                                     <m:r>
                                       <a:rPr lang="en-US" altLang="zh-CN" b="0" i="1" smtClean="0">
+                                        <a:effectLst/>
                                         <a:latin typeface="Cambria Math" panose="02040503050406030204" pitchFamily="18" charset="0"/>
                                       </a:rPr>
                                       <m:t>𝜆</m:t>
@@ -9799,6 +10089,7 @@
                                       <m:sSubPr>
                                         <m:ctrlPr>
                                           <a:rPr lang="en-US" altLang="zh-CN" b="0" i="1" smtClean="0">
+                                            <a:effectLst/>
                                             <a:latin typeface="Cambria Math" panose="02040503050406030204" pitchFamily="18" charset="0"/>
                                           </a:rPr>
                                         </m:ctrlPr>
@@ -9806,6 +10097,7 @@
                                       <m:e>
                                         <m:r>
                                           <a:rPr lang="en-US" altLang="zh-CN" b="0" i="1" smtClean="0">
+                                            <a:effectLst/>
                                             <a:latin typeface="Cambria Math" panose="02040503050406030204" pitchFamily="18" charset="0"/>
                                           </a:rPr>
                                           <m:t>𝑟</m:t>
@@ -9814,6 +10106,7 @@
                                       <m:sub>
                                         <m:r>
                                           <a:rPr lang="en-US" altLang="zh-CN" b="0" i="1" smtClean="0">
+                                            <a:effectLst/>
                                             <a:latin typeface="Cambria Math" panose="02040503050406030204" pitchFamily="18" charset="0"/>
                                           </a:rPr>
                                           <m:t>𝑖</m:t>
@@ -9826,6 +10119,7 @@
                                   <m:dPr>
                                     <m:ctrlPr>
                                       <a:rPr lang="en-US" altLang="zh-CN" b="0" i="1" smtClean="0">
+                                        <a:effectLst/>
                                         <a:latin typeface="Cambria Math" panose="02040503050406030204" pitchFamily="18" charset="0"/>
                                       </a:rPr>
                                     </m:ctrlPr>
@@ -9833,6 +10127,7 @@
                                   <m:e>
                                     <m:r>
                                       <a:rPr lang="en-US" altLang="zh-CN" b="0" i="1" smtClean="0">
+                                        <a:effectLst/>
                                         <a:latin typeface="Cambria Math" panose="02040503050406030204" pitchFamily="18" charset="0"/>
                                       </a:rPr>
                                       <m:t>𝑝</m:t>
@@ -9841,6 +10136,7 @@
                                 </m:d>
                                 <m:r>
                                   <a:rPr lang="en-US" altLang="zh-CN" b="0" i="1" smtClean="0">
+                                    <a:effectLst/>
                                     <a:latin typeface="Cambria Math" panose="02040503050406030204" pitchFamily="18" charset="0"/>
                                   </a:rPr>
                                   <m:t>−</m:t>
@@ -9849,6 +10145,7 @@
                                   <m:sSubPr>
                                     <m:ctrlPr>
                                       <a:rPr lang="en-US" altLang="zh-CN" b="0" i="1" smtClean="0">
+                                        <a:effectLst/>
                                         <a:latin typeface="Cambria Math" panose="02040503050406030204" pitchFamily="18" charset="0"/>
                                       </a:rPr>
                                     </m:ctrlPr>
@@ -9856,6 +10153,7 @@
                                   <m:e>
                                     <m:r>
                                       <a:rPr lang="en-US" altLang="zh-CN" b="0" i="1" smtClean="0">
+                                        <a:effectLst/>
                                         <a:latin typeface="Cambria Math" panose="02040503050406030204" pitchFamily="18" charset="0"/>
                                       </a:rPr>
                                       <m:t>𝜆</m:t>
@@ -9866,6 +10164,7 @@
                                       <m:sSubPr>
                                         <m:ctrlPr>
                                           <a:rPr lang="en-US" altLang="zh-CN" b="0" i="1" smtClean="0">
+                                            <a:effectLst/>
                                             <a:latin typeface="Cambria Math" panose="02040503050406030204" pitchFamily="18" charset="0"/>
                                           </a:rPr>
                                         </m:ctrlPr>
@@ -9873,6 +10172,7 @@
                                       <m:e>
                                         <m:r>
                                           <a:rPr lang="en-US" altLang="zh-CN" b="0" i="1" smtClean="0">
+                                            <a:effectLst/>
                                             <a:latin typeface="Cambria Math" panose="02040503050406030204" pitchFamily="18" charset="0"/>
                                           </a:rPr>
                                           <m:t>𝑟</m:t>
@@ -9881,6 +10181,7 @@
                                       <m:sub>
                                         <m:r>
                                           <a:rPr lang="en-US" altLang="zh-CN" b="0" i="1" smtClean="0">
+                                            <a:effectLst/>
                                             <a:latin typeface="Cambria Math" panose="02040503050406030204" pitchFamily="18" charset="0"/>
                                           </a:rPr>
                                           <m:t>𝑗</m:t>
@@ -9893,6 +10194,7 @@
                                   <m:dPr>
                                     <m:ctrlPr>
                                       <a:rPr lang="en-US" altLang="zh-CN" b="0" i="1" smtClean="0">
+                                        <a:effectLst/>
                                         <a:latin typeface="Cambria Math" panose="02040503050406030204" pitchFamily="18" charset="0"/>
                                       </a:rPr>
                                     </m:ctrlPr>
@@ -9900,6 +10202,7 @@
                                   <m:e>
                                     <m:r>
                                       <a:rPr lang="en-US" altLang="zh-CN" b="0" i="1" smtClean="0">
+                                        <a:effectLst/>
                                         <a:latin typeface="Cambria Math" panose="02040503050406030204" pitchFamily="18" charset="0"/>
                                       </a:rPr>
                                       <m:t>𝑝</m:t>
@@ -9912,6 +10215,7 @@
                           <m:sup>
                             <m:r>
                               <a:rPr lang="en-US" altLang="zh-CN" b="0" i="1" smtClean="0">
+                                <a:effectLst/>
                                 <a:latin typeface="Cambria Math" panose="02040503050406030204" pitchFamily="18" charset="0"/>
                               </a:rPr>
                               <m:t>2</m:t>
@@ -9922,6 +10226,7 @@
                     </m:nary>
                     <m:r>
                       <a:rPr lang="en-US" altLang="zh-CN" b="0" i="1" smtClean="0">
+                        <a:effectLst/>
                         <a:latin typeface="Cambria Math" panose="02040503050406030204" pitchFamily="18" charset="0"/>
                       </a:rPr>
                       <m:t>×</m:t>
@@ -9930,6 +10235,7 @@
                       <m:dPr>
                         <m:ctrlPr>
                           <a:rPr lang="en-US" altLang="zh-CN" b="0" i="1" smtClean="0">
+                            <a:effectLst/>
                             <a:latin typeface="Cambria Math" panose="02040503050406030204" pitchFamily="18" charset="0"/>
                           </a:rPr>
                         </m:ctrlPr>
@@ -9939,6 +10245,7 @@
                           <m:sSubPr>
                             <m:ctrlPr>
                               <a:rPr lang="en-US" altLang="zh-CN" b="0" i="1" smtClean="0">
+                                <a:effectLst/>
                                 <a:latin typeface="Cambria Math" panose="02040503050406030204" pitchFamily="18" charset="0"/>
                               </a:rPr>
                             </m:ctrlPr>
@@ -9946,6 +10253,7 @@
                           <m:e>
                             <m:r>
                               <a:rPr lang="en-US" altLang="zh-CN" b="0" i="1" smtClean="0">
+                                <a:effectLst/>
                                 <a:latin typeface="Cambria Math" panose="02040503050406030204" pitchFamily="18" charset="0"/>
                               </a:rPr>
                               <m:t>𝐶</m:t>
@@ -9954,6 +10262,7 @@
                           <m:sub>
                             <m:r>
                               <a:rPr lang="en-US" altLang="zh-CN" b="0" i="1" smtClean="0">
+                                <a:effectLst/>
                                 <a:latin typeface="Cambria Math" panose="02040503050406030204" pitchFamily="18" charset="0"/>
                               </a:rPr>
                               <m:t>𝑜𝑐𝑐𝑙𝑢𝑑𝑒</m:t>
@@ -9964,6 +10273,7 @@
                           <m:dPr>
                             <m:ctrlPr>
                               <a:rPr lang="en-US" altLang="zh-CN" b="0" i="1" smtClean="0">
+                                <a:effectLst/>
                                 <a:latin typeface="Cambria Math" panose="02040503050406030204" pitchFamily="18" charset="0"/>
                               </a:rPr>
                             </m:ctrlPr>
@@ -9973,6 +10283,7 @@
                               <m:sSubPr>
                                 <m:ctrlPr>
                                   <a:rPr lang="en-US" altLang="zh-CN" b="0" i="1" smtClean="0">
+                                    <a:effectLst/>
                                     <a:latin typeface="Cambria Math" panose="02040503050406030204" pitchFamily="18" charset="0"/>
                                   </a:rPr>
                                 </m:ctrlPr>
@@ -9980,6 +10291,7 @@
                               <m:e>
                                 <m:r>
                                   <a:rPr lang="en-US" altLang="zh-CN" b="0" i="1" smtClean="0">
+                                    <a:effectLst/>
                                     <a:latin typeface="Cambria Math" panose="02040503050406030204" pitchFamily="18" charset="0"/>
                                   </a:rPr>
                                   <m:t>𝑟</m:t>
@@ -9988,6 +10300,7 @@
                               <m:sub>
                                 <m:r>
                                   <a:rPr lang="en-US" altLang="zh-CN" b="0" i="1" smtClean="0">
+                                    <a:effectLst/>
                                     <a:latin typeface="Cambria Math" panose="02040503050406030204" pitchFamily="18" charset="0"/>
                                   </a:rPr>
                                   <m:t>𝑖</m:t>
@@ -9996,6 +10309,7 @@
                             </m:sSub>
                             <m:r>
                               <a:rPr lang="en-US" altLang="zh-CN" b="0" i="1" smtClean="0">
+                                <a:effectLst/>
                                 <a:latin typeface="Cambria Math" panose="02040503050406030204" pitchFamily="18" charset="0"/>
                               </a:rPr>
                               <m:t>,</m:t>
@@ -10004,6 +10318,7 @@
                               <m:sSubPr>
                                 <m:ctrlPr>
                                   <a:rPr lang="en-US" altLang="zh-CN" b="0" i="1" smtClean="0">
+                                    <a:effectLst/>
                                     <a:latin typeface="Cambria Math" panose="02040503050406030204" pitchFamily="18" charset="0"/>
                                   </a:rPr>
                                 </m:ctrlPr>
@@ -10011,6 +10326,7 @@
                               <m:e>
                                 <m:r>
                                   <a:rPr lang="en-US" altLang="zh-CN" b="0" i="1" smtClean="0">
+                                    <a:effectLst/>
                                     <a:latin typeface="Cambria Math" panose="02040503050406030204" pitchFamily="18" charset="0"/>
                                   </a:rPr>
                                   <m:t>𝑟</m:t>
@@ -10019,6 +10335,7 @@
                               <m:sub>
                                 <m:r>
                                   <a:rPr lang="en-US" altLang="zh-CN" b="0" i="1" smtClean="0">
+                                    <a:effectLst/>
                                     <a:latin typeface="Cambria Math" panose="02040503050406030204" pitchFamily="18" charset="0"/>
                                   </a:rPr>
                                   <m:t>𝑗</m:t>
@@ -10031,7 +10348,9 @@
                     </m:d>
                   </m:oMath>
                 </a14:m>
-                <a:endParaRPr lang="en-US" altLang="zh-CN" dirty="0" smtClean="0"/>
+                <a:endParaRPr lang="en-US" altLang="zh-CN" dirty="0" smtClean="0">
+                  <a:effectLst/>
+                </a:endParaRPr>
               </a:p>
               <a:p>
                 <a14:m>
@@ -10040,6 +10359,7 @@
                       <m:sSubPr>
                         <m:ctrlPr>
                           <a:rPr lang="en-US" altLang="zh-CN" b="0" i="1" smtClean="0">
+                            <a:effectLst/>
                             <a:latin typeface="Cambria Math" panose="02040503050406030204" pitchFamily="18" charset="0"/>
                           </a:rPr>
                         </m:ctrlPr>
@@ -10047,6 +10367,7 @@
                       <m:e>
                         <m:r>
                           <a:rPr lang="en-US" altLang="zh-CN" b="0" i="1" smtClean="0">
+                            <a:effectLst/>
                             <a:latin typeface="Cambria Math" panose="02040503050406030204" pitchFamily="18" charset="0"/>
                           </a:rPr>
                           <m:t>𝐸</m:t>
@@ -10055,6 +10376,7 @@
                       <m:sub>
                         <m:r>
                           <a:rPr lang="en-US" altLang="zh-CN" b="0" i="1" smtClean="0">
+                            <a:effectLst/>
                             <a:latin typeface="Cambria Math" panose="02040503050406030204" pitchFamily="18" charset="0"/>
                           </a:rPr>
                           <m:t>𝑑𝑖𝑠𝑐𝑜𝑛𝑛𝑒𝑐𝑡</m:t>
@@ -10065,6 +10387,7 @@
                       <m:dPr>
                         <m:ctrlPr>
                           <a:rPr lang="en-US" altLang="zh-CN" b="0" i="1" smtClean="0">
+                            <a:effectLst/>
                             <a:latin typeface="Cambria Math" panose="02040503050406030204" pitchFamily="18" charset="0"/>
                           </a:rPr>
                         </m:ctrlPr>
@@ -10074,6 +10397,7 @@
                           <m:sSubPr>
                             <m:ctrlPr>
                               <a:rPr lang="en-US" altLang="zh-CN" b="0" i="1" smtClean="0">
+                                <a:effectLst/>
                                 <a:latin typeface="Cambria Math" panose="02040503050406030204" pitchFamily="18" charset="0"/>
                               </a:rPr>
                             </m:ctrlPr>
@@ -10081,6 +10405,7 @@
                           <m:e>
                             <m:r>
                               <a:rPr lang="en-US" altLang="zh-CN" b="0" i="1" smtClean="0">
+                                <a:effectLst/>
                                 <a:latin typeface="Cambria Math" panose="02040503050406030204" pitchFamily="18" charset="0"/>
                               </a:rPr>
                               <m:t>𝑟</m:t>
@@ -10089,6 +10414,7 @@
                           <m:sub>
                             <m:r>
                               <a:rPr lang="en-US" altLang="zh-CN" b="0" i="1" smtClean="0">
+                                <a:effectLst/>
                                 <a:latin typeface="Cambria Math" panose="02040503050406030204" pitchFamily="18" charset="0"/>
                               </a:rPr>
                               <m:t>𝑖</m:t>
@@ -10097,6 +10423,7 @@
                         </m:sSub>
                         <m:r>
                           <a:rPr lang="en-US" altLang="zh-CN" b="0" i="1" smtClean="0">
+                            <a:effectLst/>
                             <a:latin typeface="Cambria Math" panose="02040503050406030204" pitchFamily="18" charset="0"/>
                           </a:rPr>
                           <m:t>,</m:t>
@@ -10105,6 +10432,7 @@
                           <m:sSubPr>
                             <m:ctrlPr>
                               <a:rPr lang="en-US" altLang="zh-CN" b="0" i="1" smtClean="0">
+                                <a:effectLst/>
                                 <a:latin typeface="Cambria Math" panose="02040503050406030204" pitchFamily="18" charset="0"/>
                               </a:rPr>
                             </m:ctrlPr>
@@ -10112,6 +10440,7 @@
                           <m:e>
                             <m:r>
                               <a:rPr lang="en-US" altLang="zh-CN" b="0" i="1" smtClean="0">
+                                <a:effectLst/>
                                 <a:latin typeface="Cambria Math" panose="02040503050406030204" pitchFamily="18" charset="0"/>
                               </a:rPr>
                               <m:t>𝑟</m:t>
@@ -10120,6 +10449,7 @@
                           <m:sub>
                             <m:r>
                               <a:rPr lang="en-US" altLang="zh-CN" b="0" i="1" smtClean="0">
+                                <a:effectLst/>
                                 <a:latin typeface="Cambria Math" panose="02040503050406030204" pitchFamily="18" charset="0"/>
                               </a:rPr>
                               <m:t>𝑗</m:t>
@@ -10130,6 +10460,7 @@
                     </m:d>
                     <m:r>
                       <a:rPr lang="en-US" altLang="zh-CN" b="0" i="1" smtClean="0">
+                        <a:effectLst/>
                         <a:latin typeface="Cambria Math" panose="02040503050406030204" pitchFamily="18" charset="0"/>
                       </a:rPr>
                       <m:t>=</m:t>
@@ -10138,6 +10469,7 @@
                       <m:sSubPr>
                         <m:ctrlPr>
                           <a:rPr lang="en-US" altLang="zh-CN" b="0" i="1" smtClean="0">
+                            <a:effectLst/>
                             <a:latin typeface="Cambria Math" panose="02040503050406030204" pitchFamily="18" charset="0"/>
                           </a:rPr>
                         </m:ctrlPr>
@@ -10145,6 +10477,7 @@
                       <m:e>
                         <m:r>
                           <a:rPr lang="en-US" altLang="zh-CN" b="0" i="1" smtClean="0">
+                            <a:effectLst/>
                             <a:latin typeface="Cambria Math" panose="02040503050406030204" pitchFamily="18" charset="0"/>
                           </a:rPr>
                           <m:t>𝑤</m:t>
@@ -10153,6 +10486,7 @@
                       <m:sub>
                         <m:r>
                           <a:rPr lang="en-US" altLang="zh-CN" b="0" i="1" smtClean="0">
+                            <a:effectLst/>
                             <a:latin typeface="Cambria Math" panose="02040503050406030204" pitchFamily="18" charset="0"/>
                           </a:rPr>
                           <m:t>𝑑𝑖𝑠𝑐𝑜𝑛𝑛𝑒𝑐𝑡</m:t>
@@ -10161,6 +10495,7 @@
                     </m:sSub>
                     <m:r>
                       <a:rPr lang="en-US" altLang="zh-CN" b="0" i="1" smtClean="0">
+                        <a:effectLst/>
                         <a:latin typeface="Cambria Math" panose="02040503050406030204" pitchFamily="18" charset="0"/>
                       </a:rPr>
                       <m:t>×</m:t>
@@ -10174,6 +10509,7 @@
                             <a:solidFill>
                               <a:srgbClr val="FF0000"/>
                             </a:solidFill>
+                            <a:effectLst/>
                             <a:latin typeface="Cambria Math" panose="02040503050406030204" pitchFamily="18" charset="0"/>
                           </a:rPr>
                         </m:ctrlPr>
@@ -10184,6 +10520,7 @@
                             <a:solidFill>
                               <a:srgbClr val="FF0000"/>
                             </a:solidFill>
+                            <a:effectLst/>
                             <a:latin typeface="Cambria Math" panose="02040503050406030204" pitchFamily="18" charset="0"/>
                           </a:rPr>
                           <m:t>𝐵</m:t>
@@ -10195,6 +10532,7 @@
                                 <a:solidFill>
                                   <a:srgbClr val="FF0000"/>
                                 </a:solidFill>
+                                <a:effectLst/>
                                 <a:latin typeface="Cambria Math" panose="02040503050406030204" pitchFamily="18" charset="0"/>
                               </a:rPr>
                             </m:ctrlPr>
@@ -10207,6 +10545,7 @@
                                     <a:solidFill>
                                       <a:srgbClr val="FF0000"/>
                                     </a:solidFill>
+                                    <a:effectLst/>
                                     <a:latin typeface="Cambria Math" panose="02040503050406030204" pitchFamily="18" charset="0"/>
                                   </a:rPr>
                                 </m:ctrlPr>
@@ -10217,6 +10556,7 @@
                                     <a:solidFill>
                                       <a:srgbClr val="FF0000"/>
                                     </a:solidFill>
+                                    <a:effectLst/>
                                     <a:latin typeface="Cambria Math" panose="02040503050406030204" pitchFamily="18" charset="0"/>
                                   </a:rPr>
                                   <m:t>𝑟</m:t>
@@ -10228,6 +10568,7 @@
                                     <a:solidFill>
                                       <a:srgbClr val="FF0000"/>
                                     </a:solidFill>
+                                    <a:effectLst/>
                                     <a:latin typeface="Cambria Math" panose="02040503050406030204" pitchFamily="18" charset="0"/>
                                   </a:rPr>
                                   <m:t>𝑖</m:t>
@@ -10239,6 +10580,7 @@
                                 <a:solidFill>
                                   <a:srgbClr val="FF0000"/>
                                 </a:solidFill>
+                                <a:effectLst/>
                                 <a:latin typeface="Cambria Math" panose="02040503050406030204" pitchFamily="18" charset="0"/>
                               </a:rPr>
                               <m:t>,</m:t>
@@ -10250,6 +10592,7 @@
                                     <a:solidFill>
                                       <a:srgbClr val="FF0000"/>
                                     </a:solidFill>
+                                    <a:effectLst/>
                                     <a:latin typeface="Cambria Math" panose="02040503050406030204" pitchFamily="18" charset="0"/>
                                   </a:rPr>
                                 </m:ctrlPr>
@@ -10260,6 +10603,7 @@
                                     <a:solidFill>
                                       <a:srgbClr val="FF0000"/>
                                     </a:solidFill>
+                                    <a:effectLst/>
                                     <a:latin typeface="Cambria Math" panose="02040503050406030204" pitchFamily="18" charset="0"/>
                                   </a:rPr>
                                   <m:t>𝑟</m:t>
@@ -10271,6 +10615,7 @@
                                     <a:solidFill>
                                       <a:srgbClr val="FF0000"/>
                                     </a:solidFill>
+                                    <a:effectLst/>
                                     <a:latin typeface="Cambria Math" panose="02040503050406030204" pitchFamily="18" charset="0"/>
                                   </a:rPr>
                                   <m:t>𝑗</m:t>
@@ -10282,6 +10627,7 @@
                                 <a:solidFill>
                                   <a:srgbClr val="FF0000"/>
                                 </a:solidFill>
+                                <a:effectLst/>
                                 <a:latin typeface="Cambria Math" panose="02040503050406030204" pitchFamily="18" charset="0"/>
                               </a:rPr>
                               <m:t>,</m:t>
@@ -10291,6 +10637,7 @@
                                 <a:solidFill>
                                   <a:srgbClr val="FF0000"/>
                                 </a:solidFill>
+                                <a:effectLst/>
                                 <a:latin typeface="Cambria Math" panose="02040503050406030204" pitchFamily="18" charset="0"/>
                               </a:rPr>
                               <m:t>𝑎</m:t>
@@ -10301,6 +10648,7 @@
                     </m:d>
                     <m:r>
                       <a:rPr lang="en-US" altLang="zh-CN" b="0" i="1" smtClean="0">
+                        <a:effectLst/>
                         <a:latin typeface="Cambria Math" panose="02040503050406030204" pitchFamily="18" charset="0"/>
                       </a:rPr>
                       <m:t>×</m:t>
@@ -10309,6 +10657,7 @@
                       <m:dPr>
                         <m:ctrlPr>
                           <a:rPr lang="en-US" altLang="zh-CN" b="0" i="1" smtClean="0">
+                            <a:effectLst/>
                             <a:latin typeface="Cambria Math" panose="02040503050406030204" pitchFamily="18" charset="0"/>
                           </a:rPr>
                         </m:ctrlPr>
@@ -10316,6 +10665,7 @@
                       <m:e>
                         <m:r>
                           <a:rPr lang="en-US" altLang="zh-CN" b="0" i="1" smtClean="0">
+                            <a:effectLst/>
                             <a:latin typeface="Cambria Math" panose="02040503050406030204" pitchFamily="18" charset="0"/>
                           </a:rPr>
                           <m:t>1−</m:t>
@@ -10324,6 +10674,7 @@
                           <m:sSubPr>
                             <m:ctrlPr>
                               <a:rPr lang="en-US" altLang="zh-CN" b="0" i="1" smtClean="0">
+                                <a:effectLst/>
                                 <a:latin typeface="Cambria Math" panose="02040503050406030204" pitchFamily="18" charset="0"/>
                               </a:rPr>
                             </m:ctrlPr>
@@ -10331,6 +10682,7 @@
                           <m:e>
                             <m:r>
                               <a:rPr lang="en-US" altLang="zh-CN" b="0" i="1" smtClean="0">
+                                <a:effectLst/>
                                 <a:latin typeface="Cambria Math" panose="02040503050406030204" pitchFamily="18" charset="0"/>
                               </a:rPr>
                               <m:t>𝐶</m:t>
@@ -10339,6 +10691,7 @@
                           <m:sub>
                             <m:r>
                               <a:rPr lang="en-US" altLang="zh-CN" b="0" i="1" smtClean="0">
+                                <a:effectLst/>
                                 <a:latin typeface="Cambria Math" panose="02040503050406030204" pitchFamily="18" charset="0"/>
                               </a:rPr>
                               <m:t>𝑜𝑐𝑐𝑙𝑢𝑑𝑒</m:t>
@@ -10349,6 +10702,7 @@
                           <m:dPr>
                             <m:ctrlPr>
                               <a:rPr lang="en-US" altLang="zh-CN" b="0" i="1" smtClean="0">
+                                <a:effectLst/>
                                 <a:latin typeface="Cambria Math" panose="02040503050406030204" pitchFamily="18" charset="0"/>
                               </a:rPr>
                             </m:ctrlPr>
@@ -10358,6 +10712,7 @@
                               <m:sSubPr>
                                 <m:ctrlPr>
                                   <a:rPr lang="en-US" altLang="zh-CN" b="0" i="1" smtClean="0">
+                                    <a:effectLst/>
                                     <a:latin typeface="Cambria Math" panose="02040503050406030204" pitchFamily="18" charset="0"/>
                                   </a:rPr>
                                 </m:ctrlPr>
@@ -10365,6 +10720,7 @@
                               <m:e>
                                 <m:r>
                                   <a:rPr lang="en-US" altLang="zh-CN" b="0" i="1" smtClean="0">
+                                    <a:effectLst/>
                                     <a:latin typeface="Cambria Math" panose="02040503050406030204" pitchFamily="18" charset="0"/>
                                   </a:rPr>
                                   <m:t>𝑟</m:t>
@@ -10373,6 +10729,7 @@
                               <m:sub>
                                 <m:r>
                                   <a:rPr lang="en-US" altLang="zh-CN" b="0" i="1" smtClean="0">
+                                    <a:effectLst/>
                                     <a:latin typeface="Cambria Math" panose="02040503050406030204" pitchFamily="18" charset="0"/>
                                   </a:rPr>
                                   <m:t>𝑖</m:t>
@@ -10381,6 +10738,7 @@
                             </m:sSub>
                             <m:r>
                               <a:rPr lang="en-US" altLang="zh-CN" b="0" i="1" smtClean="0">
+                                <a:effectLst/>
                                 <a:latin typeface="Cambria Math" panose="02040503050406030204" pitchFamily="18" charset="0"/>
                               </a:rPr>
                               <m:t>,</m:t>
@@ -10389,6 +10747,7 @@
                               <m:sSubPr>
                                 <m:ctrlPr>
                                   <a:rPr lang="en-US" altLang="zh-CN" b="0" i="1" smtClean="0">
+                                    <a:effectLst/>
                                     <a:latin typeface="Cambria Math" panose="02040503050406030204" pitchFamily="18" charset="0"/>
                                   </a:rPr>
                                 </m:ctrlPr>
@@ -10396,6 +10755,7 @@
                               <m:e>
                                 <m:r>
                                   <a:rPr lang="en-US" altLang="zh-CN" b="0" i="1" smtClean="0">
+                                    <a:effectLst/>
                                     <a:latin typeface="Cambria Math" panose="02040503050406030204" pitchFamily="18" charset="0"/>
                                   </a:rPr>
                                   <m:t>𝑟</m:t>
@@ -10404,6 +10764,7 @@
                               <m:sub>
                                 <m:r>
                                   <a:rPr lang="en-US" altLang="zh-CN" b="0" i="1" smtClean="0">
+                                    <a:effectLst/>
                                     <a:latin typeface="Cambria Math" panose="02040503050406030204" pitchFamily="18" charset="0"/>
                                   </a:rPr>
                                   <m:t>𝑗</m:t>
@@ -10478,6 +10839,74 @@
       </p:par>
     </p:tnLst>
   </p:timing>
+</p:sld>
+</file>
+
+<file path=ppt/slides/slide7.xml><?xml version="1.0" encoding="utf-8"?>
+<p:sld xmlns:a="http://schemas.openxmlformats.org/drawingml/2006/main" xmlns:r="http://schemas.openxmlformats.org/officeDocument/2006/relationships" xmlns:p="http://schemas.openxmlformats.org/presentationml/2006/main">
+  <p:cSld>
+    <p:spTree>
+      <p:nvGrpSpPr>
+        <p:cNvPr id="1" name=""/>
+        <p:cNvGrpSpPr/>
+        <p:nvPr/>
+      </p:nvGrpSpPr>
+      <p:grpSpPr>
+        <a:xfrm>
+          <a:off x="0" y="0"/>
+          <a:ext cx="0" cy="0"/>
+          <a:chOff x="0" y="0"/>
+          <a:chExt cx="0" cy="0"/>
+        </a:xfrm>
+      </p:grpSpPr>
+      <p:sp>
+        <p:nvSpPr>
+          <p:cNvPr id="2" name="标题 1"/>
+          <p:cNvSpPr>
+            <a:spLocks noGrp="1"/>
+          </p:cNvSpPr>
+          <p:nvPr>
+            <p:ph type="title"/>
+          </p:nvPr>
+        </p:nvSpPr>
+        <p:spPr/>
+        <p:txBody>
+          <a:bodyPr/>
+          <a:lstStyle/>
+          <a:p>
+            <a:endParaRPr lang="zh-CN" altLang="en-US"/>
+          </a:p>
+        </p:txBody>
+      </p:sp>
+      <p:sp>
+        <p:nvSpPr>
+          <p:cNvPr id="3" name="内容占位符 2"/>
+          <p:cNvSpPr>
+            <a:spLocks noGrp="1"/>
+          </p:cNvSpPr>
+          <p:nvPr>
+            <p:ph idx="1"/>
+          </p:nvPr>
+        </p:nvSpPr>
+        <p:spPr/>
+        <p:txBody>
+          <a:bodyPr/>
+          <a:lstStyle/>
+          <a:p>
+            <a:endParaRPr lang="zh-CN" altLang="en-US"/>
+          </a:p>
+        </p:txBody>
+      </p:sp>
+    </p:spTree>
+    <p:extLst>
+      <p:ext uri="{BB962C8B-B14F-4D97-AF65-F5344CB8AC3E}">
+        <p14:creationId xmlns:p14="http://schemas.microsoft.com/office/powerpoint/2010/main" val="3957519806"/>
+      </p:ext>
+    </p:extLst>
+  </p:cSld>
+  <p:clrMapOvr>
+    <a:masterClrMapping/>
+  </p:clrMapOvr>
 </p:sld>
 </file>
 

</xml_diff>

<commit_message>
add line region intersection sampled points
</commit_message>
<xml_diff>
--- a/doc/EquationsOfRegionConstraints.pptx
+++ b/doc/EquationsOfRegionConstraints.pptx
@@ -12,6 +12,7 @@
     <p:sldId id="272" r:id="rId6"/>
     <p:sldId id="271" r:id="rId7"/>
     <p:sldId id="273" r:id="rId8"/>
+    <p:sldId id="274" r:id="rId9"/>
   </p:sldIdLst>
   <p:sldSz cx="12192000" cy="6858000"/>
   <p:notesSz cx="6858000" cy="9144000"/>
@@ -4489,7 +4490,11 @@
                 </a:pPr>
                 <a:r>
                   <a:rPr lang="zh-CN" altLang="en-US" dirty="0" smtClean="0"/>
-                  <a:t>而每一个直线段子结构 </a:t>
+                  <a:t>而每一个直线</a:t>
+                </a:r>
+                <a:r>
+                  <a:rPr lang="zh-CN" altLang="en-US" dirty="0" smtClean="0"/>
+                  <a:t>段子结构 </a:t>
                 </a:r>
                 <a14:m>
                   <m:oMath xmlns:m="http://schemas.openxmlformats.org/officeDocument/2006/math">
@@ -5052,6 +5057,202 @@
                 </a14:m>
                 <a:endParaRPr lang="en-US" altLang="zh-CN" dirty="0" smtClean="0"/>
               </a:p>
+              <a:p>
+                <a:pPr marL="128016" lvl="1" indent="0">
+                  <a:buNone/>
+                </a:pPr>
+                <a:r>
+                  <a:rPr lang="zh-CN" altLang="en-US" dirty="0" smtClean="0"/>
+                  <a:t>此外还有一个隐变量：</a:t>
+                </a:r>
+                <a14:m>
+                  <m:oMath xmlns:m="http://schemas.openxmlformats.org/officeDocument/2006/math">
+                    <m:r>
+                      <a:rPr lang="en-US" altLang="zh-CN" b="0" i="1" smtClean="0">
+                        <a:latin typeface="Cambria Math" panose="02040503050406030204" pitchFamily="18" charset="0"/>
+                      </a:rPr>
+                      <m:t>𝑂𝑐𝑐𝑙𝑢𝑑𝑒</m:t>
+                    </m:r>
+                    <m:d>
+                      <m:dPr>
+                        <m:ctrlPr>
+                          <a:rPr lang="en-US" altLang="zh-CN" b="0" i="1" smtClean="0">
+                            <a:latin typeface="Cambria Math" panose="02040503050406030204" pitchFamily="18" charset="0"/>
+                          </a:rPr>
+                        </m:ctrlPr>
+                      </m:dPr>
+                      <m:e>
+                        <m:sSub>
+                          <m:sSubPr>
+                            <m:ctrlPr>
+                              <a:rPr lang="en-US" altLang="zh-CN" b="0" i="1" smtClean="0">
+                                <a:latin typeface="Cambria Math" panose="02040503050406030204" pitchFamily="18" charset="0"/>
+                              </a:rPr>
+                            </m:ctrlPr>
+                          </m:sSubPr>
+                          <m:e>
+                            <m:r>
+                              <a:rPr lang="en-US" altLang="zh-CN" b="0" i="1" smtClean="0">
+                                <a:latin typeface="Cambria Math" panose="02040503050406030204" pitchFamily="18" charset="0"/>
+                              </a:rPr>
+                              <m:t>𝑟</m:t>
+                            </m:r>
+                          </m:e>
+                          <m:sub>
+                            <m:r>
+                              <a:rPr lang="en-US" altLang="zh-CN" b="0" i="1" smtClean="0">
+                                <a:latin typeface="Cambria Math" panose="02040503050406030204" pitchFamily="18" charset="0"/>
+                              </a:rPr>
+                              <m:t>𝑖</m:t>
+                            </m:r>
+                          </m:sub>
+                        </m:sSub>
+                        <m:r>
+                          <a:rPr lang="en-US" altLang="zh-CN" b="0" i="1" smtClean="0">
+                            <a:latin typeface="Cambria Math" panose="02040503050406030204" pitchFamily="18" charset="0"/>
+                          </a:rPr>
+                          <m:t>,</m:t>
+                        </m:r>
+                        <m:sSub>
+                          <m:sSubPr>
+                            <m:ctrlPr>
+                              <a:rPr lang="en-US" altLang="zh-CN" b="0" i="1" smtClean="0">
+                                <a:latin typeface="Cambria Math" panose="02040503050406030204" pitchFamily="18" charset="0"/>
+                              </a:rPr>
+                            </m:ctrlPr>
+                          </m:sSubPr>
+                          <m:e>
+                            <m:r>
+                              <a:rPr lang="en-US" altLang="zh-CN" b="0" i="1" smtClean="0">
+                                <a:latin typeface="Cambria Math" panose="02040503050406030204" pitchFamily="18" charset="0"/>
+                              </a:rPr>
+                              <m:t>𝑟</m:t>
+                            </m:r>
+                          </m:e>
+                          <m:sub>
+                            <m:r>
+                              <a:rPr lang="en-US" altLang="zh-CN" b="0" i="1" smtClean="0">
+                                <a:latin typeface="Cambria Math" panose="02040503050406030204" pitchFamily="18" charset="0"/>
+                              </a:rPr>
+                              <m:t>𝑗</m:t>
+                            </m:r>
+                          </m:sub>
+                        </m:sSub>
+                      </m:e>
+                    </m:d>
+                    <m:r>
+                      <a:rPr lang="en-US" altLang="zh-CN" b="0" i="1" smtClean="0">
+                        <a:latin typeface="Cambria Math" panose="02040503050406030204" pitchFamily="18" charset="0"/>
+                      </a:rPr>
+                      <m:t>∈</m:t>
+                    </m:r>
+                    <m:d>
+                      <m:dPr>
+                        <m:begChr m:val="{"/>
+                        <m:endChr m:val="}"/>
+                        <m:ctrlPr>
+                          <a:rPr lang="en-US" altLang="zh-CN" b="0" i="1" smtClean="0">
+                            <a:latin typeface="Cambria Math" panose="02040503050406030204" pitchFamily="18" charset="0"/>
+                          </a:rPr>
+                        </m:ctrlPr>
+                      </m:dPr>
+                      <m:e>
+                        <m:r>
+                          <a:rPr lang="en-US" altLang="zh-CN" b="0" i="1" smtClean="0">
+                            <a:latin typeface="Cambria Math" panose="02040503050406030204" pitchFamily="18" charset="0"/>
+                          </a:rPr>
+                          <m:t>𝑇</m:t>
+                        </m:r>
+                        <m:r>
+                          <a:rPr lang="en-US" altLang="zh-CN" b="0" i="1" smtClean="0">
+                            <a:latin typeface="Cambria Math" panose="02040503050406030204" pitchFamily="18" charset="0"/>
+                          </a:rPr>
+                          <m:t>,</m:t>
+                        </m:r>
+                        <m:r>
+                          <a:rPr lang="en-US" altLang="zh-CN" b="0" i="1" smtClean="0">
+                            <a:latin typeface="Cambria Math" panose="02040503050406030204" pitchFamily="18" charset="0"/>
+                          </a:rPr>
+                          <m:t>𝐹</m:t>
+                        </m:r>
+                      </m:e>
+                    </m:d>
+                  </m:oMath>
+                </a14:m>
+                <a:r>
+                  <a:rPr lang="en-US" altLang="zh-CN" dirty="0" smtClean="0"/>
+                  <a:t> </a:t>
+                </a:r>
+                <a:r>
+                  <a:rPr lang="zh-CN" altLang="en-US" dirty="0" smtClean="0"/>
+                  <a:t>表示相邻区域</a:t>
+                </a:r>
+                <a14:m>
+                  <m:oMath xmlns:m="http://schemas.openxmlformats.org/officeDocument/2006/math">
+                    <m:sSub>
+                      <m:sSubPr>
+                        <m:ctrlPr>
+                          <a:rPr lang="en-US" altLang="zh-CN" b="0" i="1" dirty="0" smtClean="0">
+                            <a:latin typeface="Cambria Math" panose="02040503050406030204" pitchFamily="18" charset="0"/>
+                          </a:rPr>
+                        </m:ctrlPr>
+                      </m:sSubPr>
+                      <m:e>
+                        <m:r>
+                          <a:rPr lang="en-US" altLang="zh-CN" b="0" i="1" dirty="0" smtClean="0">
+                            <a:latin typeface="Cambria Math" panose="02040503050406030204" pitchFamily="18" charset="0"/>
+                          </a:rPr>
+                          <m:t>𝑟</m:t>
+                        </m:r>
+                      </m:e>
+                      <m:sub>
+                        <m:r>
+                          <a:rPr lang="en-US" altLang="zh-CN" b="0" i="1" dirty="0" smtClean="0">
+                            <a:latin typeface="Cambria Math" panose="02040503050406030204" pitchFamily="18" charset="0"/>
+                          </a:rPr>
+                          <m:t>𝑖</m:t>
+                        </m:r>
+                      </m:sub>
+                    </m:sSub>
+                    <m:r>
+                      <a:rPr lang="en-US" altLang="zh-CN" b="0" i="1" dirty="0" smtClean="0">
+                        <a:latin typeface="Cambria Math" panose="02040503050406030204" pitchFamily="18" charset="0"/>
+                      </a:rPr>
+                      <m:t>,</m:t>
+                    </m:r>
+                    <m:sSub>
+                      <m:sSubPr>
+                        <m:ctrlPr>
+                          <a:rPr lang="en-US" altLang="zh-CN" b="0" i="1" dirty="0" smtClean="0">
+                            <a:latin typeface="Cambria Math" panose="02040503050406030204" pitchFamily="18" charset="0"/>
+                          </a:rPr>
+                        </m:ctrlPr>
+                      </m:sSubPr>
+                      <m:e>
+                        <m:r>
+                          <a:rPr lang="en-US" altLang="zh-CN" b="0" i="1" dirty="0" smtClean="0">
+                            <a:latin typeface="Cambria Math" panose="02040503050406030204" pitchFamily="18" charset="0"/>
+                          </a:rPr>
+                          <m:t>𝑟</m:t>
+                        </m:r>
+                      </m:e>
+                      <m:sub>
+                        <m:r>
+                          <a:rPr lang="en-US" altLang="zh-CN" b="0" i="1" dirty="0" smtClean="0">
+                            <a:latin typeface="Cambria Math" panose="02040503050406030204" pitchFamily="18" charset="0"/>
+                          </a:rPr>
+                          <m:t>𝑗</m:t>
+                        </m:r>
+                      </m:sub>
+                    </m:sSub>
+                  </m:oMath>
+                </a14:m>
+                <a:r>
+                  <a:rPr lang="zh-CN" altLang="en-US" dirty="0" smtClean="0"/>
+                  <a:t>之间的边界属于遮挡边界</a:t>
+                </a:r>
+                <a:endParaRPr lang="en-US" altLang="zh-CN" dirty="0" smtClean="0"/>
+              </a:p>
             </p:txBody>
           </p:sp>
         </mc:Choice>
@@ -5190,7 +5391,19 @@
             </a:pPr>
             <a:r>
               <a:rPr lang="zh-CN" altLang="en-US" dirty="0" smtClean="0"/>
-              <a:t>不同直线段子结构之间的连接性约束（已完成）</a:t>
+              <a:t>不同</a:t>
+            </a:r>
+            <a:r>
+              <a:rPr lang="zh-CN" altLang="en-US" dirty="0" smtClean="0"/>
+              <a:t>直线段之间</a:t>
+            </a:r>
+            <a:r>
+              <a:rPr lang="zh-CN" altLang="en-US" dirty="0" smtClean="0"/>
+              <a:t>的连接性</a:t>
+            </a:r>
+            <a:r>
+              <a:rPr lang="zh-CN" altLang="en-US" dirty="0" smtClean="0"/>
+              <a:t>约束</a:t>
             </a:r>
             <a:endParaRPr lang="en-US" altLang="zh-CN" dirty="0" smtClean="0"/>
           </a:p>
@@ -5201,22 +5414,22 @@
             </a:pPr>
             <a:r>
               <a:rPr lang="zh-CN" altLang="en-US" b="1" dirty="0" smtClean="0"/>
-              <a:t>相邻子区域之间在边界上的连接性约束（遮挡边界判断）</a:t>
+              <a:t>相邻子区域之间在边界上的连接性</a:t>
+            </a:r>
+            <a:r>
+              <a:rPr lang="zh-CN" altLang="en-US" b="1" dirty="0" smtClean="0"/>
+              <a:t>约束</a:t>
             </a:r>
             <a:endParaRPr lang="en-US" altLang="zh-CN" b="1" dirty="0" smtClean="0"/>
           </a:p>
           <a:p>
             <a:pPr>
               <a:buFont typeface="Wingdings" panose="05000000000000000000" pitchFamily="2" charset="2"/>
-              <a:buChar char="ü"/>
+              <a:buChar char="p"/>
             </a:pPr>
             <a:r>
-              <a:rPr lang="zh-CN" altLang="en-US" dirty="0"/>
-              <a:t>子</a:t>
-            </a:r>
-            <a:r>
               <a:rPr lang="zh-CN" altLang="en-US" dirty="0" smtClean="0"/>
-              <a:t>区域与与之相接的直线段子结构之间的连接性约束（遮挡边界判断）</a:t>
+              <a:t>子区域与与之相接的直线段子结构之间的连接性约束</a:t>
             </a:r>
             <a:endParaRPr lang="en-US" altLang="zh-CN" dirty="0" smtClean="0"/>
           </a:p>
@@ -5226,7 +5439,7 @@
               <a:buChar char="ü"/>
             </a:pPr>
             <a:r>
-              <a:rPr lang="zh-CN" altLang="en-US" dirty="0"/>
+              <a:rPr lang="zh-CN" altLang="en-US" dirty="0" smtClean="0"/>
               <a:t>子</a:t>
             </a:r>
             <a:r>
@@ -5239,7 +5452,11 @@
             </a:r>
             <a:r>
               <a:rPr lang="zh-CN" altLang="en-US" dirty="0" smtClean="0"/>
-              <a:t>世界约束</a:t>
+              <a:t>世界</a:t>
+            </a:r>
+            <a:r>
+              <a:rPr lang="zh-CN" altLang="en-US" dirty="0" smtClean="0"/>
+              <a:t>约束</a:t>
             </a:r>
             <a:endParaRPr lang="en-US" altLang="zh-CN" dirty="0" smtClean="0"/>
           </a:p>
@@ -5250,57 +5467,13 @@
             </a:pPr>
             <a:r>
               <a:rPr lang="zh-CN" altLang="en-US" b="1" dirty="0" smtClean="0"/>
-              <a:t>相邻子区域之间的法向一致性约束（</a:t>
-            </a:r>
-            <a:r>
-              <a:rPr lang="zh-CN" altLang="en-US" b="1" dirty="0"/>
-              <a:t>遮挡边界判断</a:t>
+              <a:t>相邻子区域之间的法向一致性</a:t>
             </a:r>
             <a:r>
               <a:rPr lang="zh-CN" altLang="en-US" b="1" dirty="0" smtClean="0"/>
-              <a:t>）</a:t>
+              <a:t>约束</a:t>
             </a:r>
             <a:endParaRPr lang="zh-CN" altLang="en-US" b="1" dirty="0"/>
-          </a:p>
-        </p:txBody>
-      </p:sp>
-      <p:sp>
-        <p:nvSpPr>
-          <p:cNvPr id="4" name="右中括号 3"/>
-          <p:cNvSpPr/>
-          <p:nvPr/>
-        </p:nvSpPr>
-        <p:spPr>
-          <a:xfrm>
-            <a:off x="8216537" y="3396343"/>
-            <a:ext cx="3135086" cy="1502228"/>
-          </a:xfrm>
-          <a:prstGeom prst="rightBracket">
-            <a:avLst>
-              <a:gd name="adj" fmla="val 50000"/>
-            </a:avLst>
-          </a:prstGeom>
-        </p:spPr>
-        <p:style>
-          <a:lnRef idx="1">
-            <a:schemeClr val="accent1"/>
-          </a:lnRef>
-          <a:fillRef idx="0">
-            <a:schemeClr val="accent1"/>
-          </a:fillRef>
-          <a:effectRef idx="0">
-            <a:schemeClr val="accent1"/>
-          </a:effectRef>
-          <a:fontRef idx="minor">
-            <a:schemeClr val="tx1"/>
-          </a:fontRef>
-        </p:style>
-        <p:txBody>
-          <a:bodyPr rtlCol="0" anchor="ctr"/>
-          <a:lstStyle/>
-          <a:p>
-            <a:pPr algn="r"/>
-            <a:endParaRPr lang="zh-CN" altLang="en-US" dirty="0"/>
           </a:p>
         </p:txBody>
       </p:sp>
@@ -6214,8 +6387,8 @@
           </a:p>
         </p:txBody>
       </p:sp>
-      <mc:AlternateContent xmlns:mc="http://schemas.openxmlformats.org/markup-compatibility/2006" xmlns:a14="http://schemas.microsoft.com/office/drawing/2010/main">
-        <mc:Choice Requires="a14">
+      <mc:AlternateContent xmlns:mc="http://schemas.openxmlformats.org/markup-compatibility/2006">
+        <mc:Choice xmlns:a14="http://schemas.microsoft.com/office/drawing/2010/main" Requires="a14">
           <p:sp>
             <p:nvSpPr>
               <p:cNvPr id="3" name="内容占位符 2"/>
@@ -7273,17 +7446,17 @@
                         </m:ctrlPr>
                       </m:dPr>
                       <m:e>
-                        <m:sSubSup>
-                          <m:sSubSupPr>
+                        <m:sSub>
+                          <m:sSubPr>
                             <m:ctrlPr>
-                              <a:rPr lang="en-US" altLang="zh-CN" b="0" i="1" smtClean="0">
+                              <a:rPr lang="en-US" altLang="zh-CN" i="1">
                                 <a:latin typeface="Cambria Math" panose="02040503050406030204" pitchFamily="18" charset="0"/>
                               </a:rPr>
                             </m:ctrlPr>
-                          </m:sSubSupPr>
+                          </m:sSubPr>
                           <m:e>
                             <m:r>
-                              <a:rPr lang="en-US" altLang="zh-CN" b="0" i="1" smtClean="0">
+                              <a:rPr lang="en-US" altLang="zh-CN" i="1">
                                 <a:latin typeface="Cambria Math" panose="02040503050406030204" pitchFamily="18" charset="0"/>
                               </a:rPr>
                               <m:t>𝑝</m:t>
@@ -7291,38 +7464,30 @@
                           </m:e>
                           <m:sub>
                             <m:r>
-                              <a:rPr lang="en-US" altLang="zh-CN" b="0" i="1" smtClean="0">
+                              <a:rPr lang="en-US" altLang="zh-CN" i="1">
                                 <a:latin typeface="Cambria Math" panose="02040503050406030204" pitchFamily="18" charset="0"/>
                               </a:rPr>
                               <m:t>1</m:t>
                             </m:r>
                           </m:sub>
-                          <m:sup>
-                            <m:r>
-                              <a:rPr lang="en-US" altLang="zh-CN" b="0" i="1" smtClean="0">
-                                <a:latin typeface="Cambria Math" panose="02040503050406030204" pitchFamily="18" charset="0"/>
-                              </a:rPr>
-                              <m:t>𝑖𝑗</m:t>
-                            </m:r>
-                          </m:sup>
-                        </m:sSubSup>
-                        <m:r>
-                          <a:rPr lang="en-US" altLang="zh-CN" b="0" i="1" smtClean="0">
+                        </m:sSub>
+                        <m:r>
+                          <a:rPr lang="en-US" altLang="zh-CN" i="1">
                             <a:latin typeface="Cambria Math" panose="02040503050406030204" pitchFamily="18" charset="0"/>
                           </a:rPr>
                           <m:t>,</m:t>
                         </m:r>
-                        <m:sSubSup>
-                          <m:sSubSupPr>
+                        <m:sSub>
+                          <m:sSubPr>
                             <m:ctrlPr>
-                              <a:rPr lang="en-US" altLang="zh-CN" b="0" i="1" smtClean="0">
+                              <a:rPr lang="en-US" altLang="zh-CN" i="1">
                                 <a:latin typeface="Cambria Math" panose="02040503050406030204" pitchFamily="18" charset="0"/>
                               </a:rPr>
                             </m:ctrlPr>
-                          </m:sSubSupPr>
+                          </m:sSubPr>
                           <m:e>
                             <m:r>
-                              <a:rPr lang="en-US" altLang="zh-CN" b="0" i="1" smtClean="0">
+                              <a:rPr lang="en-US" altLang="zh-CN" i="1">
                                 <a:latin typeface="Cambria Math" panose="02040503050406030204" pitchFamily="18" charset="0"/>
                               </a:rPr>
                               <m:t>𝑝</m:t>
@@ -7330,60 +7495,19 @@
                           </m:e>
                           <m:sub>
                             <m:r>
-                              <a:rPr lang="en-US" altLang="zh-CN" b="0" i="1" smtClean="0">
+                              <a:rPr lang="en-US" altLang="zh-CN" i="1">
                                 <a:latin typeface="Cambria Math" panose="02040503050406030204" pitchFamily="18" charset="0"/>
                               </a:rPr>
                               <m:t>2</m:t>
                             </m:r>
                           </m:sub>
-                          <m:sup>
-                            <m:r>
-                              <a:rPr lang="en-US" altLang="zh-CN" b="0" i="1" smtClean="0">
-                                <a:latin typeface="Cambria Math" panose="02040503050406030204" pitchFamily="18" charset="0"/>
-                              </a:rPr>
-                              <m:t>𝑖𝑗</m:t>
-                            </m:r>
-                          </m:sup>
-                        </m:sSubSup>
-                        <m:r>
-                          <a:rPr lang="en-US" altLang="zh-CN" b="0" i="1" smtClean="0">
-                            <a:latin typeface="Cambria Math" panose="02040503050406030204" pitchFamily="18" charset="0"/>
-                          </a:rPr>
-                          <m:t>,…,</m:t>
-                        </m:r>
-                        <m:sSubSup>
-                          <m:sSubSupPr>
-                            <m:ctrlPr>
-                              <a:rPr lang="en-US" altLang="zh-CN" b="0" i="1" smtClean="0">
-                                <a:latin typeface="Cambria Math" panose="02040503050406030204" pitchFamily="18" charset="0"/>
-                              </a:rPr>
-                            </m:ctrlPr>
-                          </m:sSubSupPr>
-                          <m:e>
-                            <m:r>
-                              <a:rPr lang="en-US" altLang="zh-CN" b="0" i="1" smtClean="0">
-                                <a:latin typeface="Cambria Math" panose="02040503050406030204" pitchFamily="18" charset="0"/>
-                              </a:rPr>
-                              <m:t>𝑝</m:t>
-                            </m:r>
-                          </m:e>
-                          <m:sub>
-                            <m:r>
-                              <a:rPr lang="en-US" altLang="zh-CN" b="0" i="1" smtClean="0">
-                                <a:latin typeface="Cambria Math" panose="02040503050406030204" pitchFamily="18" charset="0"/>
-                              </a:rPr>
-                              <m:t>𝑘</m:t>
-                            </m:r>
-                          </m:sub>
-                          <m:sup>
-                            <m:r>
-                              <a:rPr lang="en-US" altLang="zh-CN" b="0" i="1" smtClean="0">
-                                <a:latin typeface="Cambria Math" panose="02040503050406030204" pitchFamily="18" charset="0"/>
-                              </a:rPr>
-                              <m:t>𝑖𝑗</m:t>
-                            </m:r>
-                          </m:sup>
-                        </m:sSubSup>
+                        </m:sSub>
+                        <m:r>
+                          <a:rPr lang="en-US" altLang="zh-CN" i="1">
+                            <a:latin typeface="Cambria Math" panose="02040503050406030204" pitchFamily="18" charset="0"/>
+                          </a:rPr>
+                          <m:t>,…</m:t>
+                        </m:r>
                       </m:e>
                     </m:d>
                   </m:oMath>
@@ -7484,7 +7608,7 @@
             </p:txBody>
           </p:sp>
         </mc:Choice>
-        <mc:Fallback xmlns="">
+        <mc:Fallback>
           <p:sp>
             <p:nvSpPr>
               <p:cNvPr id="3" name="内容占位符 2"/>
@@ -9266,14 +9390,14 @@
                         <m:sSub>
                           <m:sSubPr>
                             <m:ctrlPr>
-                              <a:rPr lang="en-US" altLang="zh-CN" i="1">
+                              <a:rPr lang="en-US" altLang="zh-CN" i="1" strike="sngStrike">
                                 <a:latin typeface="Cambria Math" panose="02040503050406030204" pitchFamily="18" charset="0"/>
                               </a:rPr>
                             </m:ctrlPr>
                           </m:sSubPr>
                           <m:e>
                             <m:r>
-                              <a:rPr lang="en-US" altLang="zh-CN" i="1">
+                              <a:rPr lang="en-US" altLang="zh-CN" i="1" strike="sngStrike">
                                 <a:latin typeface="Cambria Math" panose="02040503050406030204" pitchFamily="18" charset="0"/>
                               </a:rPr>
                               <m:t>𝛼</m:t>
@@ -9281,7 +9405,7 @@
                           </m:e>
                           <m:sub>
                             <m:r>
-                              <a:rPr lang="en-US" altLang="zh-CN" i="1">
+                              <a:rPr lang="en-US" altLang="zh-CN" i="1" strike="sngStrike">
                                 <a:latin typeface="Cambria Math" panose="02040503050406030204" pitchFamily="18" charset="0"/>
                               </a:rPr>
                               <m:t>1</m:t>
@@ -9291,7 +9415,7 @@
                       </m:sup>
                     </m:sSup>
                     <m:r>
-                      <a:rPr lang="en-US" altLang="zh-CN" b="0" i="1" smtClean="0">
+                      <a:rPr lang="en-US" altLang="zh-CN" b="0" i="1" strike="sngStrike" smtClean="0">
                         <a:latin typeface="Cambria Math" panose="02040503050406030204" pitchFamily="18" charset="0"/>
                       </a:rPr>
                       <m:t>×</m:t>
@@ -9299,14 +9423,14 @@
                     <m:sSub>
                       <m:sSubPr>
                         <m:ctrlPr>
-                          <a:rPr lang="en-US" altLang="zh-CN" b="0" i="1" smtClean="0">
+                          <a:rPr lang="en-US" altLang="zh-CN" b="0" i="1" strike="sngStrike" smtClean="0">
                             <a:latin typeface="Cambria Math" panose="02040503050406030204" pitchFamily="18" charset="0"/>
                           </a:rPr>
                         </m:ctrlPr>
                       </m:sSubPr>
                       <m:e>
                         <m:r>
-                          <a:rPr lang="en-US" altLang="zh-CN" b="0" i="1" smtClean="0">
+                          <a:rPr lang="en-US" altLang="zh-CN" b="0" i="1" strike="sngStrike" smtClean="0">
                             <a:latin typeface="Cambria Math" panose="02040503050406030204" pitchFamily="18" charset="0"/>
                           </a:rPr>
                           <m:t>𝐶</m:t>
@@ -9314,7 +9438,7 @@
                       </m:e>
                       <m:sub>
                         <m:r>
-                          <a:rPr lang="en-US" altLang="zh-CN" b="0" i="1" smtClean="0">
+                          <a:rPr lang="en-US" altLang="zh-CN" b="0" i="1" strike="sngStrike" smtClean="0">
                             <a:latin typeface="Cambria Math" panose="02040503050406030204" pitchFamily="18" charset="0"/>
                           </a:rPr>
                           <m:t>𝑡𝑗𝑢𝑛𝑐𝑡</m:t>
@@ -9324,7 +9448,7 @@
                     <m:sSup>
                       <m:sSupPr>
                         <m:ctrlPr>
-                          <a:rPr lang="en-US" altLang="zh-CN" b="0" i="1" smtClean="0">
+                          <a:rPr lang="en-US" altLang="zh-CN" b="0" i="1" strike="sngStrike" smtClean="0">
                             <a:latin typeface="Cambria Math" panose="02040503050406030204" pitchFamily="18" charset="0"/>
                           </a:rPr>
                         </m:ctrlPr>
@@ -9333,7 +9457,7 @@
                         <m:d>
                           <m:dPr>
                             <m:ctrlPr>
-                              <a:rPr lang="en-US" altLang="zh-CN" b="0" i="1" smtClean="0">
+                              <a:rPr lang="en-US" altLang="zh-CN" b="0" i="1" strike="sngStrike" smtClean="0">
                                 <a:latin typeface="Cambria Math" panose="02040503050406030204" pitchFamily="18" charset="0"/>
                               </a:rPr>
                             </m:ctrlPr>
@@ -9342,14 +9466,14 @@
                             <m:sSub>
                               <m:sSubPr>
                                 <m:ctrlPr>
-                                  <a:rPr lang="en-US" altLang="zh-CN" b="0" i="1" smtClean="0">
+                                  <a:rPr lang="en-US" altLang="zh-CN" b="0" i="1" strike="sngStrike" smtClean="0">
                                     <a:latin typeface="Cambria Math" panose="02040503050406030204" pitchFamily="18" charset="0"/>
                                   </a:rPr>
                                 </m:ctrlPr>
                               </m:sSubPr>
                               <m:e>
                                 <m:r>
-                                  <a:rPr lang="en-US" altLang="zh-CN" b="0" i="1" smtClean="0">
+                                  <a:rPr lang="en-US" altLang="zh-CN" b="0" i="1" strike="sngStrike" smtClean="0">
                                     <a:latin typeface="Cambria Math" panose="02040503050406030204" pitchFamily="18" charset="0"/>
                                   </a:rPr>
                                   <m:t>𝑟</m:t>
@@ -9357,7 +9481,7 @@
                               </m:e>
                               <m:sub>
                                 <m:r>
-                                  <a:rPr lang="en-US" altLang="zh-CN" b="0" i="1" smtClean="0">
+                                  <a:rPr lang="en-US" altLang="zh-CN" b="0" i="1" strike="sngStrike" smtClean="0">
                                     <a:latin typeface="Cambria Math" panose="02040503050406030204" pitchFamily="18" charset="0"/>
                                   </a:rPr>
                                   <m:t>𝑖</m:t>
@@ -9365,7 +9489,7 @@
                               </m:sub>
                             </m:sSub>
                             <m:r>
-                              <a:rPr lang="en-US" altLang="zh-CN" b="0" i="1" smtClean="0">
+                              <a:rPr lang="en-US" altLang="zh-CN" b="0" i="1" strike="sngStrike" smtClean="0">
                                 <a:latin typeface="Cambria Math" panose="02040503050406030204" pitchFamily="18" charset="0"/>
                               </a:rPr>
                               <m:t>,</m:t>
@@ -9373,14 +9497,14 @@
                             <m:sSub>
                               <m:sSubPr>
                                 <m:ctrlPr>
-                                  <a:rPr lang="en-US" altLang="zh-CN" b="0" i="1" smtClean="0">
+                                  <a:rPr lang="en-US" altLang="zh-CN" b="0" i="1" strike="sngStrike" smtClean="0">
                                     <a:latin typeface="Cambria Math" panose="02040503050406030204" pitchFamily="18" charset="0"/>
                                   </a:rPr>
                                 </m:ctrlPr>
                               </m:sSubPr>
                               <m:e>
                                 <m:r>
-                                  <a:rPr lang="en-US" altLang="zh-CN" b="0" i="1" smtClean="0">
+                                  <a:rPr lang="en-US" altLang="zh-CN" b="0" i="1" strike="sngStrike" smtClean="0">
                                     <a:latin typeface="Cambria Math" panose="02040503050406030204" pitchFamily="18" charset="0"/>
                                   </a:rPr>
                                   <m:t>𝑟</m:t>
@@ -9388,7 +9512,7 @@
                               </m:e>
                               <m:sub>
                                 <m:r>
-                                  <a:rPr lang="en-US" altLang="zh-CN" b="0" i="1" smtClean="0">
+                                  <a:rPr lang="en-US" altLang="zh-CN" b="0" i="1" strike="sngStrike" smtClean="0">
                                     <a:latin typeface="Cambria Math" panose="02040503050406030204" pitchFamily="18" charset="0"/>
                                   </a:rPr>
                                   <m:t>𝑗</m:t>
@@ -9402,14 +9526,14 @@
                         <m:sSub>
                           <m:sSubPr>
                             <m:ctrlPr>
-                              <a:rPr lang="en-US" altLang="zh-CN" i="1">
+                              <a:rPr lang="en-US" altLang="zh-CN" i="1" strike="sngStrike">
                                 <a:latin typeface="Cambria Math" panose="02040503050406030204" pitchFamily="18" charset="0"/>
                               </a:rPr>
                             </m:ctrlPr>
                           </m:sSubPr>
                           <m:e>
                             <m:r>
-                              <a:rPr lang="en-US" altLang="zh-CN" i="1">
+                              <a:rPr lang="en-US" altLang="zh-CN" i="1" strike="sngStrike">
                                 <a:latin typeface="Cambria Math" panose="02040503050406030204" pitchFamily="18" charset="0"/>
                               </a:rPr>
                               <m:t>𝛼</m:t>
@@ -9417,7 +9541,7 @@
                           </m:e>
                           <m:sub>
                             <m:r>
-                              <a:rPr lang="en-US" altLang="zh-CN" i="1">
+                              <a:rPr lang="en-US" altLang="zh-CN" i="1" strike="sngStrike">
                                 <a:latin typeface="Cambria Math" panose="02040503050406030204" pitchFamily="18" charset="0"/>
                               </a:rPr>
                               <m:t>2</m:t>
@@ -9427,7 +9551,7 @@
                       </m:sup>
                     </m:sSup>
                     <m:r>
-                      <a:rPr lang="en-US" altLang="zh-CN" b="0" i="1" smtClean="0">
+                      <a:rPr lang="en-US" altLang="zh-CN" b="0" i="1" strike="sngStrike" smtClean="0">
                         <a:latin typeface="Cambria Math" panose="02040503050406030204" pitchFamily="18" charset="0"/>
                       </a:rPr>
                       <m:t>,</m:t>
@@ -9435,14 +9559,14 @@
                     <m:sSub>
                       <m:sSubPr>
                         <m:ctrlPr>
-                          <a:rPr lang="en-US" altLang="zh-CN" b="0" i="1" smtClean="0">
+                          <a:rPr lang="en-US" altLang="zh-CN" b="0" i="1" strike="sngStrike" smtClean="0">
                             <a:latin typeface="Cambria Math" panose="02040503050406030204" pitchFamily="18" charset="0"/>
                           </a:rPr>
                         </m:ctrlPr>
                       </m:sSubPr>
                       <m:e>
                         <m:r>
-                          <a:rPr lang="en-US" altLang="zh-CN" b="0" i="1" smtClean="0">
+                          <a:rPr lang="en-US" altLang="zh-CN" b="0" i="1" strike="sngStrike" smtClean="0">
                             <a:latin typeface="Cambria Math" panose="02040503050406030204" pitchFamily="18" charset="0"/>
                           </a:rPr>
                           <m:t>𝛼</m:t>
@@ -9450,7 +9574,7 @@
                       </m:e>
                       <m:sub>
                         <m:r>
-                          <a:rPr lang="en-US" altLang="zh-CN" b="0" i="1" smtClean="0">
+                          <a:rPr lang="en-US" altLang="zh-CN" b="0" i="1" strike="sngStrike" smtClean="0">
                             <a:latin typeface="Cambria Math" panose="02040503050406030204" pitchFamily="18" charset="0"/>
                           </a:rPr>
                           <m:t>1</m:t>
@@ -9458,7 +9582,7 @@
                       </m:sub>
                     </m:sSub>
                     <m:r>
-                      <a:rPr lang="en-US" altLang="zh-CN" b="0" i="1" smtClean="0">
+                      <a:rPr lang="en-US" altLang="zh-CN" b="0" i="1" strike="sngStrike" smtClean="0">
                         <a:latin typeface="Cambria Math" panose="02040503050406030204" pitchFamily="18" charset="0"/>
                       </a:rPr>
                       <m:t>+</m:t>
@@ -9466,14 +9590,14 @@
                     <m:sSub>
                       <m:sSubPr>
                         <m:ctrlPr>
-                          <a:rPr lang="en-US" altLang="zh-CN" b="0" i="1" smtClean="0">
+                          <a:rPr lang="en-US" altLang="zh-CN" b="0" i="1" strike="sngStrike" smtClean="0">
                             <a:latin typeface="Cambria Math" panose="02040503050406030204" pitchFamily="18" charset="0"/>
                           </a:rPr>
                         </m:ctrlPr>
                       </m:sSubPr>
                       <m:e>
                         <m:r>
-                          <a:rPr lang="en-US" altLang="zh-CN" b="0" i="1" smtClean="0">
+                          <a:rPr lang="en-US" altLang="zh-CN" b="0" i="1" strike="sngStrike" smtClean="0">
                             <a:latin typeface="Cambria Math" panose="02040503050406030204" pitchFamily="18" charset="0"/>
                           </a:rPr>
                           <m:t>𝛼</m:t>
@@ -9481,7 +9605,7 @@
                       </m:e>
                       <m:sub>
                         <m:r>
-                          <a:rPr lang="en-US" altLang="zh-CN" b="0" i="1" smtClean="0">
+                          <a:rPr lang="en-US" altLang="zh-CN" b="0" i="1" strike="sngStrike" smtClean="0">
                             <a:latin typeface="Cambria Math" panose="02040503050406030204" pitchFamily="18" charset="0"/>
                           </a:rPr>
                           <m:t>2</m:t>
@@ -9489,14 +9613,14 @@
                       </m:sub>
                     </m:sSub>
                     <m:r>
-                      <a:rPr lang="en-US" altLang="zh-CN" b="0" i="1" smtClean="0">
+                      <a:rPr lang="en-US" altLang="zh-CN" b="0" i="1" strike="sngStrike" smtClean="0">
                         <a:latin typeface="Cambria Math" panose="02040503050406030204" pitchFamily="18" charset="0"/>
                       </a:rPr>
                       <m:t>&lt;1</m:t>
                     </m:r>
                   </m:oMath>
                 </a14:m>
-                <a:endParaRPr lang="en-US" altLang="zh-CN" dirty="0" smtClean="0"/>
+                <a:endParaRPr lang="en-US" altLang="zh-CN" strike="sngStrike" dirty="0" smtClean="0"/>
               </a:p>
               <a:p>
                 <a14:m>
@@ -9632,14 +9756,14 @@
                     <m:sSub>
                       <m:sSubPr>
                         <m:ctrlPr>
-                          <a:rPr lang="en-US" altLang="zh-CN" b="1" i="1">
+                          <a:rPr lang="en-US" altLang="zh-CN" b="1" i="1" strike="sngStrike">
                             <a:latin typeface="Cambria Math" panose="02040503050406030204" pitchFamily="18" charset="0"/>
                           </a:rPr>
                         </m:ctrlPr>
                       </m:sSubPr>
                       <m:e>
                         <m:r>
-                          <a:rPr lang="en-US" altLang="zh-CN" b="1" i="1">
+                          <a:rPr lang="en-US" altLang="zh-CN" b="1" i="1" strike="sngStrike">
                             <a:latin typeface="Cambria Math" panose="02040503050406030204" pitchFamily="18" charset="0"/>
                           </a:rPr>
                           <m:t>𝑪</m:t>
@@ -9647,7 +9771,7 @@
                       </m:e>
                       <m:sub>
                         <m:r>
-                          <a:rPr lang="en-US" altLang="zh-CN" b="1" i="1">
+                          <a:rPr lang="en-US" altLang="zh-CN" b="1" i="1" strike="sngStrike">
                             <a:latin typeface="Cambria Math" panose="02040503050406030204" pitchFamily="18" charset="0"/>
                           </a:rPr>
                           <m:t>𝒕𝒋𝒖𝒏𝒄𝒕</m:t>
@@ -9657,7 +9781,7 @@
                     <m:d>
                       <m:dPr>
                         <m:ctrlPr>
-                          <a:rPr lang="en-US" altLang="zh-CN" b="1" i="1">
+                          <a:rPr lang="en-US" altLang="zh-CN" b="1" i="1" strike="sngStrike">
                             <a:latin typeface="Cambria Math" panose="02040503050406030204" pitchFamily="18" charset="0"/>
                           </a:rPr>
                         </m:ctrlPr>
@@ -9666,14 +9790,14 @@
                         <m:sSub>
                           <m:sSubPr>
                             <m:ctrlPr>
-                              <a:rPr lang="en-US" altLang="zh-CN" b="1" i="1">
+                              <a:rPr lang="en-US" altLang="zh-CN" b="1" i="1" strike="sngStrike">
                                 <a:latin typeface="Cambria Math" panose="02040503050406030204" pitchFamily="18" charset="0"/>
                               </a:rPr>
                             </m:ctrlPr>
                           </m:sSubPr>
                           <m:e>
                             <m:r>
-                              <a:rPr lang="en-US" altLang="zh-CN" b="1" i="1">
+                              <a:rPr lang="en-US" altLang="zh-CN" b="1" i="1" strike="sngStrike">
                                 <a:latin typeface="Cambria Math" panose="02040503050406030204" pitchFamily="18" charset="0"/>
                               </a:rPr>
                               <m:t>𝒓</m:t>
@@ -9681,7 +9805,7 @@
                           </m:e>
                           <m:sub>
                             <m:r>
-                              <a:rPr lang="en-US" altLang="zh-CN" b="1" i="1">
+                              <a:rPr lang="en-US" altLang="zh-CN" b="1" i="1" strike="sngStrike">
                                 <a:latin typeface="Cambria Math" panose="02040503050406030204" pitchFamily="18" charset="0"/>
                               </a:rPr>
                               <m:t>𝒊</m:t>
@@ -9689,7 +9813,7 @@
                           </m:sub>
                         </m:sSub>
                         <m:r>
-                          <a:rPr lang="en-US" altLang="zh-CN" b="1" i="1">
+                          <a:rPr lang="en-US" altLang="zh-CN" b="1" i="1" strike="sngStrike">
                             <a:latin typeface="Cambria Math" panose="02040503050406030204" pitchFamily="18" charset="0"/>
                           </a:rPr>
                           <m:t>,</m:t>
@@ -9697,14 +9821,14 @@
                         <m:sSub>
                           <m:sSubPr>
                             <m:ctrlPr>
-                              <a:rPr lang="en-US" altLang="zh-CN" b="1" i="1">
+                              <a:rPr lang="en-US" altLang="zh-CN" b="1" i="1" strike="sngStrike">
                                 <a:latin typeface="Cambria Math" panose="02040503050406030204" pitchFamily="18" charset="0"/>
                               </a:rPr>
                             </m:ctrlPr>
                           </m:sSubPr>
                           <m:e>
                             <m:r>
-                              <a:rPr lang="en-US" altLang="zh-CN" b="1" i="1">
+                              <a:rPr lang="en-US" altLang="zh-CN" b="1" i="1" strike="sngStrike">
                                 <a:latin typeface="Cambria Math" panose="02040503050406030204" pitchFamily="18" charset="0"/>
                               </a:rPr>
                               <m:t>𝒓</m:t>
@@ -9712,7 +9836,7 @@
                           </m:e>
                           <m:sub>
                             <m:r>
-                              <a:rPr lang="en-US" altLang="zh-CN" b="1" i="1">
+                              <a:rPr lang="en-US" altLang="zh-CN" b="1" i="1" strike="sngStrike">
                                 <a:latin typeface="Cambria Math" panose="02040503050406030204" pitchFamily="18" charset="0"/>
                               </a:rPr>
                               <m:t>𝒋</m:t>
@@ -9722,7 +9846,7 @@
                       </m:e>
                     </m:d>
                     <m:r>
-                      <a:rPr lang="en-US" altLang="zh-CN" b="1" i="1" smtClean="0">
+                      <a:rPr lang="en-US" altLang="zh-CN" b="1" i="1" strike="sngStrike" smtClean="0">
                         <a:latin typeface="Cambria Math" panose="02040503050406030204" pitchFamily="18" charset="0"/>
                       </a:rPr>
                       <m:t>∈</m:t>
@@ -9732,26 +9856,26 @@
                         <m:begChr m:val="["/>
                         <m:endChr m:val="]"/>
                         <m:ctrlPr>
-                          <a:rPr lang="en-US" altLang="zh-CN" b="1" i="1" smtClean="0">
+                          <a:rPr lang="en-US" altLang="zh-CN" b="1" i="1" strike="sngStrike" smtClean="0">
                             <a:latin typeface="Cambria Math" panose="02040503050406030204" pitchFamily="18" charset="0"/>
                           </a:rPr>
                         </m:ctrlPr>
                       </m:dPr>
                       <m:e>
                         <m:r>
-                          <a:rPr lang="en-US" altLang="zh-CN" b="1" i="1" smtClean="0">
+                          <a:rPr lang="en-US" altLang="zh-CN" b="1" i="1" strike="sngStrike" smtClean="0">
                             <a:latin typeface="Cambria Math" panose="02040503050406030204" pitchFamily="18" charset="0"/>
                           </a:rPr>
                           <m:t>𝟎</m:t>
                         </m:r>
                         <m:r>
-                          <a:rPr lang="en-US" altLang="zh-CN" b="1" i="1" smtClean="0">
+                          <a:rPr lang="en-US" altLang="zh-CN" b="1" i="1" strike="sngStrike" smtClean="0">
                             <a:latin typeface="Cambria Math" panose="02040503050406030204" pitchFamily="18" charset="0"/>
                           </a:rPr>
                           <m:t>,</m:t>
                         </m:r>
                         <m:r>
-                          <a:rPr lang="en-US" altLang="zh-CN" b="1" i="1" smtClean="0">
+                          <a:rPr lang="en-US" altLang="zh-CN" b="1" i="1" strike="sngStrike" smtClean="0">
                             <a:latin typeface="Cambria Math" panose="02040503050406030204" pitchFamily="18" charset="0"/>
                           </a:rPr>
                           <m:t>𝟏</m:t>
@@ -9761,18 +9885,18 @@
                   </m:oMath>
                 </a14:m>
                 <a:r>
-                  <a:rPr lang="zh-CN" altLang="en-US" b="1" dirty="0" smtClean="0"/>
+                  <a:rPr lang="zh-CN" altLang="en-US" b="1" strike="sngStrike" dirty="0" smtClean="0"/>
                   <a:t>：区域边界端点为</a:t>
                 </a:r>
                 <a:r>
-                  <a:rPr lang="en-US" altLang="zh-CN" b="1" dirty="0" smtClean="0"/>
+                  <a:rPr lang="en-US" altLang="zh-CN" b="1" strike="sngStrike" dirty="0" smtClean="0"/>
                   <a:t>T</a:t>
                 </a:r>
                 <a:r>
-                  <a:rPr lang="zh-CN" altLang="en-US" b="1" dirty="0" smtClean="0"/>
+                  <a:rPr lang="zh-CN" altLang="en-US" b="1" strike="sngStrike" dirty="0" smtClean="0"/>
                   <a:t>连接的置信度</a:t>
                 </a:r>
-                <a:endParaRPr lang="en-US" altLang="zh-CN" b="1" dirty="0" smtClean="0"/>
+                <a:endParaRPr lang="en-US" altLang="zh-CN" b="1" strike="sngStrike" dirty="0" smtClean="0"/>
               </a:p>
               <a:p>
                 <a:endParaRPr lang="en-US" altLang="zh-CN" dirty="0" smtClean="0"/>
@@ -9915,6 +10039,20 @@
                             <a:latin typeface="Cambria Math" panose="02040503050406030204" pitchFamily="18" charset="0"/>
                           </a:rPr>
                           <m:t>𝑐𝑜𝑛𝑛𝑒𝑐𝑡</m:t>
+                        </m:r>
+                        <m:r>
+                          <a:rPr lang="en-US" altLang="zh-CN" b="0" i="1" smtClean="0">
+                            <a:effectLst/>
+                            <a:latin typeface="Cambria Math" panose="02040503050406030204" pitchFamily="18" charset="0"/>
+                          </a:rPr>
+                          <m:t>_</m:t>
+                        </m:r>
+                        <m:r>
+                          <a:rPr lang="en-US" altLang="zh-CN" b="0" i="1" smtClean="0">
+                            <a:effectLst/>
+                            <a:latin typeface="Cambria Math" panose="02040503050406030204" pitchFamily="18" charset="0"/>
+                          </a:rPr>
+                          <m:t>𝑟𝑟</m:t>
                         </m:r>
                       </m:sub>
                     </m:sSub>
@@ -10491,6 +10629,20 @@
                           </a:rPr>
                           <m:t>𝑑𝑖𝑠𝑐𝑜𝑛𝑛𝑒𝑐𝑡</m:t>
                         </m:r>
+                        <m:r>
+                          <a:rPr lang="en-US" altLang="zh-CN" b="0" i="1" smtClean="0">
+                            <a:effectLst/>
+                            <a:latin typeface="Cambria Math" panose="02040503050406030204" pitchFamily="18" charset="0"/>
+                          </a:rPr>
+                          <m:t>_</m:t>
+                        </m:r>
+                        <m:r>
+                          <a:rPr lang="en-US" altLang="zh-CN" b="0" i="1" smtClean="0">
+                            <a:effectLst/>
+                            <a:latin typeface="Cambria Math" panose="02040503050406030204" pitchFamily="18" charset="0"/>
+                          </a:rPr>
+                          <m:t>𝑟𝑟</m:t>
+                        </m:r>
                       </m:sub>
                     </m:sSub>
                     <m:r>
@@ -10777,6 +10929,9 @@
                     </m:d>
                   </m:oMath>
                 </a14:m>
+                <a:endParaRPr lang="en-US" altLang="zh-CN" dirty="0" smtClean="0"/>
+              </a:p>
+              <a:p>
                 <a:endParaRPr lang="en-US" altLang="zh-CN" dirty="0" smtClean="0"/>
               </a:p>
               <a:p>
@@ -10874,6 +11029,954 @@
           <a:bodyPr/>
           <a:lstStyle/>
           <a:p>
+            <a:r>
+              <a:rPr lang="zh-CN" altLang="en-US" dirty="0" smtClean="0"/>
+              <a:t>术语</a:t>
+            </a:r>
+            <a:endParaRPr lang="zh-CN" altLang="en-US" dirty="0"/>
+          </a:p>
+        </p:txBody>
+      </p:sp>
+      <mc:AlternateContent xmlns:mc="http://schemas.openxmlformats.org/markup-compatibility/2006">
+        <mc:Choice xmlns:a14="http://schemas.microsoft.com/office/drawing/2010/main" Requires="a14">
+          <p:sp>
+            <p:nvSpPr>
+              <p:cNvPr id="3" name="内容占位符 2"/>
+              <p:cNvSpPr>
+                <a:spLocks noGrp="1"/>
+              </p:cNvSpPr>
+              <p:nvPr>
+                <p:ph idx="1"/>
+              </p:nvPr>
+            </p:nvSpPr>
+            <p:spPr/>
+            <p:txBody>
+              <a:bodyPr/>
+              <a:lstStyle/>
+              <a:p>
+                <a14:m>
+                  <m:oMath xmlns:m="http://schemas.openxmlformats.org/officeDocument/2006/math">
+                    <m:r>
+                      <a:rPr lang="en-US" altLang="zh-CN" i="1" smtClean="0">
+                        <a:latin typeface="Cambria Math" panose="02040503050406030204" pitchFamily="18" charset="0"/>
+                      </a:rPr>
+                      <m:t>𝐵</m:t>
+                    </m:r>
+                    <m:d>
+                      <m:dPr>
+                        <m:ctrlPr>
+                          <a:rPr lang="en-US" altLang="zh-CN" i="1">
+                            <a:latin typeface="Cambria Math" panose="02040503050406030204" pitchFamily="18" charset="0"/>
+                          </a:rPr>
+                        </m:ctrlPr>
+                      </m:dPr>
+                      <m:e>
+                        <m:r>
+                          <a:rPr lang="en-US" altLang="zh-CN" b="0" i="1" smtClean="0">
+                            <a:latin typeface="Cambria Math" panose="02040503050406030204" pitchFamily="18" charset="0"/>
+                          </a:rPr>
+                          <m:t>𝑟</m:t>
+                        </m:r>
+                        <m:r>
+                          <a:rPr lang="en-US" altLang="zh-CN" b="0" i="1" smtClean="0">
+                            <a:latin typeface="Cambria Math" panose="02040503050406030204" pitchFamily="18" charset="0"/>
+                          </a:rPr>
+                          <m:t>,</m:t>
+                        </m:r>
+                        <m:r>
+                          <a:rPr lang="en-US" altLang="zh-CN" b="0" i="1" smtClean="0">
+                            <a:latin typeface="Cambria Math" panose="02040503050406030204" pitchFamily="18" charset="0"/>
+                          </a:rPr>
+                          <m:t>𝑙</m:t>
+                        </m:r>
+                        <m:r>
+                          <a:rPr lang="en-US" altLang="zh-CN" i="1">
+                            <a:latin typeface="Cambria Math" panose="02040503050406030204" pitchFamily="18" charset="0"/>
+                          </a:rPr>
+                          <m:t>,</m:t>
+                        </m:r>
+                        <m:r>
+                          <a:rPr lang="en-US" altLang="zh-CN" i="1">
+                            <a:latin typeface="Cambria Math" panose="02040503050406030204" pitchFamily="18" charset="0"/>
+                          </a:rPr>
+                          <m:t>𝑎</m:t>
+                        </m:r>
+                      </m:e>
+                    </m:d>
+                    <m:r>
+                      <a:rPr lang="en-US" altLang="zh-CN" i="1">
+                        <a:latin typeface="Cambria Math" panose="02040503050406030204" pitchFamily="18" charset="0"/>
+                      </a:rPr>
+                      <m:t>=</m:t>
+                    </m:r>
+                    <m:d>
+                      <m:dPr>
+                        <m:begChr m:val="{"/>
+                        <m:endChr m:val="}"/>
+                        <m:ctrlPr>
+                          <a:rPr lang="en-US" altLang="zh-CN" i="1">
+                            <a:latin typeface="Cambria Math" panose="02040503050406030204" pitchFamily="18" charset="0"/>
+                          </a:rPr>
+                        </m:ctrlPr>
+                      </m:dPr>
+                      <m:e>
+                        <m:sSub>
+                          <m:sSubPr>
+                            <m:ctrlPr>
+                              <a:rPr lang="en-US" altLang="zh-CN" b="0" i="1" smtClean="0">
+                                <a:latin typeface="Cambria Math" panose="02040503050406030204" pitchFamily="18" charset="0"/>
+                              </a:rPr>
+                            </m:ctrlPr>
+                          </m:sSubPr>
+                          <m:e>
+                            <m:r>
+                              <a:rPr lang="en-US" altLang="zh-CN" b="0" i="1" smtClean="0">
+                                <a:latin typeface="Cambria Math" panose="02040503050406030204" pitchFamily="18" charset="0"/>
+                              </a:rPr>
+                              <m:t>𝑝</m:t>
+                            </m:r>
+                          </m:e>
+                          <m:sub>
+                            <m:r>
+                              <a:rPr lang="en-US" altLang="zh-CN" b="0" i="1" smtClean="0">
+                                <a:latin typeface="Cambria Math" panose="02040503050406030204" pitchFamily="18" charset="0"/>
+                              </a:rPr>
+                              <m:t>1</m:t>
+                            </m:r>
+                          </m:sub>
+                        </m:sSub>
+                        <m:r>
+                          <a:rPr lang="en-US" altLang="zh-CN" b="0" i="1" smtClean="0">
+                            <a:latin typeface="Cambria Math" panose="02040503050406030204" pitchFamily="18" charset="0"/>
+                          </a:rPr>
+                          <m:t>,</m:t>
+                        </m:r>
+                        <m:sSub>
+                          <m:sSubPr>
+                            <m:ctrlPr>
+                              <a:rPr lang="en-US" altLang="zh-CN" b="0" i="1" smtClean="0">
+                                <a:latin typeface="Cambria Math" panose="02040503050406030204" pitchFamily="18" charset="0"/>
+                              </a:rPr>
+                            </m:ctrlPr>
+                          </m:sSubPr>
+                          <m:e>
+                            <m:r>
+                              <a:rPr lang="en-US" altLang="zh-CN" b="0" i="1" smtClean="0">
+                                <a:latin typeface="Cambria Math" panose="02040503050406030204" pitchFamily="18" charset="0"/>
+                              </a:rPr>
+                              <m:t>𝑝</m:t>
+                            </m:r>
+                          </m:e>
+                          <m:sub>
+                            <m:r>
+                              <a:rPr lang="en-US" altLang="zh-CN" b="0" i="1" smtClean="0">
+                                <a:latin typeface="Cambria Math" panose="02040503050406030204" pitchFamily="18" charset="0"/>
+                              </a:rPr>
+                              <m:t>2</m:t>
+                            </m:r>
+                          </m:sub>
+                        </m:sSub>
+                        <m:r>
+                          <a:rPr lang="en-US" altLang="zh-CN" b="0" i="1" smtClean="0">
+                            <a:latin typeface="Cambria Math" panose="02040503050406030204" pitchFamily="18" charset="0"/>
+                          </a:rPr>
+                          <m:t>,…</m:t>
+                        </m:r>
+                      </m:e>
+                    </m:d>
+                  </m:oMath>
+                </a14:m>
+                <a:r>
+                  <a:rPr lang="zh-CN" altLang="en-US" dirty="0"/>
+                  <a:t>：</a:t>
+                </a:r>
+                <a14:m>
+                  <m:oMath xmlns:m="http://schemas.openxmlformats.org/officeDocument/2006/math">
+                    <m:r>
+                      <a:rPr lang="en-US" altLang="zh-CN" b="0" i="1" dirty="0" smtClean="0">
+                        <a:latin typeface="Cambria Math" panose="02040503050406030204" pitchFamily="18" charset="0"/>
+                      </a:rPr>
+                      <m:t>𝑙</m:t>
+                    </m:r>
+                  </m:oMath>
+                </a14:m>
+                <a:r>
+                  <a:rPr lang="zh-CN" altLang="en-US" dirty="0" smtClean="0"/>
+                  <a:t> 在穿过 </a:t>
+                </a:r>
+                <a14:m>
+                  <m:oMath xmlns:m="http://schemas.openxmlformats.org/officeDocument/2006/math">
+                    <m:r>
+                      <a:rPr lang="en-US" altLang="zh-CN" b="0" i="1" smtClean="0">
+                        <a:latin typeface="Cambria Math" panose="02040503050406030204" pitchFamily="18" charset="0"/>
+                      </a:rPr>
+                      <m:t>𝑟</m:t>
+                    </m:r>
+                  </m:oMath>
+                </a14:m>
+                <a:r>
+                  <a:rPr lang="zh-CN" altLang="en-US" dirty="0" smtClean="0"/>
+                  <a:t> 的部分等距</a:t>
+                </a:r>
+                <a:r>
+                  <a:rPr lang="zh-CN" altLang="en-US" dirty="0"/>
+                  <a:t>（间距</a:t>
+                </a:r>
+                <a14:m>
+                  <m:oMath xmlns:m="http://schemas.openxmlformats.org/officeDocument/2006/math">
+                    <m:r>
+                      <a:rPr lang="en-US" altLang="zh-CN" i="1">
+                        <a:latin typeface="Cambria Math" panose="02040503050406030204" pitchFamily="18" charset="0"/>
+                      </a:rPr>
+                      <m:t>𝑎</m:t>
+                    </m:r>
+                  </m:oMath>
+                </a14:m>
+                <a:r>
+                  <a:rPr lang="zh-CN" altLang="en-US" dirty="0"/>
+                  <a:t>）采样获得的顶点</a:t>
+                </a:r>
+                <a:r>
+                  <a:rPr lang="zh-CN" altLang="en-US" dirty="0" smtClean="0"/>
+                  <a:t>集合</a:t>
+                </a:r>
+                <a:endParaRPr lang="en-US" altLang="zh-CN" dirty="0" smtClean="0"/>
+              </a:p>
+              <a:p>
+                <a14:m>
+                  <m:oMath xmlns:m="http://schemas.openxmlformats.org/officeDocument/2006/math">
+                    <m:sSub>
+                      <m:sSubPr>
+                        <m:ctrlPr>
+                          <a:rPr lang="en-US" altLang="zh-CN" i="1">
+                            <a:latin typeface="Cambria Math" panose="02040503050406030204" pitchFamily="18" charset="0"/>
+                          </a:rPr>
+                        </m:ctrlPr>
+                      </m:sSubPr>
+                      <m:e>
+                        <m:r>
+                          <a:rPr lang="en-US" altLang="zh-CN" i="1">
+                            <a:latin typeface="Cambria Math" panose="02040503050406030204" pitchFamily="18" charset="0"/>
+                          </a:rPr>
+                          <m:t>𝐸</m:t>
+                        </m:r>
+                      </m:e>
+                      <m:sub>
+                        <m:r>
+                          <a:rPr lang="en-US" altLang="zh-CN" i="1">
+                            <a:latin typeface="Cambria Math" panose="02040503050406030204" pitchFamily="18" charset="0"/>
+                          </a:rPr>
+                          <m:t>𝑐𝑜𝑛𝑛𝑒𝑐𝑡</m:t>
+                        </m:r>
+                      </m:sub>
+                    </m:sSub>
+                    <m:d>
+                      <m:dPr>
+                        <m:ctrlPr>
+                          <a:rPr lang="en-US" altLang="zh-CN" i="1">
+                            <a:latin typeface="Cambria Math" panose="02040503050406030204" pitchFamily="18" charset="0"/>
+                          </a:rPr>
+                        </m:ctrlPr>
+                      </m:dPr>
+                      <m:e>
+                        <m:r>
+                          <a:rPr lang="en-US" altLang="zh-CN" b="0" i="1" smtClean="0">
+                            <a:latin typeface="Cambria Math" panose="02040503050406030204" pitchFamily="18" charset="0"/>
+                          </a:rPr>
+                          <m:t>𝑟</m:t>
+                        </m:r>
+                        <m:r>
+                          <a:rPr lang="en-US" altLang="zh-CN" i="1">
+                            <a:latin typeface="Cambria Math" panose="02040503050406030204" pitchFamily="18" charset="0"/>
+                          </a:rPr>
+                          <m:t>,</m:t>
+                        </m:r>
+                        <m:r>
+                          <a:rPr lang="en-US" altLang="zh-CN" b="0" i="1" smtClean="0">
+                            <a:latin typeface="Cambria Math" panose="02040503050406030204" pitchFamily="18" charset="0"/>
+                          </a:rPr>
+                          <m:t>𝑙</m:t>
+                        </m:r>
+                      </m:e>
+                    </m:d>
+                    <m:r>
+                      <a:rPr lang="en-US" altLang="zh-CN" i="1">
+                        <a:latin typeface="Cambria Math" panose="02040503050406030204" pitchFamily="18" charset="0"/>
+                      </a:rPr>
+                      <m:t>=</m:t>
+                    </m:r>
+                    <m:sSub>
+                      <m:sSubPr>
+                        <m:ctrlPr>
+                          <a:rPr lang="en-US" altLang="zh-CN" i="1">
+                            <a:latin typeface="Cambria Math" panose="02040503050406030204" pitchFamily="18" charset="0"/>
+                          </a:rPr>
+                        </m:ctrlPr>
+                      </m:sSubPr>
+                      <m:e>
+                        <m:r>
+                          <a:rPr lang="en-US" altLang="zh-CN" i="1">
+                            <a:latin typeface="Cambria Math" panose="02040503050406030204" pitchFamily="18" charset="0"/>
+                          </a:rPr>
+                          <m:t>𝑤</m:t>
+                        </m:r>
+                      </m:e>
+                      <m:sub>
+                        <m:r>
+                          <a:rPr lang="en-US" altLang="zh-CN" i="1">
+                            <a:latin typeface="Cambria Math" panose="02040503050406030204" pitchFamily="18" charset="0"/>
+                          </a:rPr>
+                          <m:t>𝑐𝑜𝑛𝑛𝑒𝑐𝑡</m:t>
+                        </m:r>
+                        <m:r>
+                          <a:rPr lang="en-US" altLang="zh-CN" b="0" i="1" smtClean="0">
+                            <a:latin typeface="Cambria Math" panose="02040503050406030204" pitchFamily="18" charset="0"/>
+                          </a:rPr>
+                          <m:t>_</m:t>
+                        </m:r>
+                        <m:r>
+                          <a:rPr lang="en-US" altLang="zh-CN" b="0" i="1" smtClean="0">
+                            <a:latin typeface="Cambria Math" panose="02040503050406030204" pitchFamily="18" charset="0"/>
+                          </a:rPr>
+                          <m:t>𝑟𝑙</m:t>
+                        </m:r>
+                      </m:sub>
+                    </m:sSub>
+                    <m:nary>
+                      <m:naryPr>
+                        <m:chr m:val="∑"/>
+                        <m:supHide m:val="on"/>
+                        <m:ctrlPr>
+                          <a:rPr lang="en-US" altLang="zh-CN" i="1">
+                            <a:latin typeface="Cambria Math" panose="02040503050406030204" pitchFamily="18" charset="0"/>
+                          </a:rPr>
+                        </m:ctrlPr>
+                      </m:naryPr>
+                      <m:sub>
+                        <m:r>
+                          <m:rPr>
+                            <m:brk m:alnAt="7"/>
+                          </m:rPr>
+                          <a:rPr lang="en-US" altLang="zh-CN" i="1">
+                            <a:latin typeface="Cambria Math" panose="02040503050406030204" pitchFamily="18" charset="0"/>
+                          </a:rPr>
+                          <m:t>𝑝</m:t>
+                        </m:r>
+                        <m:r>
+                          <a:rPr lang="en-US" altLang="zh-CN" i="1">
+                            <a:latin typeface="Cambria Math" panose="02040503050406030204" pitchFamily="18" charset="0"/>
+                          </a:rPr>
+                          <m:t>∈</m:t>
+                        </m:r>
+                        <m:r>
+                          <a:rPr lang="en-US" altLang="zh-CN" i="1">
+                            <a:latin typeface="Cambria Math" panose="02040503050406030204" pitchFamily="18" charset="0"/>
+                          </a:rPr>
+                          <m:t>𝐵</m:t>
+                        </m:r>
+                        <m:d>
+                          <m:dPr>
+                            <m:ctrlPr>
+                              <a:rPr lang="en-US" altLang="zh-CN" i="1">
+                                <a:latin typeface="Cambria Math" panose="02040503050406030204" pitchFamily="18" charset="0"/>
+                              </a:rPr>
+                            </m:ctrlPr>
+                          </m:dPr>
+                          <m:e>
+                            <m:r>
+                              <a:rPr lang="en-US" altLang="zh-CN" i="1">
+                                <a:latin typeface="Cambria Math" panose="02040503050406030204" pitchFamily="18" charset="0"/>
+                              </a:rPr>
+                              <m:t>𝑟</m:t>
+                            </m:r>
+                            <m:r>
+                              <a:rPr lang="en-US" altLang="zh-CN" i="1">
+                                <a:latin typeface="Cambria Math" panose="02040503050406030204" pitchFamily="18" charset="0"/>
+                              </a:rPr>
+                              <m:t>,</m:t>
+                            </m:r>
+                            <m:r>
+                              <a:rPr lang="en-US" altLang="zh-CN" i="1">
+                                <a:latin typeface="Cambria Math" panose="02040503050406030204" pitchFamily="18" charset="0"/>
+                              </a:rPr>
+                              <m:t>𝑙</m:t>
+                            </m:r>
+                            <m:r>
+                              <a:rPr lang="en-US" altLang="zh-CN" i="1">
+                                <a:latin typeface="Cambria Math" panose="02040503050406030204" pitchFamily="18" charset="0"/>
+                              </a:rPr>
+                              <m:t>,</m:t>
+                            </m:r>
+                            <m:r>
+                              <a:rPr lang="en-US" altLang="zh-CN" i="1">
+                                <a:latin typeface="Cambria Math" panose="02040503050406030204" pitchFamily="18" charset="0"/>
+                              </a:rPr>
+                              <m:t>𝑎</m:t>
+                            </m:r>
+                          </m:e>
+                        </m:d>
+                      </m:sub>
+                      <m:sup/>
+                      <m:e>
+                        <m:sSup>
+                          <m:sSupPr>
+                            <m:ctrlPr>
+                              <a:rPr lang="en-US" altLang="zh-CN" i="1">
+                                <a:latin typeface="Cambria Math" panose="02040503050406030204" pitchFamily="18" charset="0"/>
+                              </a:rPr>
+                            </m:ctrlPr>
+                          </m:sSupPr>
+                          <m:e>
+                            <m:d>
+                              <m:dPr>
+                                <m:ctrlPr>
+                                  <a:rPr lang="en-US" altLang="zh-CN" i="1">
+                                    <a:latin typeface="Cambria Math" panose="02040503050406030204" pitchFamily="18" charset="0"/>
+                                  </a:rPr>
+                                </m:ctrlPr>
+                              </m:dPr>
+                              <m:e>
+                                <m:sSub>
+                                  <m:sSubPr>
+                                    <m:ctrlPr>
+                                      <a:rPr lang="en-US" altLang="zh-CN" i="1">
+                                        <a:latin typeface="Cambria Math" panose="02040503050406030204" pitchFamily="18" charset="0"/>
+                                      </a:rPr>
+                                    </m:ctrlPr>
+                                  </m:sSubPr>
+                                  <m:e>
+                                    <m:r>
+                                      <a:rPr lang="en-US" altLang="zh-CN" i="1">
+                                        <a:latin typeface="Cambria Math" panose="02040503050406030204" pitchFamily="18" charset="0"/>
+                                      </a:rPr>
+                                      <m:t>𝜆</m:t>
+                                    </m:r>
+                                  </m:e>
+                                  <m:sub>
+                                    <m:r>
+                                      <a:rPr lang="en-US" altLang="zh-CN" b="0" i="1" smtClean="0">
+                                        <a:latin typeface="Cambria Math" panose="02040503050406030204" pitchFamily="18" charset="0"/>
+                                      </a:rPr>
+                                      <m:t>𝑟</m:t>
+                                    </m:r>
+                                  </m:sub>
+                                </m:sSub>
+                                <m:d>
+                                  <m:dPr>
+                                    <m:ctrlPr>
+                                      <a:rPr lang="en-US" altLang="zh-CN" i="1">
+                                        <a:latin typeface="Cambria Math" panose="02040503050406030204" pitchFamily="18" charset="0"/>
+                                      </a:rPr>
+                                    </m:ctrlPr>
+                                  </m:dPr>
+                                  <m:e>
+                                    <m:r>
+                                      <a:rPr lang="en-US" altLang="zh-CN" i="1">
+                                        <a:latin typeface="Cambria Math" panose="02040503050406030204" pitchFamily="18" charset="0"/>
+                                      </a:rPr>
+                                      <m:t>𝑝</m:t>
+                                    </m:r>
+                                  </m:e>
+                                </m:d>
+                                <m:r>
+                                  <a:rPr lang="en-US" altLang="zh-CN" i="1">
+                                    <a:latin typeface="Cambria Math" panose="02040503050406030204" pitchFamily="18" charset="0"/>
+                                  </a:rPr>
+                                  <m:t>−</m:t>
+                                </m:r>
+                                <m:sSub>
+                                  <m:sSubPr>
+                                    <m:ctrlPr>
+                                      <a:rPr lang="en-US" altLang="zh-CN" i="1">
+                                        <a:latin typeface="Cambria Math" panose="02040503050406030204" pitchFamily="18" charset="0"/>
+                                      </a:rPr>
+                                    </m:ctrlPr>
+                                  </m:sSubPr>
+                                  <m:e>
+                                    <m:r>
+                                      <a:rPr lang="en-US" altLang="zh-CN" i="1">
+                                        <a:latin typeface="Cambria Math" panose="02040503050406030204" pitchFamily="18" charset="0"/>
+                                      </a:rPr>
+                                      <m:t>𝜆</m:t>
+                                    </m:r>
+                                  </m:e>
+                                  <m:sub>
+                                    <m:r>
+                                      <a:rPr lang="en-US" altLang="zh-CN" b="0" i="1" smtClean="0">
+                                        <a:latin typeface="Cambria Math" panose="02040503050406030204" pitchFamily="18" charset="0"/>
+                                      </a:rPr>
+                                      <m:t>𝑙</m:t>
+                                    </m:r>
+                                  </m:sub>
+                                </m:sSub>
+                                <m:d>
+                                  <m:dPr>
+                                    <m:ctrlPr>
+                                      <a:rPr lang="en-US" altLang="zh-CN" i="1">
+                                        <a:latin typeface="Cambria Math" panose="02040503050406030204" pitchFamily="18" charset="0"/>
+                                      </a:rPr>
+                                    </m:ctrlPr>
+                                  </m:dPr>
+                                  <m:e>
+                                    <m:r>
+                                      <a:rPr lang="en-US" altLang="zh-CN" i="1">
+                                        <a:latin typeface="Cambria Math" panose="02040503050406030204" pitchFamily="18" charset="0"/>
+                                      </a:rPr>
+                                      <m:t>𝑝</m:t>
+                                    </m:r>
+                                  </m:e>
+                                </m:d>
+                              </m:e>
+                            </m:d>
+                          </m:e>
+                          <m:sup>
+                            <m:r>
+                              <a:rPr lang="en-US" altLang="zh-CN" i="1">
+                                <a:latin typeface="Cambria Math" panose="02040503050406030204" pitchFamily="18" charset="0"/>
+                              </a:rPr>
+                              <m:t>2</m:t>
+                            </m:r>
+                          </m:sup>
+                        </m:sSup>
+                      </m:e>
+                    </m:nary>
+                    <m:r>
+                      <a:rPr lang="en-US" altLang="zh-CN" i="1">
+                        <a:latin typeface="Cambria Math" panose="02040503050406030204" pitchFamily="18" charset="0"/>
+                      </a:rPr>
+                      <m:t>×</m:t>
+                    </m:r>
+                    <m:d>
+                      <m:dPr>
+                        <m:ctrlPr>
+                          <a:rPr lang="en-US" altLang="zh-CN" i="1">
+                            <a:latin typeface="Cambria Math" panose="02040503050406030204" pitchFamily="18" charset="0"/>
+                          </a:rPr>
+                        </m:ctrlPr>
+                      </m:dPr>
+                      <m:e>
+                        <m:sSub>
+                          <m:sSubPr>
+                            <m:ctrlPr>
+                              <a:rPr lang="en-US" altLang="zh-CN" i="1">
+                                <a:latin typeface="Cambria Math" panose="02040503050406030204" pitchFamily="18" charset="0"/>
+                              </a:rPr>
+                            </m:ctrlPr>
+                          </m:sSubPr>
+                          <m:e>
+                            <m:r>
+                              <a:rPr lang="en-US" altLang="zh-CN" i="1">
+                                <a:latin typeface="Cambria Math" panose="02040503050406030204" pitchFamily="18" charset="0"/>
+                              </a:rPr>
+                              <m:t>𝐶</m:t>
+                            </m:r>
+                          </m:e>
+                          <m:sub>
+                            <m:r>
+                              <a:rPr lang="en-US" altLang="zh-CN" i="1">
+                                <a:latin typeface="Cambria Math" panose="02040503050406030204" pitchFamily="18" charset="0"/>
+                              </a:rPr>
+                              <m:t>𝑜𝑐𝑐𝑙𝑢𝑑𝑒</m:t>
+                            </m:r>
+                          </m:sub>
+                        </m:sSub>
+                        <m:d>
+                          <m:dPr>
+                            <m:ctrlPr>
+                              <a:rPr lang="en-US" altLang="zh-CN" i="1">
+                                <a:latin typeface="Cambria Math" panose="02040503050406030204" pitchFamily="18" charset="0"/>
+                              </a:rPr>
+                            </m:ctrlPr>
+                          </m:dPr>
+                          <m:e>
+                            <m:r>
+                              <a:rPr lang="en-US" altLang="zh-CN" i="1">
+                                <a:latin typeface="Cambria Math" panose="02040503050406030204" pitchFamily="18" charset="0"/>
+                              </a:rPr>
+                              <m:t>𝑟</m:t>
+                            </m:r>
+                            <m:r>
+                              <a:rPr lang="en-US" altLang="zh-CN" i="1">
+                                <a:latin typeface="Cambria Math" panose="02040503050406030204" pitchFamily="18" charset="0"/>
+                              </a:rPr>
+                              <m:t>,</m:t>
+                            </m:r>
+                            <m:r>
+                              <a:rPr lang="en-US" altLang="zh-CN" i="1">
+                                <a:latin typeface="Cambria Math" panose="02040503050406030204" pitchFamily="18" charset="0"/>
+                              </a:rPr>
+                              <m:t>𝑙</m:t>
+                            </m:r>
+                          </m:e>
+                        </m:d>
+                      </m:e>
+                    </m:d>
+                  </m:oMath>
+                </a14:m>
+                <a:endParaRPr lang="en-US" altLang="zh-CN" dirty="0"/>
+              </a:p>
+              <a:p>
+                <a14:m>
+                  <m:oMath xmlns:m="http://schemas.openxmlformats.org/officeDocument/2006/math">
+                    <m:sSub>
+                      <m:sSubPr>
+                        <m:ctrlPr>
+                          <a:rPr lang="en-US" altLang="zh-CN" i="1">
+                            <a:latin typeface="Cambria Math" panose="02040503050406030204" pitchFamily="18" charset="0"/>
+                          </a:rPr>
+                        </m:ctrlPr>
+                      </m:sSubPr>
+                      <m:e>
+                        <m:r>
+                          <a:rPr lang="en-US" altLang="zh-CN" i="1">
+                            <a:latin typeface="Cambria Math" panose="02040503050406030204" pitchFamily="18" charset="0"/>
+                          </a:rPr>
+                          <m:t>𝐸</m:t>
+                        </m:r>
+                      </m:e>
+                      <m:sub>
+                        <m:r>
+                          <a:rPr lang="en-US" altLang="zh-CN" i="1">
+                            <a:latin typeface="Cambria Math" panose="02040503050406030204" pitchFamily="18" charset="0"/>
+                          </a:rPr>
+                          <m:t>𝑑𝑖𝑠𝑐𝑜𝑛𝑛𝑒𝑐𝑡</m:t>
+                        </m:r>
+                      </m:sub>
+                    </m:sSub>
+                    <m:d>
+                      <m:dPr>
+                        <m:ctrlPr>
+                          <a:rPr lang="en-US" altLang="zh-CN" i="1">
+                            <a:latin typeface="Cambria Math" panose="02040503050406030204" pitchFamily="18" charset="0"/>
+                          </a:rPr>
+                        </m:ctrlPr>
+                      </m:dPr>
+                      <m:e>
+                        <m:r>
+                          <a:rPr lang="en-US" altLang="zh-CN" b="0" i="1" smtClean="0">
+                            <a:latin typeface="Cambria Math" panose="02040503050406030204" pitchFamily="18" charset="0"/>
+                          </a:rPr>
+                          <m:t>𝑟</m:t>
+                        </m:r>
+                        <m:r>
+                          <a:rPr lang="en-US" altLang="zh-CN" b="0" i="1" smtClean="0">
+                            <a:latin typeface="Cambria Math" panose="02040503050406030204" pitchFamily="18" charset="0"/>
+                          </a:rPr>
+                          <m:t>,</m:t>
+                        </m:r>
+                        <m:r>
+                          <a:rPr lang="en-US" altLang="zh-CN" b="0" i="1" smtClean="0">
+                            <a:latin typeface="Cambria Math" panose="02040503050406030204" pitchFamily="18" charset="0"/>
+                          </a:rPr>
+                          <m:t>𝑙</m:t>
+                        </m:r>
+                        <m:r>
+                          <a:rPr lang="en-US" altLang="zh-CN" i="1" smtClean="0">
+                            <a:latin typeface="Cambria Math" panose="02040503050406030204" pitchFamily="18" charset="0"/>
+                          </a:rPr>
+                          <m:t> </m:t>
+                        </m:r>
+                      </m:e>
+                    </m:d>
+                    <m:r>
+                      <a:rPr lang="en-US" altLang="zh-CN" i="1">
+                        <a:latin typeface="Cambria Math" panose="02040503050406030204" pitchFamily="18" charset="0"/>
+                      </a:rPr>
+                      <m:t>=</m:t>
+                    </m:r>
+                    <m:sSub>
+                      <m:sSubPr>
+                        <m:ctrlPr>
+                          <a:rPr lang="en-US" altLang="zh-CN" i="1">
+                            <a:latin typeface="Cambria Math" panose="02040503050406030204" pitchFamily="18" charset="0"/>
+                          </a:rPr>
+                        </m:ctrlPr>
+                      </m:sSubPr>
+                      <m:e>
+                        <m:r>
+                          <a:rPr lang="en-US" altLang="zh-CN" i="1">
+                            <a:latin typeface="Cambria Math" panose="02040503050406030204" pitchFamily="18" charset="0"/>
+                          </a:rPr>
+                          <m:t>𝑤</m:t>
+                        </m:r>
+                      </m:e>
+                      <m:sub>
+                        <m:r>
+                          <a:rPr lang="en-US" altLang="zh-CN" i="1">
+                            <a:latin typeface="Cambria Math" panose="02040503050406030204" pitchFamily="18" charset="0"/>
+                          </a:rPr>
+                          <m:t>𝑑𝑖𝑠𝑐𝑜𝑛𝑛𝑒𝑐𝑡</m:t>
+                        </m:r>
+                        <m:r>
+                          <a:rPr lang="en-US" altLang="zh-CN" b="0" i="1" smtClean="0">
+                            <a:latin typeface="Cambria Math" panose="02040503050406030204" pitchFamily="18" charset="0"/>
+                          </a:rPr>
+                          <m:t>_</m:t>
+                        </m:r>
+                        <m:r>
+                          <a:rPr lang="en-US" altLang="zh-CN" b="0" i="1" smtClean="0">
+                            <a:latin typeface="Cambria Math" panose="02040503050406030204" pitchFamily="18" charset="0"/>
+                          </a:rPr>
+                          <m:t>𝑟𝑙</m:t>
+                        </m:r>
+                      </m:sub>
+                    </m:sSub>
+                    <m:r>
+                      <a:rPr lang="en-US" altLang="zh-CN" i="1">
+                        <a:latin typeface="Cambria Math" panose="02040503050406030204" pitchFamily="18" charset="0"/>
+                      </a:rPr>
+                      <m:t>×</m:t>
+                    </m:r>
+                    <m:d>
+                      <m:dPr>
+                        <m:begChr m:val="‖"/>
+                        <m:endChr m:val="‖"/>
+                        <m:ctrlPr>
+                          <a:rPr lang="en-US" altLang="zh-CN" i="1">
+                            <a:solidFill>
+                              <a:srgbClr val="FF0000"/>
+                            </a:solidFill>
+                            <a:latin typeface="Cambria Math" panose="02040503050406030204" pitchFamily="18" charset="0"/>
+                          </a:rPr>
+                        </m:ctrlPr>
+                      </m:dPr>
+                      <m:e>
+                        <m:r>
+                          <a:rPr lang="en-US" altLang="zh-CN" i="1">
+                            <a:solidFill>
+                              <a:srgbClr val="FF0000"/>
+                            </a:solidFill>
+                            <a:latin typeface="Cambria Math" panose="02040503050406030204" pitchFamily="18" charset="0"/>
+                          </a:rPr>
+                          <m:t>𝐵</m:t>
+                        </m:r>
+                        <m:d>
+                          <m:dPr>
+                            <m:ctrlPr>
+                              <a:rPr lang="en-US" altLang="zh-CN" i="1">
+                                <a:solidFill>
+                                  <a:srgbClr val="FF0000"/>
+                                </a:solidFill>
+                                <a:latin typeface="Cambria Math" panose="02040503050406030204" pitchFamily="18" charset="0"/>
+                              </a:rPr>
+                            </m:ctrlPr>
+                          </m:dPr>
+                          <m:e>
+                            <m:r>
+                              <a:rPr lang="en-US" altLang="zh-CN" i="1" smtClean="0">
+                                <a:solidFill>
+                                  <a:srgbClr val="FF0000"/>
+                                </a:solidFill>
+                                <a:latin typeface="Cambria Math" panose="02040503050406030204" pitchFamily="18" charset="0"/>
+                              </a:rPr>
+                              <m:t>𝑟</m:t>
+                            </m:r>
+                            <m:r>
+                              <a:rPr lang="en-US" altLang="zh-CN" i="1">
+                                <a:solidFill>
+                                  <a:srgbClr val="FF0000"/>
+                                </a:solidFill>
+                                <a:latin typeface="Cambria Math" panose="02040503050406030204" pitchFamily="18" charset="0"/>
+                              </a:rPr>
+                              <m:t>,</m:t>
+                            </m:r>
+                            <m:r>
+                              <a:rPr lang="en-US" altLang="zh-CN" i="1">
+                                <a:solidFill>
+                                  <a:srgbClr val="FF0000"/>
+                                </a:solidFill>
+                                <a:latin typeface="Cambria Math" panose="02040503050406030204" pitchFamily="18" charset="0"/>
+                              </a:rPr>
+                              <m:t>𝑙</m:t>
+                            </m:r>
+                            <m:r>
+                              <a:rPr lang="en-US" altLang="zh-CN" b="0" i="1" smtClean="0">
+                                <a:solidFill>
+                                  <a:srgbClr val="FF0000"/>
+                                </a:solidFill>
+                                <a:latin typeface="Cambria Math" panose="02040503050406030204" pitchFamily="18" charset="0"/>
+                              </a:rPr>
+                              <m:t>,</m:t>
+                            </m:r>
+                            <m:r>
+                              <a:rPr lang="en-US" altLang="zh-CN" i="1">
+                                <a:solidFill>
+                                  <a:srgbClr val="FF0000"/>
+                                </a:solidFill>
+                                <a:latin typeface="Cambria Math" panose="02040503050406030204" pitchFamily="18" charset="0"/>
+                              </a:rPr>
+                              <m:t>𝑎</m:t>
+                            </m:r>
+                          </m:e>
+                        </m:d>
+                      </m:e>
+                    </m:d>
+                    <m:r>
+                      <a:rPr lang="en-US" altLang="zh-CN" i="1">
+                        <a:latin typeface="Cambria Math" panose="02040503050406030204" pitchFamily="18" charset="0"/>
+                      </a:rPr>
+                      <m:t>×</m:t>
+                    </m:r>
+                    <m:d>
+                      <m:dPr>
+                        <m:ctrlPr>
+                          <a:rPr lang="en-US" altLang="zh-CN" i="1">
+                            <a:latin typeface="Cambria Math" panose="02040503050406030204" pitchFamily="18" charset="0"/>
+                          </a:rPr>
+                        </m:ctrlPr>
+                      </m:dPr>
+                      <m:e>
+                        <m:r>
+                          <a:rPr lang="en-US" altLang="zh-CN" i="1">
+                            <a:latin typeface="Cambria Math" panose="02040503050406030204" pitchFamily="18" charset="0"/>
+                          </a:rPr>
+                          <m:t>1−</m:t>
+                        </m:r>
+                        <m:sSub>
+                          <m:sSubPr>
+                            <m:ctrlPr>
+                              <a:rPr lang="en-US" altLang="zh-CN" i="1">
+                                <a:latin typeface="Cambria Math" panose="02040503050406030204" pitchFamily="18" charset="0"/>
+                              </a:rPr>
+                            </m:ctrlPr>
+                          </m:sSubPr>
+                          <m:e>
+                            <m:r>
+                              <a:rPr lang="en-US" altLang="zh-CN" i="1">
+                                <a:latin typeface="Cambria Math" panose="02040503050406030204" pitchFamily="18" charset="0"/>
+                              </a:rPr>
+                              <m:t>𝐶</m:t>
+                            </m:r>
+                          </m:e>
+                          <m:sub>
+                            <m:r>
+                              <a:rPr lang="en-US" altLang="zh-CN" i="1">
+                                <a:latin typeface="Cambria Math" panose="02040503050406030204" pitchFamily="18" charset="0"/>
+                              </a:rPr>
+                              <m:t>𝑜𝑐𝑐𝑙𝑢𝑑𝑒</m:t>
+                            </m:r>
+                          </m:sub>
+                        </m:sSub>
+                        <m:d>
+                          <m:dPr>
+                            <m:ctrlPr>
+                              <a:rPr lang="en-US" altLang="zh-CN" i="1">
+                                <a:latin typeface="Cambria Math" panose="02040503050406030204" pitchFamily="18" charset="0"/>
+                              </a:rPr>
+                            </m:ctrlPr>
+                          </m:dPr>
+                          <m:e>
+                            <m:r>
+                              <a:rPr lang="en-US" altLang="zh-CN" i="1">
+                                <a:latin typeface="Cambria Math" panose="02040503050406030204" pitchFamily="18" charset="0"/>
+                              </a:rPr>
+                              <m:t>𝑟</m:t>
+                            </m:r>
+                            <m:r>
+                              <a:rPr lang="en-US" altLang="zh-CN" i="1">
+                                <a:latin typeface="Cambria Math" panose="02040503050406030204" pitchFamily="18" charset="0"/>
+                              </a:rPr>
+                              <m:t>,</m:t>
+                            </m:r>
+                            <m:r>
+                              <a:rPr lang="en-US" altLang="zh-CN" i="1">
+                                <a:latin typeface="Cambria Math" panose="02040503050406030204" pitchFamily="18" charset="0"/>
+                              </a:rPr>
+                              <m:t>𝑙</m:t>
+                            </m:r>
+                          </m:e>
+                        </m:d>
+                      </m:e>
+                    </m:d>
+                  </m:oMath>
+                </a14:m>
+                <a:endParaRPr lang="en-US" altLang="zh-CN" dirty="0"/>
+              </a:p>
+              <a:p>
+                <a:endParaRPr lang="zh-CN" altLang="en-US" dirty="0"/>
+              </a:p>
+            </p:txBody>
+          </p:sp>
+        </mc:Choice>
+        <mc:Fallback>
+          <p:sp>
+            <p:nvSpPr>
+              <p:cNvPr id="3" name="内容占位符 2"/>
+              <p:cNvSpPr>
+                <a:spLocks noGrp="1" noRot="1" noChangeAspect="1" noMove="1" noResize="1" noEditPoints="1" noAdjustHandles="1" noChangeArrowheads="1" noChangeShapeType="1" noTextEdit="1"/>
+              </p:cNvSpPr>
+              <p:nvPr>
+                <p:ph idx="1"/>
+              </p:nvPr>
+            </p:nvSpPr>
+            <p:spPr>
+              <a:blipFill rotWithShape="0">
+                <a:blip r:embed="rId2"/>
+                <a:stretch>
+                  <a:fillRect l="-1254" t="-2424" r="-376"/>
+                </a:stretch>
+              </a:blipFill>
+            </p:spPr>
+            <p:txBody>
+              <a:bodyPr/>
+              <a:lstStyle/>
+              <a:p>
+                <a:r>
+                  <a:rPr lang="zh-CN" altLang="en-US">
+                    <a:noFill/>
+                  </a:rPr>
+                  <a:t> </a:t>
+                </a:r>
+              </a:p>
+            </p:txBody>
+          </p:sp>
+        </mc:Fallback>
+      </mc:AlternateContent>
+    </p:spTree>
+    <p:extLst>
+      <p:ext uri="{BB962C8B-B14F-4D97-AF65-F5344CB8AC3E}">
+        <p14:creationId xmlns:p14="http://schemas.microsoft.com/office/powerpoint/2010/main" val="3957519806"/>
+      </p:ext>
+    </p:extLst>
+  </p:cSld>
+  <p:clrMapOvr>
+    <a:masterClrMapping/>
+  </p:clrMapOvr>
+</p:sld>
+</file>
+
+<file path=ppt/slides/slide8.xml><?xml version="1.0" encoding="utf-8"?>
+<p:sld xmlns:a="http://schemas.openxmlformats.org/drawingml/2006/main" xmlns:r="http://schemas.openxmlformats.org/officeDocument/2006/relationships" xmlns:p="http://schemas.openxmlformats.org/presentationml/2006/main">
+  <p:cSld>
+    <p:spTree>
+      <p:nvGrpSpPr>
+        <p:cNvPr id="1" name=""/>
+        <p:cNvGrpSpPr/>
+        <p:nvPr/>
+      </p:nvGrpSpPr>
+      <p:grpSpPr>
+        <a:xfrm>
+          <a:off x="0" y="0"/>
+          <a:ext cx="0" cy="0"/>
+          <a:chOff x="0" y="0"/>
+          <a:chExt cx="0" cy="0"/>
+        </a:xfrm>
+      </p:grpSpPr>
+      <p:sp>
+        <p:nvSpPr>
+          <p:cNvPr id="2" name="标题 1"/>
+          <p:cNvSpPr>
+            <a:spLocks noGrp="1"/>
+          </p:cNvSpPr>
+          <p:nvPr>
+            <p:ph type="title"/>
+          </p:nvPr>
+        </p:nvSpPr>
+        <p:spPr/>
+        <p:txBody>
+          <a:bodyPr/>
+          <a:lstStyle/>
+          <a:p>
             <a:endParaRPr lang="zh-CN" altLang="en-US"/>
           </a:p>
         </p:txBody>
@@ -10900,7 +12003,7 @@
     </p:spTree>
     <p:extLst>
       <p:ext uri="{BB962C8B-B14F-4D97-AF65-F5344CB8AC3E}">
-        <p14:creationId xmlns:p14="http://schemas.microsoft.com/office/powerpoint/2010/main" val="3957519806"/>
+        <p14:creationId xmlns:p14="http://schemas.microsoft.com/office/powerpoint/2010/main" val="1302051078"/>
       </p:ext>
     </p:extLst>
   </p:cSld>

</xml_diff>